<commit_message>
Mig/Sta and Spatial data
mig/sta experiment: fixed experimental design figure to include
sampling migratory bees at sampling event 3

bomb surv. worked on spatial data and GLMM
</commit_message>
<xml_diff>
--- a/MigratoryStationary/DesignSchematic/Mig:Sta_Experiment_Schem .pptx
+++ b/MigratoryStationary/DesignSchematic/Mig:Sta_Experiment_Schem .pptx
@@ -239,7 +239,7 @@
           <a:p>
             <a:fld id="{31CDC68C-EC45-C548-8159-BEDE9C5987EE}" type="datetimeFigureOut">
               <a:rPr lang="en-US" smtClean="0"/>
-              <a:t>1/9/17</a:t>
+              <a:t>4/4/17</a:t>
             </a:fld>
             <a:endParaRPr lang="en-US"/>
           </a:p>
@@ -409,7 +409,7 @@
           <a:p>
             <a:fld id="{31CDC68C-EC45-C548-8159-BEDE9C5987EE}" type="datetimeFigureOut">
               <a:rPr lang="en-US" smtClean="0"/>
-              <a:t>1/9/17</a:t>
+              <a:t>4/4/17</a:t>
             </a:fld>
             <a:endParaRPr lang="en-US"/>
           </a:p>
@@ -589,7 +589,7 @@
           <a:p>
             <a:fld id="{31CDC68C-EC45-C548-8159-BEDE9C5987EE}" type="datetimeFigureOut">
               <a:rPr lang="en-US" smtClean="0"/>
-              <a:t>1/9/17</a:t>
+              <a:t>4/4/17</a:t>
             </a:fld>
             <a:endParaRPr lang="en-US"/>
           </a:p>
@@ -759,7 +759,7 @@
           <a:p>
             <a:fld id="{31CDC68C-EC45-C548-8159-BEDE9C5987EE}" type="datetimeFigureOut">
               <a:rPr lang="en-US" smtClean="0"/>
-              <a:t>1/9/17</a:t>
+              <a:t>4/4/17</a:t>
             </a:fld>
             <a:endParaRPr lang="en-US"/>
           </a:p>
@@ -1005,7 +1005,7 @@
           <a:p>
             <a:fld id="{31CDC68C-EC45-C548-8159-BEDE9C5987EE}" type="datetimeFigureOut">
               <a:rPr lang="en-US" smtClean="0"/>
-              <a:t>1/9/17</a:t>
+              <a:t>4/4/17</a:t>
             </a:fld>
             <a:endParaRPr lang="en-US"/>
           </a:p>
@@ -1237,7 +1237,7 @@
           <a:p>
             <a:fld id="{31CDC68C-EC45-C548-8159-BEDE9C5987EE}" type="datetimeFigureOut">
               <a:rPr lang="en-US" smtClean="0"/>
-              <a:t>1/9/17</a:t>
+              <a:t>4/4/17</a:t>
             </a:fld>
             <a:endParaRPr lang="en-US"/>
           </a:p>
@@ -1604,7 +1604,7 @@
           <a:p>
             <a:fld id="{31CDC68C-EC45-C548-8159-BEDE9C5987EE}" type="datetimeFigureOut">
               <a:rPr lang="en-US" smtClean="0"/>
-              <a:t>1/9/17</a:t>
+              <a:t>4/4/17</a:t>
             </a:fld>
             <a:endParaRPr lang="en-US"/>
           </a:p>
@@ -1722,7 +1722,7 @@
           <a:p>
             <a:fld id="{31CDC68C-EC45-C548-8159-BEDE9C5987EE}" type="datetimeFigureOut">
               <a:rPr lang="en-US" smtClean="0"/>
-              <a:t>1/9/17</a:t>
+              <a:t>4/4/17</a:t>
             </a:fld>
             <a:endParaRPr lang="en-US"/>
           </a:p>
@@ -1817,7 +1817,7 @@
           <a:p>
             <a:fld id="{31CDC68C-EC45-C548-8159-BEDE9C5987EE}" type="datetimeFigureOut">
               <a:rPr lang="en-US" smtClean="0"/>
-              <a:t>1/9/17</a:t>
+              <a:t>4/4/17</a:t>
             </a:fld>
             <a:endParaRPr lang="en-US"/>
           </a:p>
@@ -2094,7 +2094,7 @@
           <a:p>
             <a:fld id="{31CDC68C-EC45-C548-8159-BEDE9C5987EE}" type="datetimeFigureOut">
               <a:rPr lang="en-US" smtClean="0"/>
-              <a:t>1/9/17</a:t>
+              <a:t>4/4/17</a:t>
             </a:fld>
             <a:endParaRPr lang="en-US"/>
           </a:p>
@@ -2347,7 +2347,7 @@
           <a:p>
             <a:fld id="{31CDC68C-EC45-C548-8159-BEDE9C5987EE}" type="datetimeFigureOut">
               <a:rPr lang="en-US" smtClean="0"/>
-              <a:t>1/9/17</a:t>
+              <a:t>4/4/17</a:t>
             </a:fld>
             <a:endParaRPr lang="en-US"/>
           </a:p>
@@ -2560,7 +2560,7 @@
           <a:p>
             <a:fld id="{31CDC68C-EC45-C548-8159-BEDE9C5987EE}" type="datetimeFigureOut">
               <a:rPr lang="en-US" smtClean="0"/>
-              <a:t>1/9/17</a:t>
+              <a:t>4/4/17</a:t>
             </a:fld>
             <a:endParaRPr lang="en-US"/>
           </a:p>
@@ -3157,7 +3157,23 @@
                   <a:sysClr val="windowText" lastClr="000000"/>
                 </a:solidFill>
               </a:rPr>
-              <a:t>    Sampling Event 1			                          Sampling Event 2  		</a:t>
+              <a:t>   </a:t>
+            </a:r>
+            <a:r>
+              <a:rPr lang="en-US" b="1" dirty="0" smtClean="0">
+                <a:solidFill>
+                  <a:sysClr val="windowText" lastClr="000000"/>
+                </a:solidFill>
+              </a:rPr>
+              <a:t>Sampling </a:t>
+            </a:r>
+            <a:r>
+              <a:rPr lang="en-US" b="1" dirty="0" smtClean="0">
+                <a:solidFill>
+                  <a:sysClr val="windowText" lastClr="000000"/>
+                </a:solidFill>
+              </a:rPr>
+              <a:t>Event 1			                          Sampling Event 2  		</a:t>
             </a:r>
             <a:r>
               <a:rPr lang="en-US" b="1" dirty="0">
@@ -3199,15 +3215,7 @@
                   <a:sysClr val="windowText" lastClr="000000"/>
                 </a:solidFill>
               </a:rPr>
-              <a:t>               (when migratory group returns)	            </a:t>
-            </a:r>
-            <a:r>
-              <a:rPr lang="en-US" i="1" dirty="0" smtClean="0">
-                <a:solidFill>
-                  <a:sysClr val="windowText" lastClr="000000"/>
-                </a:solidFill>
-              </a:rPr>
-              <a:t>(after 1 month exposure)</a:t>
+              <a:t>               (when migratory group returns)	            (after 1 month exposure)</a:t>
             </a:r>
           </a:p>
         </p:txBody>
@@ -4004,11 +4012,6 @@
               </a:rPr>
               <a:t>Group</a:t>
             </a:r>
-            <a:endParaRPr lang="en-US" sz="1400" dirty="0" smtClean="0">
-              <a:solidFill>
-                <a:sysClr val="windowText" lastClr="000000"/>
-              </a:solidFill>
-            </a:endParaRPr>
           </a:p>
           <a:p>
             <a:pPr algn="ctr"/>
@@ -4147,11 +4150,6 @@
               </a:rPr>
               <a:t>Group</a:t>
             </a:r>
-            <a:endParaRPr lang="en-US" sz="1400" dirty="0" smtClean="0">
-              <a:solidFill>
-                <a:sysClr val="windowText" lastClr="000000"/>
-              </a:solidFill>
-            </a:endParaRPr>
           </a:p>
           <a:p>
             <a:pPr algn="ctr"/>
@@ -4232,11 +4230,6 @@
               </a:rPr>
               <a:t>Group</a:t>
             </a:r>
-            <a:endParaRPr lang="en-US" sz="1400" dirty="0" smtClean="0">
-              <a:solidFill>
-                <a:sysClr val="windowText" lastClr="000000"/>
-              </a:solidFill>
-            </a:endParaRPr>
           </a:p>
         </p:txBody>
       </p:sp>
@@ -4306,11 +4299,6 @@
               </a:rPr>
               <a:t>Group</a:t>
             </a:r>
-            <a:endParaRPr lang="en-US" sz="1400" dirty="0" smtClean="0">
-              <a:solidFill>
-                <a:sysClr val="windowText" lastClr="000000"/>
-              </a:solidFill>
-            </a:endParaRPr>
           </a:p>
         </p:txBody>
       </p:sp>
@@ -4380,11 +4368,6 @@
               </a:rPr>
               <a:t>Group</a:t>
             </a:r>
-            <a:endParaRPr lang="en-US" sz="1400" dirty="0" smtClean="0">
-              <a:solidFill>
-                <a:sysClr val="windowText" lastClr="000000"/>
-              </a:solidFill>
-            </a:endParaRPr>
           </a:p>
           <a:p>
             <a:pPr algn="ctr"/>
@@ -4401,25 +4384,25 @@
       </p:sp>
       <p:sp>
         <p:nvSpPr>
-          <p:cNvPr id="45" name="Rectangle 44"/>
+          <p:cNvPr id="46" name="Rectangle 45"/>
           <p:cNvSpPr/>
           <p:nvPr/>
         </p:nvSpPr>
         <p:spPr>
           <a:xfrm>
-            <a:off x="10689263" y="5923508"/>
-            <a:ext cx="950933" cy="714990"/>
+            <a:off x="352423" y="810194"/>
+            <a:ext cx="616992" cy="435660"/>
           </a:xfrm>
           <a:prstGeom prst="rect">
             <a:avLst/>
           </a:prstGeom>
           <a:solidFill>
-            <a:schemeClr val="accent2">
-              <a:lumMod val="40000"/>
-              <a:lumOff val="60000"/>
+            <a:schemeClr val="accent6">
+              <a:lumMod val="60000"/>
+              <a:lumOff val="40000"/>
             </a:schemeClr>
           </a:solidFill>
-          <a:ln w="19050">
+          <a:ln w="19050" cmpd="tri">
             <a:solidFill>
               <a:schemeClr val="tx1"/>
             </a:solidFill>
@@ -4446,25 +4429,6 @@
           <a:lstStyle/>
           <a:p>
             <a:pPr algn="ctr"/>
-            <a:r>
-              <a:rPr lang="en-US" sz="1400" dirty="0" smtClean="0">
-                <a:solidFill>
-                  <a:sysClr val="windowText" lastClr="000000"/>
-                </a:solidFill>
-              </a:rPr>
-              <a:t>Migratory</a:t>
-            </a:r>
-          </a:p>
-          <a:p>
-            <a:pPr algn="ctr"/>
-            <a:r>
-              <a:rPr lang="en-US" sz="1400" dirty="0" smtClean="0">
-                <a:solidFill>
-                  <a:sysClr val="windowText" lastClr="000000"/>
-                </a:solidFill>
-              </a:rPr>
-              <a:t>Group</a:t>
-            </a:r>
             <a:endParaRPr lang="en-US" sz="1400" dirty="0" smtClean="0">
               <a:solidFill>
                 <a:sysClr val="windowText" lastClr="000000"/>
@@ -4475,25 +4439,85 @@
       </p:sp>
       <p:sp>
         <p:nvSpPr>
-          <p:cNvPr id="46" name="Rectangle 45"/>
+          <p:cNvPr id="3" name="TextBox 2"/>
+          <p:cNvSpPr txBox="1"/>
+          <p:nvPr/>
+        </p:nvSpPr>
+        <p:spPr>
+          <a:xfrm>
+            <a:off x="1004744" y="828124"/>
+            <a:ext cx="1514476" cy="369332"/>
+          </a:xfrm>
+          <a:prstGeom prst="rect">
+            <a:avLst/>
+          </a:prstGeom>
+          <a:noFill/>
+        </p:spPr>
+        <p:txBody>
+          <a:bodyPr wrap="square" rtlCol="0">
+            <a:spAutoFit/>
+          </a:bodyPr>
+          <a:lstStyle/>
+          <a:p>
+            <a:r>
+              <a:rPr lang="en-US" b="1" dirty="0" smtClean="0"/>
+              <a:t>= Sample</a:t>
+            </a:r>
+            <a:endParaRPr lang="en-US" b="1" dirty="0"/>
+          </a:p>
+        </p:txBody>
+      </p:sp>
+      <p:sp>
+        <p:nvSpPr>
+          <p:cNvPr id="48" name="TextBox 47"/>
+          <p:cNvSpPr txBox="1"/>
+          <p:nvPr/>
+        </p:nvSpPr>
+        <p:spPr>
+          <a:xfrm>
+            <a:off x="2863045" y="828124"/>
+            <a:ext cx="1865594" cy="369332"/>
+          </a:xfrm>
+          <a:prstGeom prst="rect">
+            <a:avLst/>
+          </a:prstGeom>
+          <a:noFill/>
+        </p:spPr>
+        <p:txBody>
+          <a:bodyPr wrap="square" rtlCol="0">
+            <a:spAutoFit/>
+          </a:bodyPr>
+          <a:lstStyle/>
+          <a:p>
+            <a:r>
+              <a:rPr lang="en-US" b="1" dirty="0" smtClean="0"/>
+              <a:t>= Do Not Sample</a:t>
+            </a:r>
+            <a:endParaRPr lang="en-US" b="1" dirty="0"/>
+          </a:p>
+        </p:txBody>
+      </p:sp>
+      <p:sp>
+        <p:nvSpPr>
+          <p:cNvPr id="49" name="Rectangle 48"/>
           <p:cNvSpPr/>
           <p:nvPr/>
         </p:nvSpPr>
         <p:spPr>
           <a:xfrm>
-            <a:off x="352423" y="810194"/>
+            <a:off x="2246053" y="805179"/>
             <a:ext cx="616992" cy="435660"/>
           </a:xfrm>
           <a:prstGeom prst="rect">
             <a:avLst/>
           </a:prstGeom>
           <a:solidFill>
-            <a:schemeClr val="accent6">
-              <a:lumMod val="60000"/>
-              <a:lumOff val="40000"/>
+            <a:schemeClr val="accent2">
+              <a:lumMod val="40000"/>
+              <a:lumOff val="60000"/>
             </a:schemeClr>
           </a:solidFill>
-          <a:ln w="19050" cmpd="tri">
+          <a:ln w="19050">
             <a:solidFill>
               <a:schemeClr val="tx1"/>
             </a:solidFill>
@@ -4530,82 +4554,22 @@
       </p:sp>
       <p:sp>
         <p:nvSpPr>
-          <p:cNvPr id="3" name="TextBox 2"/>
-          <p:cNvSpPr txBox="1"/>
-          <p:nvPr/>
-        </p:nvSpPr>
-        <p:spPr>
-          <a:xfrm>
-            <a:off x="1004744" y="828124"/>
-            <a:ext cx="1514476" cy="369332"/>
-          </a:xfrm>
-          <a:prstGeom prst="rect">
-            <a:avLst/>
-          </a:prstGeom>
-          <a:noFill/>
-        </p:spPr>
-        <p:txBody>
-          <a:bodyPr wrap="square" rtlCol="0">
-            <a:spAutoFit/>
-          </a:bodyPr>
-          <a:lstStyle/>
-          <a:p>
-            <a:r>
-              <a:rPr lang="en-US" b="1" dirty="0" smtClean="0"/>
-              <a:t>= Sample</a:t>
-            </a:r>
-            <a:endParaRPr lang="en-US" b="1" dirty="0"/>
-          </a:p>
-        </p:txBody>
-      </p:sp>
-      <p:sp>
-        <p:nvSpPr>
-          <p:cNvPr id="48" name="TextBox 47"/>
-          <p:cNvSpPr txBox="1"/>
-          <p:nvPr/>
-        </p:nvSpPr>
-        <p:spPr>
-          <a:xfrm>
-            <a:off x="2863045" y="828124"/>
-            <a:ext cx="1865594" cy="369332"/>
-          </a:xfrm>
-          <a:prstGeom prst="rect">
-            <a:avLst/>
-          </a:prstGeom>
-          <a:noFill/>
-        </p:spPr>
-        <p:txBody>
-          <a:bodyPr wrap="square" rtlCol="0">
-            <a:spAutoFit/>
-          </a:bodyPr>
-          <a:lstStyle/>
-          <a:p>
-            <a:r>
-              <a:rPr lang="en-US" b="1" dirty="0" smtClean="0"/>
-              <a:t>= Do Not Sample</a:t>
-            </a:r>
-            <a:endParaRPr lang="en-US" b="1" dirty="0"/>
-          </a:p>
-        </p:txBody>
-      </p:sp>
-      <p:sp>
-        <p:nvSpPr>
-          <p:cNvPr id="49" name="Rectangle 48"/>
+          <p:cNvPr id="53" name="Rectangle 52"/>
           <p:cNvSpPr/>
           <p:nvPr/>
         </p:nvSpPr>
         <p:spPr>
           <a:xfrm>
-            <a:off x="2246053" y="805179"/>
-            <a:ext cx="616992" cy="435660"/>
+            <a:off x="1544235" y="3901540"/>
+            <a:ext cx="950933" cy="714990"/>
           </a:xfrm>
           <a:prstGeom prst="rect">
             <a:avLst/>
           </a:prstGeom>
           <a:solidFill>
-            <a:schemeClr val="accent2">
-              <a:lumMod val="40000"/>
-              <a:lumOff val="60000"/>
+            <a:schemeClr val="accent6">
+              <a:lumMod val="60000"/>
+              <a:lumOff val="40000"/>
             </a:schemeClr>
           </a:solidFill>
           <a:ln w="19050">
@@ -4635,32 +4599,35 @@
           <a:lstStyle/>
           <a:p>
             <a:pPr algn="ctr"/>
-            <a:endParaRPr lang="en-US" sz="1400" dirty="0" smtClean="0">
-              <a:solidFill>
-                <a:sysClr val="windowText" lastClr="000000"/>
-              </a:solidFill>
-            </a:endParaRPr>
-          </a:p>
-        </p:txBody>
-      </p:sp>
-      <p:sp>
-        <p:nvSpPr>
-          <p:cNvPr id="53" name="Rectangle 52"/>
+            <a:r>
+              <a:rPr lang="en-US" sz="1400" dirty="0" smtClean="0">
+                <a:solidFill>
+                  <a:sysClr val="windowText" lastClr="000000"/>
+                </a:solidFill>
+              </a:rPr>
+              <a:t>Migratory Group</a:t>
+            </a:r>
+          </a:p>
+        </p:txBody>
+      </p:sp>
+      <p:sp>
+        <p:nvSpPr>
+          <p:cNvPr id="54" name="Rectangle 53"/>
           <p:cNvSpPr/>
           <p:nvPr/>
         </p:nvSpPr>
         <p:spPr>
           <a:xfrm>
-            <a:off x="1544235" y="3901540"/>
+            <a:off x="1004744" y="4785477"/>
             <a:ext cx="950933" cy="714990"/>
           </a:xfrm>
           <a:prstGeom prst="rect">
             <a:avLst/>
           </a:prstGeom>
           <a:solidFill>
-            <a:schemeClr val="accent6">
-              <a:lumMod val="60000"/>
-              <a:lumOff val="40000"/>
+            <a:schemeClr val="accent2">
+              <a:lumMod val="40000"/>
+              <a:lumOff val="60000"/>
             </a:schemeClr>
           </a:solidFill>
           <a:ln w="19050">
@@ -4696,64 +4663,6 @@
                   <a:sysClr val="windowText" lastClr="000000"/>
                 </a:solidFill>
               </a:rPr>
-              <a:t>Migratory Group</a:t>
-            </a:r>
-          </a:p>
-        </p:txBody>
-      </p:sp>
-      <p:sp>
-        <p:nvSpPr>
-          <p:cNvPr id="54" name="Rectangle 53"/>
-          <p:cNvSpPr/>
-          <p:nvPr/>
-        </p:nvSpPr>
-        <p:spPr>
-          <a:xfrm>
-            <a:off x="1004744" y="4785477"/>
-            <a:ext cx="950933" cy="714990"/>
-          </a:xfrm>
-          <a:prstGeom prst="rect">
-            <a:avLst/>
-          </a:prstGeom>
-          <a:solidFill>
-            <a:schemeClr val="accent2">
-              <a:lumMod val="40000"/>
-              <a:lumOff val="60000"/>
-            </a:schemeClr>
-          </a:solidFill>
-          <a:ln w="19050">
-            <a:solidFill>
-              <a:schemeClr val="tx1"/>
-            </a:solidFill>
-          </a:ln>
-        </p:spPr>
-        <p:style>
-          <a:lnRef idx="2">
-            <a:schemeClr val="accent1">
-              <a:shade val="50000"/>
-            </a:schemeClr>
-          </a:lnRef>
-          <a:fillRef idx="1">
-            <a:schemeClr val="accent1"/>
-          </a:fillRef>
-          <a:effectRef idx="0">
-            <a:schemeClr val="accent1"/>
-          </a:effectRef>
-          <a:fontRef idx="minor">
-            <a:schemeClr val="lt1"/>
-          </a:fontRef>
-        </p:style>
-        <p:txBody>
-          <a:bodyPr rtlCol="0" anchor="ctr"/>
-          <a:lstStyle/>
-          <a:p>
-            <a:pPr algn="ctr"/>
-            <a:r>
-              <a:rPr lang="en-US" sz="1400" dirty="0" smtClean="0">
-                <a:solidFill>
-                  <a:sysClr val="windowText" lastClr="000000"/>
-                </a:solidFill>
-              </a:rPr>
               <a:t>Exposed</a:t>
             </a:r>
           </a:p>
@@ -4767,11 +4676,6 @@
               </a:rPr>
               <a:t>Group</a:t>
             </a:r>
-            <a:endParaRPr lang="en-US" sz="1400" dirty="0" smtClean="0">
-              <a:solidFill>
-                <a:sysClr val="windowText" lastClr="000000"/>
-              </a:solidFill>
-            </a:endParaRPr>
           </a:p>
         </p:txBody>
       </p:sp>
@@ -4845,41 +4749,80 @@
           </a:fontRef>
         </p:style>
       </p:cxnSp>
-      <p:cxnSp>
-        <p:nvCxnSpPr>
-          <p:cNvPr id="63" name="Straight Connector 62"/>
-          <p:cNvCxnSpPr/>
+      <p:sp>
+        <p:nvSpPr>
+          <p:cNvPr id="47" name="Rectangle 46"/>
+          <p:cNvSpPr/>
           <p:nvPr/>
-        </p:nvCxnSpPr>
-        <p:spPr>
-          <a:xfrm>
-            <a:off x="10682120" y="5925138"/>
-            <a:ext cx="950933" cy="713360"/>
-          </a:xfrm>
-          <a:prstGeom prst="line">
+        </p:nvSpPr>
+        <p:spPr>
+          <a:xfrm>
+            <a:off x="10705153" y="5921011"/>
+            <a:ext cx="950933" cy="714990"/>
+          </a:xfrm>
+          <a:prstGeom prst="rect">
             <a:avLst/>
           </a:prstGeom>
-          <a:ln w="38100">
+          <a:solidFill>
+            <a:schemeClr val="accent6">
+              <a:lumMod val="60000"/>
+              <a:lumOff val="40000"/>
+            </a:schemeClr>
+          </a:solidFill>
+          <a:ln w="19050">
             <a:solidFill>
               <a:schemeClr val="tx1"/>
             </a:solidFill>
           </a:ln>
         </p:spPr>
         <p:style>
-          <a:lnRef idx="1">
-            <a:schemeClr val="accent1"/>
+          <a:lnRef idx="2">
+            <a:schemeClr val="accent1">
+              <a:shade val="50000"/>
+            </a:schemeClr>
           </a:lnRef>
-          <a:fillRef idx="0">
+          <a:fillRef idx="1">
             <a:schemeClr val="accent1"/>
           </a:fillRef>
           <a:effectRef idx="0">
             <a:schemeClr val="accent1"/>
           </a:effectRef>
           <a:fontRef idx="minor">
-            <a:schemeClr val="tx1"/>
+            <a:schemeClr val="lt1"/>
           </a:fontRef>
         </p:style>
-      </p:cxnSp>
+        <p:txBody>
+          <a:bodyPr rtlCol="0" anchor="ctr"/>
+          <a:lstStyle/>
+          <a:p>
+            <a:pPr algn="ctr"/>
+            <a:r>
+              <a:rPr lang="en-US" sz="1400" dirty="0" smtClean="0">
+                <a:solidFill>
+                  <a:sysClr val="windowText" lastClr="000000"/>
+                </a:solidFill>
+              </a:rPr>
+              <a:t>Migratory</a:t>
+            </a:r>
+            <a:endParaRPr lang="en-US" sz="1400" dirty="0" smtClean="0">
+              <a:solidFill>
+                <a:sysClr val="windowText" lastClr="000000"/>
+              </a:solidFill>
+            </a:endParaRPr>
+          </a:p>
+          <a:p>
+            <a:pPr algn="ctr"/>
+            <a:r>
+              <a:rPr lang="en-US" sz="1400" dirty="0" smtClean="0">
+                <a:solidFill>
+                  <a:sysClr val="windowText" lastClr="000000"/>
+                </a:solidFill>
+              </a:rPr>
+              <a:t>Group</a:t>
+            </a:r>
+          </a:p>
+        </p:txBody>
+      </p:sp>
     </p:spTree>
     <p:extLst>
       <p:ext uri="{BB962C8B-B14F-4D97-AF65-F5344CB8AC3E}">
@@ -5015,7 +4958,7 @@
     </a:clrScheme>
     <a:fontScheme name="Office">
       <a:majorFont>
-        <a:latin typeface="Calibri Light" panose="020F0302020204030204"/>
+        <a:latin typeface="Calibri Light"/>
         <a:ea typeface=""/>
         <a:cs typeface=""/>
         <a:font script="Jpan" typeface="Yu Gothic Light"/>
@@ -5050,7 +4993,7 @@
         <a:font script="Geor" typeface="Sylfaen"/>
       </a:majorFont>
       <a:minorFont>
-        <a:latin typeface="Calibri" panose="020F0502020204030204"/>
+        <a:latin typeface="Calibri"/>
         <a:ea typeface=""/>
         <a:cs typeface=""/>
         <a:font script="Jpan" typeface="Yu Gothic"/>
@@ -5227,7 +5170,7 @@
   <a:extraClrSchemeLst/>
   <a:extLst>
     <a:ext uri="{05A4C25C-085E-4340-85A3-A5531E510DB2}">
-      <thm15:themeFamily xmlns:thm15="http://schemas.microsoft.com/office/thememl/2012/main" name="Office Theme" id="{62F939B6-93AF-4DB8-9C6B-D6C7DFDC589F}" vid="{4A3C46E8-61CC-4603-A589-7422A47A8E4A}"/>
+      <thm15:themeFamily xmlns:thm15="http://schemas.microsoft.com/office/thememl/2012/main" xmlns="" name="Office Theme" id="{62F939B6-93AF-4DB8-9C6B-D6C7DFDC589F}" vid="{4A3C46E8-61CC-4603-A589-7422A47A8E4A}"/>
     </a:ext>
   </a:extLst>
 </a:theme>

</xml_diff>

<commit_message>
added to ross data folder
</commit_message>
<xml_diff>
--- a/MigratoryStationary/DesignSchematic/Mig:Sta_Experiment_Schem .pptx
+++ b/MigratoryStationary/DesignSchematic/Mig:Sta_Experiment_Schem .pptx
@@ -5,10 +5,10 @@
     <p:sldMasterId id="2147483648" r:id="rId1"/>
   </p:sldMasterIdLst>
   <p:sldIdLst>
-    <p:sldId id="257" r:id="rId2"/>
-    <p:sldId id="258" r:id="rId3"/>
-    <p:sldId id="259" r:id="rId4"/>
-    <p:sldId id="260" r:id="rId5"/>
+    <p:sldId id="259" r:id="rId2"/>
+    <p:sldId id="260" r:id="rId3"/>
+    <p:sldId id="257" r:id="rId4"/>
+    <p:sldId id="258" r:id="rId5"/>
   </p:sldIdLst>
   <p:sldSz cx="12192000" cy="6858000"/>
   <p:notesSz cx="6858000" cy="9144000"/>
@@ -241,7 +241,7 @@
           <a:p>
             <a:fld id="{31CDC68C-EC45-C548-8159-BEDE9C5987EE}" type="datetimeFigureOut">
               <a:rPr lang="en-US" smtClean="0"/>
-              <a:t>10/2/17</a:t>
+              <a:t>10/4/17</a:t>
             </a:fld>
             <a:endParaRPr lang="en-US"/>
           </a:p>
@@ -411,7 +411,7 @@
           <a:p>
             <a:fld id="{31CDC68C-EC45-C548-8159-BEDE9C5987EE}" type="datetimeFigureOut">
               <a:rPr lang="en-US" smtClean="0"/>
-              <a:t>10/2/17</a:t>
+              <a:t>10/4/17</a:t>
             </a:fld>
             <a:endParaRPr lang="en-US"/>
           </a:p>
@@ -591,7 +591,7 @@
           <a:p>
             <a:fld id="{31CDC68C-EC45-C548-8159-BEDE9C5987EE}" type="datetimeFigureOut">
               <a:rPr lang="en-US" smtClean="0"/>
-              <a:t>10/2/17</a:t>
+              <a:t>10/4/17</a:t>
             </a:fld>
             <a:endParaRPr lang="en-US"/>
           </a:p>
@@ -761,7 +761,7 @@
           <a:p>
             <a:fld id="{31CDC68C-EC45-C548-8159-BEDE9C5987EE}" type="datetimeFigureOut">
               <a:rPr lang="en-US" smtClean="0"/>
-              <a:t>10/2/17</a:t>
+              <a:t>10/4/17</a:t>
             </a:fld>
             <a:endParaRPr lang="en-US"/>
           </a:p>
@@ -1007,7 +1007,7 @@
           <a:p>
             <a:fld id="{31CDC68C-EC45-C548-8159-BEDE9C5987EE}" type="datetimeFigureOut">
               <a:rPr lang="en-US" smtClean="0"/>
-              <a:t>10/2/17</a:t>
+              <a:t>10/4/17</a:t>
             </a:fld>
             <a:endParaRPr lang="en-US"/>
           </a:p>
@@ -1239,7 +1239,7 @@
           <a:p>
             <a:fld id="{31CDC68C-EC45-C548-8159-BEDE9C5987EE}" type="datetimeFigureOut">
               <a:rPr lang="en-US" smtClean="0"/>
-              <a:t>10/2/17</a:t>
+              <a:t>10/4/17</a:t>
             </a:fld>
             <a:endParaRPr lang="en-US"/>
           </a:p>
@@ -1606,7 +1606,7 @@
           <a:p>
             <a:fld id="{31CDC68C-EC45-C548-8159-BEDE9C5987EE}" type="datetimeFigureOut">
               <a:rPr lang="en-US" smtClean="0"/>
-              <a:t>10/2/17</a:t>
+              <a:t>10/4/17</a:t>
             </a:fld>
             <a:endParaRPr lang="en-US"/>
           </a:p>
@@ -1724,7 +1724,7 @@
           <a:p>
             <a:fld id="{31CDC68C-EC45-C548-8159-BEDE9C5987EE}" type="datetimeFigureOut">
               <a:rPr lang="en-US" smtClean="0"/>
-              <a:t>10/2/17</a:t>
+              <a:t>10/4/17</a:t>
             </a:fld>
             <a:endParaRPr lang="en-US"/>
           </a:p>
@@ -1819,7 +1819,7 @@
           <a:p>
             <a:fld id="{31CDC68C-EC45-C548-8159-BEDE9C5987EE}" type="datetimeFigureOut">
               <a:rPr lang="en-US" smtClean="0"/>
-              <a:t>10/2/17</a:t>
+              <a:t>10/4/17</a:t>
             </a:fld>
             <a:endParaRPr lang="en-US"/>
           </a:p>
@@ -2096,7 +2096,7 @@
           <a:p>
             <a:fld id="{31CDC68C-EC45-C548-8159-BEDE9C5987EE}" type="datetimeFigureOut">
               <a:rPr lang="en-US" smtClean="0"/>
-              <a:t>10/2/17</a:t>
+              <a:t>10/4/17</a:t>
             </a:fld>
             <a:endParaRPr lang="en-US"/>
           </a:p>
@@ -2349,7 +2349,7 @@
           <a:p>
             <a:fld id="{31CDC68C-EC45-C548-8159-BEDE9C5987EE}" type="datetimeFigureOut">
               <a:rPr lang="en-US" smtClean="0"/>
-              <a:t>10/2/17</a:t>
+              <a:t>10/4/17</a:t>
             </a:fld>
             <a:endParaRPr lang="en-US"/>
           </a:p>
@@ -2562,7 +2562,7 @@
           <a:p>
             <a:fld id="{31CDC68C-EC45-C548-8159-BEDE9C5987EE}" type="datetimeFigureOut">
               <a:rPr lang="en-US" smtClean="0"/>
-              <a:t>10/2/17</a:t>
+              <a:t>10/4/17</a:t>
             </a:fld>
             <a:endParaRPr lang="en-US"/>
           </a:p>
@@ -3032,7 +3032,7 @@
           </a:xfrm>
           <a:prstGeom prst="rightArrow">
             <a:avLst>
-              <a:gd name="adj1" fmla="val 50000"/>
+              <a:gd name="adj1" fmla="val 60282"/>
               <a:gd name="adj2" fmla="val 49422"/>
             </a:avLst>
           </a:prstGeom>
@@ -3060,7 +3060,7 @@
             <a:pPr algn="ctr"/>
             <a:r>
               <a:rPr lang="en-US" dirty="0" smtClean="0"/>
-              <a:t>Send Migratory Group to Almonds and Return to NC. Move Exposed Group to Exposed Yard</a:t>
+              <a:t>Migratory Group transported to CA and returned to NC. Exposed Group transferred to Exposed Yard</a:t>
             </a:r>
             <a:endParaRPr lang="en-US" dirty="0"/>
           </a:p>
@@ -3104,7 +3104,7 @@
             <a:pPr algn="ctr"/>
             <a:r>
               <a:rPr lang="en-US" dirty="0" smtClean="0"/>
-              <a:t>Move Migratory Group to Exposed Yard</a:t>
+              <a:t>Migratory Group transferred to Exposed Yard</a:t>
             </a:r>
             <a:endParaRPr lang="en-US" dirty="0"/>
           </a:p>
@@ -3201,7 +3201,7 @@
                   <a:sysClr val="windowText" lastClr="000000"/>
                 </a:solidFill>
               </a:rPr>
-              <a:t>               (when migratory group returns)	            (after 1 month exposure)</a:t>
+              <a:t>               (when migratory group returned)	            (after 1 month exposure)</a:t>
             </a:r>
           </a:p>
         </p:txBody>
@@ -3985,6 +3985,17 @@
                   <a:sysClr val="windowText" lastClr="000000"/>
                 </a:solidFill>
               </a:rPr>
+              <a:t>Isolated</a:t>
+            </a:r>
+          </a:p>
+          <a:p>
+            <a:pPr algn="ctr"/>
+            <a:r>
+              <a:rPr lang="en-US" sz="1400" dirty="0" smtClean="0">
+                <a:solidFill>
+                  <a:sysClr val="windowText" lastClr="000000"/>
+                </a:solidFill>
+              </a:rPr>
               <a:t>Stationary</a:t>
             </a:r>
           </a:p>
@@ -3997,17 +4008,6 @@
                 </a:solidFill>
               </a:rPr>
               <a:t>Group</a:t>
-            </a:r>
-          </a:p>
-          <a:p>
-            <a:pPr algn="ctr"/>
-            <a:r>
-              <a:rPr lang="en-US" sz="1400" i="1" dirty="0" smtClean="0">
-                <a:solidFill>
-                  <a:sysClr val="windowText" lastClr="000000"/>
-                </a:solidFill>
-              </a:rPr>
-              <a:t>(Control)</a:t>
             </a:r>
           </a:p>
         </p:txBody>
@@ -4118,7 +4118,18 @@
           <a:p>
             <a:pPr algn="ctr"/>
             <a:r>
-              <a:rPr lang="en-US" sz="1400" dirty="0" smtClean="0">
+              <a:rPr lang="en-US" sz="1400" dirty="0">
+                <a:solidFill>
+                  <a:sysClr val="windowText" lastClr="000000"/>
+                </a:solidFill>
+              </a:rPr>
+              <a:t>Isolated</a:t>
+            </a:r>
+          </a:p>
+          <a:p>
+            <a:pPr algn="ctr"/>
+            <a:r>
+              <a:rPr lang="en-US" sz="1400" dirty="0">
                 <a:solidFill>
                   <a:sysClr val="windowText" lastClr="000000"/>
                 </a:solidFill>
@@ -4129,23 +4140,12 @@
           <a:p>
             <a:pPr algn="ctr"/>
             <a:r>
-              <a:rPr lang="en-US" sz="1400" dirty="0" smtClean="0">
+              <a:rPr lang="en-US" sz="1400" dirty="0">
                 <a:solidFill>
                   <a:sysClr val="windowText" lastClr="000000"/>
                 </a:solidFill>
               </a:rPr>
               <a:t>Group</a:t>
-            </a:r>
-          </a:p>
-          <a:p>
-            <a:pPr algn="ctr"/>
-            <a:r>
-              <a:rPr lang="en-US" sz="1400" i="1" dirty="0" smtClean="0">
-                <a:solidFill>
-                  <a:sysClr val="windowText" lastClr="000000"/>
-                </a:solidFill>
-              </a:rPr>
-              <a:t>(Control)</a:t>
             </a:r>
           </a:p>
         </p:txBody>
@@ -4336,7 +4336,18 @@
           <a:p>
             <a:pPr algn="ctr"/>
             <a:r>
-              <a:rPr lang="en-US" sz="1400" dirty="0" smtClean="0">
+              <a:rPr lang="en-US" sz="1400" dirty="0">
+                <a:solidFill>
+                  <a:sysClr val="windowText" lastClr="000000"/>
+                </a:solidFill>
+              </a:rPr>
+              <a:t>Isolated</a:t>
+            </a:r>
+          </a:p>
+          <a:p>
+            <a:pPr algn="ctr"/>
+            <a:r>
+              <a:rPr lang="en-US" sz="1400" dirty="0">
                 <a:solidFill>
                   <a:sysClr val="windowText" lastClr="000000"/>
                 </a:solidFill>
@@ -4347,23 +4358,12 @@
           <a:p>
             <a:pPr algn="ctr"/>
             <a:r>
-              <a:rPr lang="en-US" sz="1400" dirty="0" smtClean="0">
+              <a:rPr lang="en-US" sz="1400" dirty="0">
                 <a:solidFill>
                   <a:sysClr val="windowText" lastClr="000000"/>
                 </a:solidFill>
               </a:rPr>
               <a:t>Group</a:t>
-            </a:r>
-          </a:p>
-          <a:p>
-            <a:pPr algn="ctr"/>
-            <a:r>
-              <a:rPr lang="en-US" sz="1400" i="1" dirty="0" smtClean="0">
-                <a:solidFill>
-                  <a:sysClr val="windowText" lastClr="000000"/>
-                </a:solidFill>
-              </a:rPr>
-              <a:t>(Control)</a:t>
             </a:r>
           </a:p>
         </p:txBody>
@@ -4447,7 +4447,7 @@
           <a:p>
             <a:r>
               <a:rPr lang="en-US" b="1" dirty="0" smtClean="0"/>
-              <a:t>= Sample</a:t>
+              <a:t>= Sampled</a:t>
             </a:r>
             <a:endParaRPr lang="en-US" b="1" dirty="0"/>
           </a:p>
@@ -4477,7 +4477,7 @@
           <a:p>
             <a:r>
               <a:rPr lang="en-US" b="1" dirty="0" smtClean="0"/>
-              <a:t>= Do Not Sample</a:t>
+              <a:t>= Not Sampled</a:t>
             </a:r>
             <a:endParaRPr lang="en-US" b="1" dirty="0"/>
           </a:p>
@@ -4807,7 +4807,7 @@
     </p:spTree>
     <p:extLst>
       <p:ext uri="{BB962C8B-B14F-4D97-AF65-F5344CB8AC3E}">
-        <p14:creationId xmlns:p14="http://schemas.microsoft.com/office/powerpoint/2010/main" val="2142239190"/>
+        <p14:creationId xmlns:p14="http://schemas.microsoft.com/office/powerpoint/2010/main" val="3978732107"/>
       </p:ext>
     </p:extLst>
   </p:cSld>
@@ -4861,23 +4861,7 @@
             </a:pPr>
             <a:r>
               <a:rPr lang="en-US" dirty="0" smtClean="0"/>
-              <a:t>Schematic showing experimental design. Three sampling events occur during the experiment. Green boxes represent each group of 16 hives sampled during the specified sampling event. Slashed red boxes represent each group of 16 hives not sampled during that sampling event. Three experimental groups (Stationary Group [control], Migratory Group, and Exposed Group) are spread across three separate yards throughout the experiment: The Stationary Yard (where all groups begin and the Stationary </a:t>
-            </a:r>
-            <a:r>
-              <a:rPr lang="en-US" dirty="0"/>
-              <a:t>G</a:t>
-            </a:r>
-            <a:r>
-              <a:rPr lang="en-US" dirty="0" smtClean="0"/>
-              <a:t>roup remains for the duration of the experiment), the Migratory Holding Yard (where the Migratory Group is temporarily brought upon return from CA for sampling event 2), and the Exposed Yard (where the Exposed </a:t>
-            </a:r>
-            <a:r>
-              <a:rPr lang="en-US" dirty="0"/>
-              <a:t>G</a:t>
-            </a:r>
-            <a:r>
-              <a:rPr lang="en-US" dirty="0" smtClean="0"/>
-              <a:t>roup is exposed to the Migratory Group). Arrows represent beekeeper tasks that occur between each sampling event.</a:t>
+              <a:t>Schematic showing experimental design. Three sampling events occurred during the experiment. Green boxes represent each group of 16 hives sampled during the specified sampling event. Slashed red boxes represent each group of 16 hives not sampled during that sampling event. Three experimental groups (Isolated Stationary Group, Migratory Group, and Exposed Group) are spread across three separate yards throughout the experiment: The Stationary Yard (where all groups begin and the Isolated Stationary Group remains for the duration of the experiment), the Migratory Holding Yard (where the Migratory Group is temporarily brought upon return from CA for sampling event 2), and the Exposed Yard (where the Exposed Group is exposed to the Migratory Group). Arrows represent tasks that occurred between each sampling event.</a:t>
             </a:r>
             <a:endParaRPr lang="en-US" dirty="0"/>
           </a:p>
@@ -4886,7 +4870,7 @@
     </p:spTree>
     <p:extLst>
       <p:ext uri="{BB962C8B-B14F-4D97-AF65-F5344CB8AC3E}">
-        <p14:creationId xmlns:p14="http://schemas.microsoft.com/office/powerpoint/2010/main" val="638618573"/>
+        <p14:creationId xmlns:p14="http://schemas.microsoft.com/office/powerpoint/2010/main" val="2573399430"/>
       </p:ext>
     </p:extLst>
   </p:cSld>
@@ -4978,7 +4962,7 @@
           </a:xfrm>
           <a:prstGeom prst="rightArrow">
             <a:avLst>
-              <a:gd name="adj1" fmla="val 60282"/>
+              <a:gd name="adj1" fmla="val 50000"/>
               <a:gd name="adj2" fmla="val 49422"/>
             </a:avLst>
           </a:prstGeom>
@@ -5006,27 +4990,7 @@
             <a:pPr algn="ctr"/>
             <a:r>
               <a:rPr lang="en-US" dirty="0" smtClean="0"/>
-              <a:t>Migratory </a:t>
-            </a:r>
-            <a:r>
-              <a:rPr lang="en-US" dirty="0" smtClean="0"/>
-              <a:t>Group </a:t>
-            </a:r>
-            <a:r>
-              <a:rPr lang="en-US" dirty="0" smtClean="0"/>
-              <a:t>transported to CA and returned </a:t>
-            </a:r>
-            <a:r>
-              <a:rPr lang="en-US" dirty="0" smtClean="0"/>
-              <a:t>to NC</a:t>
-            </a:r>
-            <a:r>
-              <a:rPr lang="en-US" dirty="0" smtClean="0"/>
-              <a:t>. Exposed Group transferred </a:t>
-            </a:r>
-            <a:r>
-              <a:rPr lang="en-US" dirty="0" smtClean="0"/>
-              <a:t>to Exposed Yard</a:t>
+              <a:t>Send Migratory Group to Almonds and Return to NC. Move Exposed Group to Exposed Yard</a:t>
             </a:r>
             <a:endParaRPr lang="en-US" dirty="0"/>
           </a:p>
@@ -5070,19 +5034,7 @@
             <a:pPr algn="ctr"/>
             <a:r>
               <a:rPr lang="en-US" dirty="0" smtClean="0"/>
-              <a:t>Migratory </a:t>
-            </a:r>
-            <a:r>
-              <a:rPr lang="en-US" dirty="0" smtClean="0"/>
-              <a:t>Group </a:t>
-            </a:r>
-            <a:r>
-              <a:rPr lang="en-US" dirty="0" smtClean="0"/>
-              <a:t>transferred to </a:t>
-            </a:r>
-            <a:r>
-              <a:rPr lang="en-US" dirty="0" smtClean="0"/>
-              <a:t>Exposed Yard</a:t>
+              <a:t>Move Migratory Group to Exposed Yard</a:t>
             </a:r>
             <a:endParaRPr lang="en-US" dirty="0"/>
           </a:p>
@@ -5179,23 +5131,7 @@
                   <a:sysClr val="windowText" lastClr="000000"/>
                 </a:solidFill>
               </a:rPr>
-              <a:t>               (when migratory group </a:t>
-            </a:r>
-            <a:r>
-              <a:rPr lang="en-US" i="1" dirty="0" smtClean="0">
-                <a:solidFill>
-                  <a:sysClr val="windowText" lastClr="000000"/>
-                </a:solidFill>
-              </a:rPr>
-              <a:t>returned)</a:t>
-            </a:r>
-            <a:r>
-              <a:rPr lang="en-US" i="1" dirty="0" smtClean="0">
-                <a:solidFill>
-                  <a:sysClr val="windowText" lastClr="000000"/>
-                </a:solidFill>
-              </a:rPr>
-              <a:t>	            (after 1 month exposure)</a:t>
+              <a:t>               (when migratory group returns)	            (after 1 month exposure)</a:t>
             </a:r>
           </a:p>
         </p:txBody>
@@ -5979,24 +5915,8 @@
                   <a:sysClr val="windowText" lastClr="000000"/>
                 </a:solidFill>
               </a:rPr>
-              <a:t>Isolated</a:t>
-            </a:r>
-          </a:p>
-          <a:p>
-            <a:pPr algn="ctr"/>
-            <a:r>
-              <a:rPr lang="en-US" sz="1400" dirty="0" smtClean="0">
-                <a:solidFill>
-                  <a:sysClr val="windowText" lastClr="000000"/>
-                </a:solidFill>
-              </a:rPr>
               <a:t>Stationary</a:t>
             </a:r>
-            <a:endParaRPr lang="en-US" sz="1400" dirty="0" smtClean="0">
-              <a:solidFill>
-                <a:sysClr val="windowText" lastClr="000000"/>
-              </a:solidFill>
-            </a:endParaRPr>
           </a:p>
           <a:p>
             <a:pPr algn="ctr"/>
@@ -6008,11 +5928,17 @@
               </a:rPr>
               <a:t>Group</a:t>
             </a:r>
-            <a:endParaRPr lang="en-US" sz="1400" dirty="0" smtClean="0">
-              <a:solidFill>
-                <a:sysClr val="windowText" lastClr="000000"/>
-              </a:solidFill>
-            </a:endParaRPr>
+          </a:p>
+          <a:p>
+            <a:pPr algn="ctr"/>
+            <a:r>
+              <a:rPr lang="en-US" sz="1400" i="1" dirty="0" smtClean="0">
+                <a:solidFill>
+                  <a:sysClr val="windowText" lastClr="000000"/>
+                </a:solidFill>
+              </a:rPr>
+              <a:t>(Control)</a:t>
+            </a:r>
           </a:p>
         </p:txBody>
       </p:sp>
@@ -6122,18 +6048,7 @@
           <a:p>
             <a:pPr algn="ctr"/>
             <a:r>
-              <a:rPr lang="en-US" sz="1400" dirty="0">
-                <a:solidFill>
-                  <a:sysClr val="windowText" lastClr="000000"/>
-                </a:solidFill>
-              </a:rPr>
-              <a:t>Isolated</a:t>
-            </a:r>
-          </a:p>
-          <a:p>
-            <a:pPr algn="ctr"/>
-            <a:r>
-              <a:rPr lang="en-US" sz="1400" dirty="0">
+              <a:rPr lang="en-US" sz="1400" dirty="0" smtClean="0">
                 <a:solidFill>
                   <a:sysClr val="windowText" lastClr="000000"/>
                 </a:solidFill>
@@ -6144,12 +6059,23 @@
           <a:p>
             <a:pPr algn="ctr"/>
             <a:r>
-              <a:rPr lang="en-US" sz="1400" dirty="0">
+              <a:rPr lang="en-US" sz="1400" dirty="0" smtClean="0">
                 <a:solidFill>
                   <a:sysClr val="windowText" lastClr="000000"/>
                 </a:solidFill>
               </a:rPr>
               <a:t>Group</a:t>
+            </a:r>
+          </a:p>
+          <a:p>
+            <a:pPr algn="ctr"/>
+            <a:r>
+              <a:rPr lang="en-US" sz="1400" i="1" dirty="0" smtClean="0">
+                <a:solidFill>
+                  <a:sysClr val="windowText" lastClr="000000"/>
+                </a:solidFill>
+              </a:rPr>
+              <a:t>(Control)</a:t>
             </a:r>
           </a:p>
         </p:txBody>
@@ -6340,18 +6266,7 @@
           <a:p>
             <a:pPr algn="ctr"/>
             <a:r>
-              <a:rPr lang="en-US" sz="1400" dirty="0">
-                <a:solidFill>
-                  <a:sysClr val="windowText" lastClr="000000"/>
-                </a:solidFill>
-              </a:rPr>
-              <a:t>Isolated</a:t>
-            </a:r>
-          </a:p>
-          <a:p>
-            <a:pPr algn="ctr"/>
-            <a:r>
-              <a:rPr lang="en-US" sz="1400" dirty="0">
+              <a:rPr lang="en-US" sz="1400" dirty="0" smtClean="0">
                 <a:solidFill>
                   <a:sysClr val="windowText" lastClr="000000"/>
                 </a:solidFill>
@@ -6362,12 +6277,23 @@
           <a:p>
             <a:pPr algn="ctr"/>
             <a:r>
-              <a:rPr lang="en-US" sz="1400" dirty="0">
+              <a:rPr lang="en-US" sz="1400" dirty="0" smtClean="0">
                 <a:solidFill>
                   <a:sysClr val="windowText" lastClr="000000"/>
                 </a:solidFill>
               </a:rPr>
               <a:t>Group</a:t>
+            </a:r>
+          </a:p>
+          <a:p>
+            <a:pPr algn="ctr"/>
+            <a:r>
+              <a:rPr lang="en-US" sz="1400" i="1" dirty="0" smtClean="0">
+                <a:solidFill>
+                  <a:sysClr val="windowText" lastClr="000000"/>
+                </a:solidFill>
+              </a:rPr>
+              <a:t>(Control)</a:t>
             </a:r>
           </a:p>
         </p:txBody>
@@ -6451,11 +6377,7 @@
           <a:p>
             <a:r>
               <a:rPr lang="en-US" b="1" dirty="0" smtClean="0"/>
-              <a:t>= </a:t>
-            </a:r>
-            <a:r>
-              <a:rPr lang="en-US" b="1" dirty="0" smtClean="0"/>
-              <a:t>Sampled</a:t>
+              <a:t>= Sample</a:t>
             </a:r>
             <a:endParaRPr lang="en-US" b="1" dirty="0"/>
           </a:p>
@@ -6485,11 +6407,7 @@
           <a:p>
             <a:r>
               <a:rPr lang="en-US" b="1" dirty="0" smtClean="0"/>
-              <a:t>= </a:t>
-            </a:r>
-            <a:r>
-              <a:rPr lang="en-US" b="1" dirty="0" smtClean="0"/>
-              <a:t>Not Sampled</a:t>
+              <a:t>= Do Not Sample</a:t>
             </a:r>
             <a:endParaRPr lang="en-US" b="1" dirty="0"/>
           </a:p>
@@ -6819,7 +6737,7 @@
     </p:spTree>
     <p:extLst>
       <p:ext uri="{BB962C8B-B14F-4D97-AF65-F5344CB8AC3E}">
-        <p14:creationId xmlns:p14="http://schemas.microsoft.com/office/powerpoint/2010/main" val="3978732107"/>
+        <p14:creationId xmlns:p14="http://schemas.microsoft.com/office/powerpoint/2010/main" val="2142239190"/>
       </p:ext>
     </p:extLst>
   </p:cSld>
@@ -6873,7 +6791,23 @@
             </a:pPr>
             <a:r>
               <a:rPr lang="en-US" dirty="0" smtClean="0"/>
-              <a:t>Schematic showing experimental design. Three sampling events occurred during the experiment. Green boxes represent each group of 16 hives sampled during the specified sampling event. Slashed red boxes represent each group of 16 hives not sampled during that sampling event. Three experimental groups (Isolated Stationary Group, Migratory Group, and Exposed Group) are spread across three separate yards throughout the experiment: The Stationary Yard (where all groups begin and the Isolated Stationary Group remains for the duration of the experiment), the Migratory Holding Yard (where the Migratory Group is temporarily brought upon return from CA for sampling event 2), and the Exposed Yard (where the Exposed Group is exposed to the Migratory Group). Arrows represent tasks that occurred between each sampling event.</a:t>
+              <a:t>Schematic showing experimental design. Three sampling events occur during the experiment. Green boxes represent each group of 16 hives sampled during the specified sampling event. Slashed red boxes represent each group of 16 hives not sampled during that sampling event. Three experimental groups (Stationary Group [control], Migratory Group, and Exposed Group) are spread across three separate yards throughout the experiment: The Stationary Yard (where all groups begin and the Stationary </a:t>
+            </a:r>
+            <a:r>
+              <a:rPr lang="en-US" dirty="0"/>
+              <a:t>G</a:t>
+            </a:r>
+            <a:r>
+              <a:rPr lang="en-US" dirty="0" smtClean="0"/>
+              <a:t>roup remains for the duration of the experiment), the Migratory Holding Yard (where the Migratory Group is temporarily brought upon return from CA for sampling event 2), and the Exposed Yard (where the Exposed </a:t>
+            </a:r>
+            <a:r>
+              <a:rPr lang="en-US" dirty="0"/>
+              <a:t>G</a:t>
+            </a:r>
+            <a:r>
+              <a:rPr lang="en-US" dirty="0" smtClean="0"/>
+              <a:t>roup is exposed to the Migratory Group). Arrows represent beekeeper tasks that occur between each sampling event.</a:t>
             </a:r>
             <a:endParaRPr lang="en-US" dirty="0"/>
           </a:p>
@@ -6882,7 +6816,7 @@
     </p:spTree>
     <p:extLst>
       <p:ext uri="{BB962C8B-B14F-4D97-AF65-F5344CB8AC3E}">
-        <p14:creationId xmlns:p14="http://schemas.microsoft.com/office/powerpoint/2010/main" val="2573399430"/>
+        <p14:creationId xmlns:p14="http://schemas.microsoft.com/office/powerpoint/2010/main" val="638618573"/>
       </p:ext>
     </p:extLst>
   </p:cSld>
@@ -7147,7 +7081,7 @@
   <a:extraClrSchemeLst/>
   <a:extLst>
     <a:ext uri="{05A4C25C-085E-4340-85A3-A5531E510DB2}">
-      <thm15:themeFamily xmlns="" xmlns:thm15="http://schemas.microsoft.com/office/thememl/2012/main" name="Office Theme" id="{62F939B6-93AF-4DB8-9C6B-D6C7DFDC589F}" vid="{4A3C46E8-61CC-4603-A589-7422A47A8E4A}"/>
+      <thm15:themeFamily xmlns:thm15="http://schemas.microsoft.com/office/thememl/2012/main" xmlns="" name="Office Theme" id="{62F939B6-93AF-4DB8-9C6B-D6C7DFDC589F}" vid="{4A3C46E8-61CC-4603-A589-7422A47A8E4A}"/>
     </a:ext>
   </a:extLst>
 </a:theme>

</xml_diff>

<commit_message>
mig and ross updates
</commit_message>
<xml_diff>
--- a/MigratoryStationary/DesignSchematic/Mig:Sta_Experiment_Schem .pptx
+++ b/MigratoryStationary/DesignSchematic/Mig:Sta_Experiment_Schem .pptx
@@ -5,10 +5,11 @@
     <p:sldMasterId id="2147483648" r:id="rId1"/>
   </p:sldMasterIdLst>
   <p:sldIdLst>
-    <p:sldId id="259" r:id="rId2"/>
-    <p:sldId id="260" r:id="rId3"/>
-    <p:sldId id="257" r:id="rId4"/>
-    <p:sldId id="258" r:id="rId5"/>
+    <p:sldId id="261" r:id="rId2"/>
+    <p:sldId id="259" r:id="rId3"/>
+    <p:sldId id="260" r:id="rId4"/>
+    <p:sldId id="257" r:id="rId5"/>
+    <p:sldId id="258" r:id="rId6"/>
   </p:sldIdLst>
   <p:sldSz cx="12192000" cy="6858000"/>
   <p:notesSz cx="6858000" cy="9144000"/>
@@ -241,7 +242,7 @@
           <a:p>
             <a:fld id="{31CDC68C-EC45-C548-8159-BEDE9C5987EE}" type="datetimeFigureOut">
               <a:rPr lang="en-US" smtClean="0"/>
-              <a:t>10/4/17</a:t>
+              <a:t>10/27/17</a:t>
             </a:fld>
             <a:endParaRPr lang="en-US"/>
           </a:p>
@@ -411,7 +412,7 @@
           <a:p>
             <a:fld id="{31CDC68C-EC45-C548-8159-BEDE9C5987EE}" type="datetimeFigureOut">
               <a:rPr lang="en-US" smtClean="0"/>
-              <a:t>10/4/17</a:t>
+              <a:t>10/27/17</a:t>
             </a:fld>
             <a:endParaRPr lang="en-US"/>
           </a:p>
@@ -591,7 +592,7 @@
           <a:p>
             <a:fld id="{31CDC68C-EC45-C548-8159-BEDE9C5987EE}" type="datetimeFigureOut">
               <a:rPr lang="en-US" smtClean="0"/>
-              <a:t>10/4/17</a:t>
+              <a:t>10/27/17</a:t>
             </a:fld>
             <a:endParaRPr lang="en-US"/>
           </a:p>
@@ -761,7 +762,7 @@
           <a:p>
             <a:fld id="{31CDC68C-EC45-C548-8159-BEDE9C5987EE}" type="datetimeFigureOut">
               <a:rPr lang="en-US" smtClean="0"/>
-              <a:t>10/4/17</a:t>
+              <a:t>10/27/17</a:t>
             </a:fld>
             <a:endParaRPr lang="en-US"/>
           </a:p>
@@ -1007,7 +1008,7 @@
           <a:p>
             <a:fld id="{31CDC68C-EC45-C548-8159-BEDE9C5987EE}" type="datetimeFigureOut">
               <a:rPr lang="en-US" smtClean="0"/>
-              <a:t>10/4/17</a:t>
+              <a:t>10/27/17</a:t>
             </a:fld>
             <a:endParaRPr lang="en-US"/>
           </a:p>
@@ -1239,7 +1240,7 @@
           <a:p>
             <a:fld id="{31CDC68C-EC45-C548-8159-BEDE9C5987EE}" type="datetimeFigureOut">
               <a:rPr lang="en-US" smtClean="0"/>
-              <a:t>10/4/17</a:t>
+              <a:t>10/27/17</a:t>
             </a:fld>
             <a:endParaRPr lang="en-US"/>
           </a:p>
@@ -1606,7 +1607,7 @@
           <a:p>
             <a:fld id="{31CDC68C-EC45-C548-8159-BEDE9C5987EE}" type="datetimeFigureOut">
               <a:rPr lang="en-US" smtClean="0"/>
-              <a:t>10/4/17</a:t>
+              <a:t>10/27/17</a:t>
             </a:fld>
             <a:endParaRPr lang="en-US"/>
           </a:p>
@@ -1724,7 +1725,7 @@
           <a:p>
             <a:fld id="{31CDC68C-EC45-C548-8159-BEDE9C5987EE}" type="datetimeFigureOut">
               <a:rPr lang="en-US" smtClean="0"/>
-              <a:t>10/4/17</a:t>
+              <a:t>10/27/17</a:t>
             </a:fld>
             <a:endParaRPr lang="en-US"/>
           </a:p>
@@ -1819,7 +1820,7 @@
           <a:p>
             <a:fld id="{31CDC68C-EC45-C548-8159-BEDE9C5987EE}" type="datetimeFigureOut">
               <a:rPr lang="en-US" smtClean="0"/>
-              <a:t>10/4/17</a:t>
+              <a:t>10/27/17</a:t>
             </a:fld>
             <a:endParaRPr lang="en-US"/>
           </a:p>
@@ -2096,7 +2097,7 @@
           <a:p>
             <a:fld id="{31CDC68C-EC45-C548-8159-BEDE9C5987EE}" type="datetimeFigureOut">
               <a:rPr lang="en-US" smtClean="0"/>
-              <a:t>10/4/17</a:t>
+              <a:t>10/27/17</a:t>
             </a:fld>
             <a:endParaRPr lang="en-US"/>
           </a:p>
@@ -2349,7 +2350,7 @@
           <a:p>
             <a:fld id="{31CDC68C-EC45-C548-8159-BEDE9C5987EE}" type="datetimeFigureOut">
               <a:rPr lang="en-US" smtClean="0"/>
-              <a:t>10/4/17</a:t>
+              <a:t>10/27/17</a:t>
             </a:fld>
             <a:endParaRPr lang="en-US"/>
           </a:p>
@@ -2562,7 +2563,7 @@
           <a:p>
             <a:fld id="{31CDC68C-EC45-C548-8159-BEDE9C5987EE}" type="datetimeFigureOut">
               <a:rPr lang="en-US" smtClean="0"/>
-              <a:t>10/4/17</a:t>
+              <a:t>10/27/17</a:t>
             </a:fld>
             <a:endParaRPr lang="en-US"/>
           </a:p>
@@ -2969,14 +2970,208 @@
       </p:grpSpPr>
       <p:sp>
         <p:nvSpPr>
-          <p:cNvPr id="5" name="Rectangle 4"/>
+          <p:cNvPr id="19" name="Rectangle 18"/>
           <p:cNvSpPr/>
           <p:nvPr/>
         </p:nvSpPr>
         <p:spPr>
           <a:xfrm>
-            <a:off x="352424" y="5751665"/>
-            <a:ext cx="2255577" cy="995826"/>
+            <a:off x="299952" y="469917"/>
+            <a:ext cx="11418628" cy="677876"/>
+          </a:xfrm>
+          <a:prstGeom prst="rect">
+            <a:avLst/>
+          </a:prstGeom>
+          <a:solidFill>
+            <a:schemeClr val="bg2"/>
+          </a:solidFill>
+          <a:ln w="19050">
+            <a:solidFill>
+              <a:schemeClr val="tx1"/>
+            </a:solidFill>
+          </a:ln>
+        </p:spPr>
+        <p:style>
+          <a:lnRef idx="2">
+            <a:schemeClr val="accent1">
+              <a:shade val="50000"/>
+            </a:schemeClr>
+          </a:lnRef>
+          <a:fillRef idx="1">
+            <a:schemeClr val="accent1"/>
+          </a:fillRef>
+          <a:effectRef idx="0">
+            <a:schemeClr val="accent1"/>
+          </a:effectRef>
+          <a:fontRef idx="minor">
+            <a:schemeClr val="lt1"/>
+          </a:fontRef>
+        </p:style>
+        <p:txBody>
+          <a:bodyPr rtlCol="0" anchor="ctr"/>
+          <a:lstStyle/>
+          <a:p>
+            <a:r>
+              <a:rPr lang="en-US" b="1" dirty="0" smtClean="0">
+                <a:solidFill>
+                  <a:sysClr val="windowText" lastClr="000000"/>
+                </a:solidFill>
+              </a:rPr>
+              <a:t>   Sampling Event 1			                          Sampling Event 2  		</a:t>
+            </a:r>
+            <a:r>
+              <a:rPr lang="en-US" b="1" dirty="0">
+                <a:solidFill>
+                  <a:sysClr val="windowText" lastClr="000000"/>
+                </a:solidFill>
+              </a:rPr>
+              <a:t> </a:t>
+            </a:r>
+            <a:r>
+              <a:rPr lang="en-US" b="1" dirty="0" smtClean="0">
+                <a:solidFill>
+                  <a:sysClr val="windowText" lastClr="000000"/>
+                </a:solidFill>
+              </a:rPr>
+              <a:t>                   Sampling Event 3</a:t>
+            </a:r>
+          </a:p>
+          <a:p>
+            <a:r>
+              <a:rPr lang="en-US" dirty="0">
+                <a:solidFill>
+                  <a:sysClr val="windowText" lastClr="000000"/>
+                </a:solidFill>
+              </a:rPr>
+              <a:t>	</a:t>
+            </a:r>
+            <a:r>
+              <a:rPr lang="en-US" dirty="0" smtClean="0">
+                <a:solidFill>
+                  <a:sysClr val="windowText" lastClr="000000"/>
+                </a:solidFill>
+              </a:rPr>
+              <a:t>			</a:t>
+            </a:r>
+            <a:r>
+              <a:rPr lang="en-US" i="1" dirty="0" smtClean="0">
+                <a:solidFill>
+                  <a:sysClr val="windowText" lastClr="000000"/>
+                </a:solidFill>
+              </a:rPr>
+              <a:t>               (when migratory group returned)	            (after 1 month exposure)</a:t>
+            </a:r>
+          </a:p>
+        </p:txBody>
+      </p:sp>
+      <p:grpSp>
+        <p:nvGrpSpPr>
+          <p:cNvPr id="6" name="Group 5"/>
+          <p:cNvGrpSpPr/>
+          <p:nvPr/>
+        </p:nvGrpSpPr>
+        <p:grpSpPr>
+          <a:xfrm>
+            <a:off x="299952" y="4773331"/>
+            <a:ext cx="2317060" cy="1264345"/>
+            <a:chOff x="352423" y="5737519"/>
+            <a:chExt cx="2255578" cy="1009972"/>
+          </a:xfrm>
+        </p:grpSpPr>
+        <p:sp>
+          <p:nvSpPr>
+            <p:cNvPr id="5" name="Rectangle 4"/>
+            <p:cNvSpPr/>
+            <p:nvPr/>
+          </p:nvSpPr>
+          <p:spPr>
+            <a:xfrm>
+              <a:off x="352424" y="5751665"/>
+              <a:ext cx="2255577" cy="995826"/>
+            </a:xfrm>
+            <a:prstGeom prst="rect">
+              <a:avLst/>
+            </a:prstGeom>
+            <a:solidFill>
+              <a:schemeClr val="bg1"/>
+            </a:solidFill>
+            <a:ln w="19050">
+              <a:solidFill>
+                <a:schemeClr val="tx1"/>
+              </a:solidFill>
+            </a:ln>
+          </p:spPr>
+          <p:style>
+            <a:lnRef idx="2">
+              <a:schemeClr val="accent1">
+                <a:shade val="50000"/>
+              </a:schemeClr>
+            </a:lnRef>
+            <a:fillRef idx="1">
+              <a:schemeClr val="accent1"/>
+            </a:fillRef>
+            <a:effectRef idx="0">
+              <a:schemeClr val="accent1"/>
+            </a:effectRef>
+            <a:fontRef idx="minor">
+              <a:schemeClr val="lt1"/>
+            </a:fontRef>
+          </p:style>
+          <p:txBody>
+            <a:bodyPr rtlCol="0" anchor="ctr"/>
+            <a:lstStyle/>
+            <a:p>
+              <a:pPr algn="ctr"/>
+              <a:endParaRPr lang="en-US" dirty="0">
+                <a:solidFill>
+                  <a:sysClr val="windowText" lastClr="000000"/>
+                </a:solidFill>
+              </a:endParaRPr>
+            </a:p>
+          </p:txBody>
+        </p:sp>
+        <p:sp>
+          <p:nvSpPr>
+            <p:cNvPr id="30" name="TextBox 29"/>
+            <p:cNvSpPr txBox="1"/>
+            <p:nvPr/>
+          </p:nvSpPr>
+          <p:spPr>
+            <a:xfrm>
+              <a:off x="352423" y="5737519"/>
+              <a:ext cx="2255577" cy="369332"/>
+            </a:xfrm>
+            <a:prstGeom prst="rect">
+              <a:avLst/>
+            </a:prstGeom>
+            <a:noFill/>
+          </p:spPr>
+          <p:txBody>
+            <a:bodyPr wrap="square" rtlCol="0">
+              <a:spAutoFit/>
+            </a:bodyPr>
+            <a:lstStyle/>
+            <a:p>
+              <a:pPr algn="ctr"/>
+              <a:r>
+                <a:rPr lang="en-US" dirty="0" smtClean="0"/>
+                <a:t>EXPOSED YARD</a:t>
+              </a:r>
+              <a:endParaRPr lang="en-US" dirty="0"/>
+            </a:p>
+          </p:txBody>
+        </p:sp>
+      </p:grpSp>
+      <p:sp>
+        <p:nvSpPr>
+          <p:cNvPr id="26" name="Rectangle 25"/>
+          <p:cNvSpPr/>
+          <p:nvPr/>
+        </p:nvSpPr>
+        <p:spPr>
+          <a:xfrm>
+            <a:off x="5133191" y="1555711"/>
+            <a:ext cx="2262697" cy="2192661"/>
           </a:xfrm>
           <a:prstGeom prst="rect">
             <a:avLst/>
@@ -3021,201 +3216,14 @@
       </p:sp>
       <p:sp>
         <p:nvSpPr>
-          <p:cNvPr id="17" name="Right Arrow 16"/>
-          <p:cNvSpPr/>
-          <p:nvPr/>
-        </p:nvSpPr>
-        <p:spPr>
-          <a:xfrm>
-            <a:off x="2654845" y="2686050"/>
-            <a:ext cx="2473585" cy="3671888"/>
-          </a:xfrm>
-          <a:prstGeom prst="rightArrow">
-            <a:avLst>
-              <a:gd name="adj1" fmla="val 60282"/>
-              <a:gd name="adj2" fmla="val 49422"/>
-            </a:avLst>
-          </a:prstGeom>
-        </p:spPr>
-        <p:style>
-          <a:lnRef idx="2">
-            <a:schemeClr val="accent1">
-              <a:shade val="50000"/>
-            </a:schemeClr>
-          </a:lnRef>
-          <a:fillRef idx="1">
-            <a:schemeClr val="accent1"/>
-          </a:fillRef>
-          <a:effectRef idx="0">
-            <a:schemeClr val="accent1"/>
-          </a:effectRef>
-          <a:fontRef idx="minor">
-            <a:schemeClr val="lt1"/>
-          </a:fontRef>
-        </p:style>
-        <p:txBody>
-          <a:bodyPr rtlCol="0" anchor="ctr"/>
-          <a:lstStyle/>
-          <a:p>
-            <a:pPr algn="ctr"/>
-            <a:r>
-              <a:rPr lang="en-US" dirty="0" smtClean="0"/>
-              <a:t>Migratory Group transported to CA and returned to NC. Exposed Group transferred to Exposed Yard</a:t>
-            </a:r>
-            <a:endParaRPr lang="en-US" dirty="0"/>
-          </a:p>
-        </p:txBody>
-      </p:sp>
-      <p:sp>
-        <p:nvSpPr>
-          <p:cNvPr id="18" name="Right Arrow 17"/>
-          <p:cNvSpPr/>
-          <p:nvPr/>
-        </p:nvSpPr>
-        <p:spPr>
-          <a:xfrm>
-            <a:off x="7499875" y="2686050"/>
-            <a:ext cx="2005557" cy="3671888"/>
-          </a:xfrm>
-          <a:prstGeom prst="rightArrow">
-            <a:avLst/>
-          </a:prstGeom>
-        </p:spPr>
-        <p:style>
-          <a:lnRef idx="2">
-            <a:schemeClr val="accent1">
-              <a:shade val="50000"/>
-            </a:schemeClr>
-          </a:lnRef>
-          <a:fillRef idx="1">
-            <a:schemeClr val="accent1"/>
-          </a:fillRef>
-          <a:effectRef idx="0">
-            <a:schemeClr val="accent1"/>
-          </a:effectRef>
-          <a:fontRef idx="minor">
-            <a:schemeClr val="lt1"/>
-          </a:fontRef>
-        </p:style>
-        <p:txBody>
-          <a:bodyPr rtlCol="0" anchor="ctr"/>
-          <a:lstStyle/>
-          <a:p>
-            <a:pPr algn="ctr"/>
-            <a:r>
-              <a:rPr lang="en-US" dirty="0" smtClean="0"/>
-              <a:t>Migratory Group transferred to Exposed Yard</a:t>
-            </a:r>
-            <a:endParaRPr lang="en-US" dirty="0"/>
-          </a:p>
-        </p:txBody>
-      </p:sp>
-      <p:sp>
-        <p:nvSpPr>
-          <p:cNvPr id="19" name="Rectangle 18"/>
-          <p:cNvSpPr/>
-          <p:nvPr/>
-        </p:nvSpPr>
-        <p:spPr>
-          <a:xfrm>
-            <a:off x="359568" y="1435117"/>
-            <a:ext cx="11418628" cy="677876"/>
-          </a:xfrm>
-          <a:prstGeom prst="rect">
-            <a:avLst/>
-          </a:prstGeom>
-          <a:solidFill>
-            <a:schemeClr val="bg2"/>
-          </a:solidFill>
-          <a:ln w="19050">
-            <a:solidFill>
-              <a:schemeClr val="tx1"/>
-            </a:solidFill>
-          </a:ln>
-        </p:spPr>
-        <p:style>
-          <a:lnRef idx="2">
-            <a:schemeClr val="accent1">
-              <a:shade val="50000"/>
-            </a:schemeClr>
-          </a:lnRef>
-          <a:fillRef idx="1">
-            <a:schemeClr val="accent1"/>
-          </a:fillRef>
-          <a:effectRef idx="0">
-            <a:schemeClr val="accent1"/>
-          </a:effectRef>
-          <a:fontRef idx="minor">
-            <a:schemeClr val="lt1"/>
-          </a:fontRef>
-        </p:style>
-        <p:txBody>
-          <a:bodyPr rtlCol="0" anchor="ctr"/>
-          <a:lstStyle/>
-          <a:p>
-            <a:r>
-              <a:rPr lang="en-US" b="1" dirty="0" smtClean="0">
-                <a:solidFill>
-                  <a:sysClr val="windowText" lastClr="000000"/>
-                </a:solidFill>
-              </a:rPr>
-              <a:t>   Sampling Event 1			                          Sampling Event 2  		</a:t>
-            </a:r>
-            <a:r>
-              <a:rPr lang="en-US" b="1" dirty="0">
-                <a:solidFill>
-                  <a:sysClr val="windowText" lastClr="000000"/>
-                </a:solidFill>
-              </a:rPr>
-              <a:t> </a:t>
-            </a:r>
-            <a:r>
-              <a:rPr lang="en-US" b="1" dirty="0" smtClean="0">
-                <a:solidFill>
-                  <a:sysClr val="windowText" lastClr="000000"/>
-                </a:solidFill>
-              </a:rPr>
-              <a:t>                   Sampling Event 3</a:t>
-            </a:r>
-          </a:p>
-          <a:p>
-            <a:r>
-              <a:rPr lang="en-US" dirty="0">
-                <a:solidFill>
-                  <a:sysClr val="windowText" lastClr="000000"/>
-                </a:solidFill>
-              </a:rPr>
-              <a:t>	</a:t>
-            </a:r>
-            <a:r>
-              <a:rPr lang="en-US" dirty="0" smtClean="0">
-                <a:solidFill>
-                  <a:sysClr val="windowText" lastClr="000000"/>
-                </a:solidFill>
-              </a:rPr>
-              <a:t>			</a:t>
-            </a:r>
-            <a:r>
-              <a:rPr lang="en-US" i="1" dirty="0" smtClean="0">
-                <a:solidFill>
-                  <a:sysClr val="windowText" lastClr="000000"/>
-                </a:solidFill>
-              </a:rPr>
-              <a:t>               (when migratory group returned)	            (after 1 month exposure)</a:t>
-            </a:r>
-          </a:p>
-        </p:txBody>
-      </p:sp>
-      <p:sp>
-        <p:nvSpPr>
-          <p:cNvPr id="20" name="TextBox 19"/>
+          <p:cNvPr id="35" name="TextBox 34"/>
           <p:cNvSpPr txBox="1"/>
           <p:nvPr/>
         </p:nvSpPr>
         <p:spPr>
           <a:xfrm>
-            <a:off x="1109100" y="32267"/>
-            <a:ext cx="10410097" cy="523220"/>
+            <a:off x="5140357" y="1555711"/>
+            <a:ext cx="2262697" cy="368789"/>
           </a:xfrm>
           <a:prstGeom prst="rect">
             <a:avLst/>
@@ -3230,484 +3238,6 @@
           <a:p>
             <a:pPr algn="ctr"/>
             <a:r>
-              <a:rPr lang="en-US" sz="2800" dirty="0" smtClean="0"/>
-              <a:t>Experimental Design for Migratory/Stationary Honey Bee Experiment </a:t>
-            </a:r>
-            <a:endParaRPr lang="en-US" sz="2800" dirty="0"/>
-          </a:p>
-        </p:txBody>
-      </p:sp>
-      <p:sp>
-        <p:nvSpPr>
-          <p:cNvPr id="21" name="Rectangle 20"/>
-          <p:cNvSpPr/>
-          <p:nvPr/>
-        </p:nvSpPr>
-        <p:spPr>
-          <a:xfrm>
-            <a:off x="352425" y="3422326"/>
-            <a:ext cx="2255577" cy="2192661"/>
-          </a:xfrm>
-          <a:prstGeom prst="rect">
-            <a:avLst/>
-          </a:prstGeom>
-          <a:solidFill>
-            <a:schemeClr val="bg1"/>
-          </a:solidFill>
-          <a:ln w="19050">
-            <a:solidFill>
-              <a:schemeClr val="tx1"/>
-            </a:solidFill>
-          </a:ln>
-        </p:spPr>
-        <p:style>
-          <a:lnRef idx="2">
-            <a:schemeClr val="accent1">
-              <a:shade val="50000"/>
-            </a:schemeClr>
-          </a:lnRef>
-          <a:fillRef idx="1">
-            <a:schemeClr val="accent1"/>
-          </a:fillRef>
-          <a:effectRef idx="0">
-            <a:schemeClr val="accent1"/>
-          </a:effectRef>
-          <a:fontRef idx="minor">
-            <a:schemeClr val="lt1"/>
-          </a:fontRef>
-        </p:style>
-        <p:txBody>
-          <a:bodyPr rtlCol="0" anchor="ctr"/>
-          <a:lstStyle/>
-          <a:p>
-            <a:pPr algn="ctr"/>
-            <a:endParaRPr lang="en-US" dirty="0">
-              <a:solidFill>
-                <a:sysClr val="windowText" lastClr="000000"/>
-              </a:solidFill>
-            </a:endParaRPr>
-          </a:p>
-        </p:txBody>
-      </p:sp>
-      <p:sp>
-        <p:nvSpPr>
-          <p:cNvPr id="22" name="Rectangle 21"/>
-          <p:cNvSpPr/>
-          <p:nvPr/>
-        </p:nvSpPr>
-        <p:spPr>
-          <a:xfrm>
-            <a:off x="352425" y="2197588"/>
-            <a:ext cx="2255577" cy="1094565"/>
-          </a:xfrm>
-          <a:prstGeom prst="rect">
-            <a:avLst/>
-          </a:prstGeom>
-          <a:solidFill>
-            <a:schemeClr val="bg1"/>
-          </a:solidFill>
-          <a:ln w="19050">
-            <a:solidFill>
-              <a:schemeClr val="tx1"/>
-            </a:solidFill>
-          </a:ln>
-        </p:spPr>
-        <p:style>
-          <a:lnRef idx="2">
-            <a:schemeClr val="accent1">
-              <a:shade val="50000"/>
-            </a:schemeClr>
-          </a:lnRef>
-          <a:fillRef idx="1">
-            <a:schemeClr val="accent1"/>
-          </a:fillRef>
-          <a:effectRef idx="0">
-            <a:schemeClr val="accent1"/>
-          </a:effectRef>
-          <a:fontRef idx="minor">
-            <a:schemeClr val="lt1"/>
-          </a:fontRef>
-        </p:style>
-        <p:txBody>
-          <a:bodyPr rtlCol="0" anchor="ctr"/>
-          <a:lstStyle/>
-          <a:p>
-            <a:pPr algn="ctr"/>
-            <a:endParaRPr lang="en-US" dirty="0">
-              <a:solidFill>
-                <a:sysClr val="windowText" lastClr="000000"/>
-              </a:solidFill>
-            </a:endParaRPr>
-          </a:p>
-        </p:txBody>
-      </p:sp>
-      <p:sp>
-        <p:nvSpPr>
-          <p:cNvPr id="23" name="Rectangle 22"/>
-          <p:cNvSpPr/>
-          <p:nvPr/>
-        </p:nvSpPr>
-        <p:spPr>
-          <a:xfrm>
-            <a:off x="5186365" y="5382334"/>
-            <a:ext cx="2255577" cy="1365157"/>
-          </a:xfrm>
-          <a:prstGeom prst="rect">
-            <a:avLst/>
-          </a:prstGeom>
-          <a:solidFill>
-            <a:schemeClr val="bg1"/>
-          </a:solidFill>
-          <a:ln w="19050">
-            <a:solidFill>
-              <a:schemeClr val="tx1"/>
-            </a:solidFill>
-          </a:ln>
-        </p:spPr>
-        <p:style>
-          <a:lnRef idx="2">
-            <a:schemeClr val="accent1">
-              <a:shade val="50000"/>
-            </a:schemeClr>
-          </a:lnRef>
-          <a:fillRef idx="1">
-            <a:schemeClr val="accent1"/>
-          </a:fillRef>
-          <a:effectRef idx="0">
-            <a:schemeClr val="accent1"/>
-          </a:effectRef>
-          <a:fontRef idx="minor">
-            <a:schemeClr val="lt1"/>
-          </a:fontRef>
-        </p:style>
-        <p:txBody>
-          <a:bodyPr rtlCol="0" anchor="ctr"/>
-          <a:lstStyle/>
-          <a:p>
-            <a:pPr algn="ctr"/>
-            <a:endParaRPr lang="en-US" dirty="0">
-              <a:solidFill>
-                <a:sysClr val="windowText" lastClr="000000"/>
-              </a:solidFill>
-            </a:endParaRPr>
-          </a:p>
-        </p:txBody>
-      </p:sp>
-      <p:sp>
-        <p:nvSpPr>
-          <p:cNvPr id="24" name="Rectangle 23"/>
-          <p:cNvSpPr/>
-          <p:nvPr/>
-        </p:nvSpPr>
-        <p:spPr>
-          <a:xfrm>
-            <a:off x="5186365" y="3789961"/>
-            <a:ext cx="2255577" cy="1365157"/>
-          </a:xfrm>
-          <a:prstGeom prst="rect">
-            <a:avLst/>
-          </a:prstGeom>
-          <a:solidFill>
-            <a:schemeClr val="bg1"/>
-          </a:solidFill>
-          <a:ln w="19050">
-            <a:solidFill>
-              <a:schemeClr val="tx1"/>
-            </a:solidFill>
-          </a:ln>
-        </p:spPr>
-        <p:style>
-          <a:lnRef idx="2">
-            <a:schemeClr val="accent1">
-              <a:shade val="50000"/>
-            </a:schemeClr>
-          </a:lnRef>
-          <a:fillRef idx="1">
-            <a:schemeClr val="accent1"/>
-          </a:fillRef>
-          <a:effectRef idx="0">
-            <a:schemeClr val="accent1"/>
-          </a:effectRef>
-          <a:fontRef idx="minor">
-            <a:schemeClr val="lt1"/>
-          </a:fontRef>
-        </p:style>
-        <p:txBody>
-          <a:bodyPr rtlCol="0" anchor="ctr"/>
-          <a:lstStyle/>
-          <a:p>
-            <a:pPr algn="ctr"/>
-            <a:endParaRPr lang="en-US" dirty="0">
-              <a:solidFill>
-                <a:sysClr val="windowText" lastClr="000000"/>
-              </a:solidFill>
-            </a:endParaRPr>
-          </a:p>
-        </p:txBody>
-      </p:sp>
-      <p:sp>
-        <p:nvSpPr>
-          <p:cNvPr id="25" name="Rectangle 24"/>
-          <p:cNvSpPr/>
-          <p:nvPr/>
-        </p:nvSpPr>
-        <p:spPr>
-          <a:xfrm>
-            <a:off x="5186365" y="2197587"/>
-            <a:ext cx="2255577" cy="1365157"/>
-          </a:xfrm>
-          <a:prstGeom prst="rect">
-            <a:avLst/>
-          </a:prstGeom>
-          <a:solidFill>
-            <a:schemeClr val="bg1"/>
-          </a:solidFill>
-          <a:ln w="19050">
-            <a:solidFill>
-              <a:schemeClr val="tx1"/>
-            </a:solidFill>
-          </a:ln>
-        </p:spPr>
-        <p:style>
-          <a:lnRef idx="2">
-            <a:schemeClr val="accent1">
-              <a:shade val="50000"/>
-            </a:schemeClr>
-          </a:lnRef>
-          <a:fillRef idx="1">
-            <a:schemeClr val="accent1"/>
-          </a:fillRef>
-          <a:effectRef idx="0">
-            <a:schemeClr val="accent1"/>
-          </a:effectRef>
-          <a:fontRef idx="minor">
-            <a:schemeClr val="lt1"/>
-          </a:fontRef>
-        </p:style>
-        <p:txBody>
-          <a:bodyPr rtlCol="0" anchor="ctr"/>
-          <a:lstStyle/>
-          <a:p>
-            <a:pPr algn="ctr"/>
-            <a:endParaRPr lang="en-US" dirty="0">
-              <a:solidFill>
-                <a:sysClr val="windowText" lastClr="000000"/>
-              </a:solidFill>
-            </a:endParaRPr>
-          </a:p>
-        </p:txBody>
-      </p:sp>
-      <p:sp>
-        <p:nvSpPr>
-          <p:cNvPr id="26" name="Rectangle 25"/>
-          <p:cNvSpPr/>
-          <p:nvPr/>
-        </p:nvSpPr>
-        <p:spPr>
-          <a:xfrm>
-            <a:off x="9515476" y="3789960"/>
-            <a:ext cx="2255577" cy="1365157"/>
-          </a:xfrm>
-          <a:prstGeom prst="rect">
-            <a:avLst/>
-          </a:prstGeom>
-          <a:solidFill>
-            <a:schemeClr val="bg1"/>
-          </a:solidFill>
-          <a:ln w="19050">
-            <a:solidFill>
-              <a:schemeClr val="tx1"/>
-            </a:solidFill>
-          </a:ln>
-        </p:spPr>
-        <p:style>
-          <a:lnRef idx="2">
-            <a:schemeClr val="accent1">
-              <a:shade val="50000"/>
-            </a:schemeClr>
-          </a:lnRef>
-          <a:fillRef idx="1">
-            <a:schemeClr val="accent1"/>
-          </a:fillRef>
-          <a:effectRef idx="0">
-            <a:schemeClr val="accent1"/>
-          </a:effectRef>
-          <a:fontRef idx="minor">
-            <a:schemeClr val="lt1"/>
-          </a:fontRef>
-        </p:style>
-        <p:txBody>
-          <a:bodyPr rtlCol="0" anchor="ctr"/>
-          <a:lstStyle/>
-          <a:p>
-            <a:pPr algn="ctr"/>
-            <a:endParaRPr lang="en-US" dirty="0">
-              <a:solidFill>
-                <a:sysClr val="windowText" lastClr="000000"/>
-              </a:solidFill>
-            </a:endParaRPr>
-          </a:p>
-        </p:txBody>
-      </p:sp>
-      <p:sp>
-        <p:nvSpPr>
-          <p:cNvPr id="27" name="Rectangle 26"/>
-          <p:cNvSpPr/>
-          <p:nvPr/>
-        </p:nvSpPr>
-        <p:spPr>
-          <a:xfrm>
-            <a:off x="9515476" y="5382333"/>
-            <a:ext cx="2255577" cy="1365157"/>
-          </a:xfrm>
-          <a:prstGeom prst="rect">
-            <a:avLst/>
-          </a:prstGeom>
-          <a:solidFill>
-            <a:schemeClr val="bg1"/>
-          </a:solidFill>
-          <a:ln w="19050">
-            <a:solidFill>
-              <a:schemeClr val="tx1"/>
-            </a:solidFill>
-          </a:ln>
-        </p:spPr>
-        <p:style>
-          <a:lnRef idx="2">
-            <a:schemeClr val="accent1">
-              <a:shade val="50000"/>
-            </a:schemeClr>
-          </a:lnRef>
-          <a:fillRef idx="1">
-            <a:schemeClr val="accent1"/>
-          </a:fillRef>
-          <a:effectRef idx="0">
-            <a:schemeClr val="accent1"/>
-          </a:effectRef>
-          <a:fontRef idx="minor">
-            <a:schemeClr val="lt1"/>
-          </a:fontRef>
-        </p:style>
-        <p:txBody>
-          <a:bodyPr rtlCol="0" anchor="ctr"/>
-          <a:lstStyle/>
-          <a:p>
-            <a:pPr algn="ctr"/>
-            <a:endParaRPr lang="en-US" dirty="0">
-              <a:solidFill>
-                <a:sysClr val="windowText" lastClr="000000"/>
-              </a:solidFill>
-            </a:endParaRPr>
-          </a:p>
-        </p:txBody>
-      </p:sp>
-      <p:sp>
-        <p:nvSpPr>
-          <p:cNvPr id="28" name="Rectangle 27"/>
-          <p:cNvSpPr/>
-          <p:nvPr/>
-        </p:nvSpPr>
-        <p:spPr>
-          <a:xfrm>
-            <a:off x="9515476" y="2197586"/>
-            <a:ext cx="2255577" cy="1365157"/>
-          </a:xfrm>
-          <a:prstGeom prst="rect">
-            <a:avLst/>
-          </a:prstGeom>
-          <a:solidFill>
-            <a:schemeClr val="bg1"/>
-          </a:solidFill>
-          <a:ln w="19050">
-            <a:solidFill>
-              <a:schemeClr val="tx1"/>
-            </a:solidFill>
-          </a:ln>
-        </p:spPr>
-        <p:style>
-          <a:lnRef idx="2">
-            <a:schemeClr val="accent1">
-              <a:shade val="50000"/>
-            </a:schemeClr>
-          </a:lnRef>
-          <a:fillRef idx="1">
-            <a:schemeClr val="accent1"/>
-          </a:fillRef>
-          <a:effectRef idx="0">
-            <a:schemeClr val="accent1"/>
-          </a:effectRef>
-          <a:fontRef idx="minor">
-            <a:schemeClr val="lt1"/>
-          </a:fontRef>
-        </p:style>
-        <p:txBody>
-          <a:bodyPr rtlCol="0" anchor="ctr"/>
-          <a:lstStyle/>
-          <a:p>
-            <a:pPr algn="ctr"/>
-            <a:endParaRPr lang="en-US" dirty="0">
-              <a:solidFill>
-                <a:sysClr val="windowText" lastClr="000000"/>
-              </a:solidFill>
-            </a:endParaRPr>
-          </a:p>
-        </p:txBody>
-      </p:sp>
-      <p:sp>
-        <p:nvSpPr>
-          <p:cNvPr id="2" name="TextBox 1"/>
-          <p:cNvSpPr txBox="1"/>
-          <p:nvPr/>
-        </p:nvSpPr>
-        <p:spPr>
-          <a:xfrm>
-            <a:off x="352424" y="2197586"/>
-            <a:ext cx="2255577" cy="646331"/>
-          </a:xfrm>
-          <a:prstGeom prst="rect">
-            <a:avLst/>
-          </a:prstGeom>
-          <a:noFill/>
-        </p:spPr>
-        <p:txBody>
-          <a:bodyPr wrap="square" rtlCol="0">
-            <a:spAutoFit/>
-          </a:bodyPr>
-          <a:lstStyle/>
-          <a:p>
-            <a:pPr algn="ctr"/>
-            <a:r>
-              <a:rPr lang="en-US" dirty="0" smtClean="0"/>
-              <a:t>MIGRATORY HOLDING YARD</a:t>
-            </a:r>
-            <a:endParaRPr lang="en-US" dirty="0"/>
-          </a:p>
-        </p:txBody>
-      </p:sp>
-      <p:sp>
-        <p:nvSpPr>
-          <p:cNvPr id="29" name="TextBox 28"/>
-          <p:cNvSpPr txBox="1"/>
-          <p:nvPr/>
-        </p:nvSpPr>
-        <p:spPr>
-          <a:xfrm>
-            <a:off x="334193" y="3462470"/>
-            <a:ext cx="2255577" cy="369332"/>
-          </a:xfrm>
-          <a:prstGeom prst="rect">
-            <a:avLst/>
-          </a:prstGeom>
-          <a:noFill/>
-        </p:spPr>
-        <p:txBody>
-          <a:bodyPr wrap="square" rtlCol="0">
-            <a:spAutoFit/>
-          </a:bodyPr>
-          <a:lstStyle/>
-          <a:p>
-            <a:pPr algn="ctr"/>
-            <a:r>
               <a:rPr lang="en-US" dirty="0" smtClean="0"/>
               <a:t>STATIONARY YARD</a:t>
             </a:r>
@@ -3717,231 +3247,14 @@
       </p:sp>
       <p:sp>
         <p:nvSpPr>
-          <p:cNvPr id="30" name="TextBox 29"/>
-          <p:cNvSpPr txBox="1"/>
-          <p:nvPr/>
-        </p:nvSpPr>
-        <p:spPr>
-          <a:xfrm>
-            <a:off x="352423" y="5737519"/>
-            <a:ext cx="2255577" cy="369332"/>
-          </a:xfrm>
-          <a:prstGeom prst="rect">
-            <a:avLst/>
-          </a:prstGeom>
-          <a:noFill/>
-        </p:spPr>
-        <p:txBody>
-          <a:bodyPr wrap="square" rtlCol="0">
-            <a:spAutoFit/>
-          </a:bodyPr>
-          <a:lstStyle/>
-          <a:p>
-            <a:pPr algn="ctr"/>
-            <a:r>
-              <a:rPr lang="en-US" dirty="0" smtClean="0"/>
-              <a:t>EXPOSED YARD</a:t>
-            </a:r>
-            <a:endParaRPr lang="en-US" dirty="0"/>
-          </a:p>
-        </p:txBody>
-      </p:sp>
-      <p:sp>
-        <p:nvSpPr>
-          <p:cNvPr id="31" name="TextBox 30"/>
-          <p:cNvSpPr txBox="1"/>
-          <p:nvPr/>
-        </p:nvSpPr>
-        <p:spPr>
-          <a:xfrm>
-            <a:off x="5186365" y="2197586"/>
-            <a:ext cx="2255577" cy="646331"/>
-          </a:xfrm>
-          <a:prstGeom prst="rect">
-            <a:avLst/>
-          </a:prstGeom>
-          <a:noFill/>
-        </p:spPr>
-        <p:txBody>
-          <a:bodyPr wrap="square" rtlCol="0">
-            <a:spAutoFit/>
-          </a:bodyPr>
-          <a:lstStyle/>
-          <a:p>
-            <a:pPr algn="ctr"/>
-            <a:r>
-              <a:rPr lang="en-US" dirty="0" smtClean="0"/>
-              <a:t>MIGRATORY HOLDING YARD</a:t>
-            </a:r>
-            <a:endParaRPr lang="en-US" dirty="0"/>
-          </a:p>
-        </p:txBody>
-      </p:sp>
-      <p:sp>
-        <p:nvSpPr>
-          <p:cNvPr id="32" name="TextBox 31"/>
-          <p:cNvSpPr txBox="1"/>
-          <p:nvPr/>
-        </p:nvSpPr>
-        <p:spPr>
-          <a:xfrm>
-            <a:off x="5186364" y="3789960"/>
-            <a:ext cx="2255577" cy="369332"/>
-          </a:xfrm>
-          <a:prstGeom prst="rect">
-            <a:avLst/>
-          </a:prstGeom>
-          <a:noFill/>
-        </p:spPr>
-        <p:txBody>
-          <a:bodyPr wrap="square" rtlCol="0">
-            <a:spAutoFit/>
-          </a:bodyPr>
-          <a:lstStyle/>
-          <a:p>
-            <a:pPr algn="ctr"/>
-            <a:r>
-              <a:rPr lang="en-US" dirty="0" smtClean="0"/>
-              <a:t>STATIONARY YARD</a:t>
-            </a:r>
-            <a:endParaRPr lang="en-US" dirty="0"/>
-          </a:p>
-        </p:txBody>
-      </p:sp>
-      <p:sp>
-        <p:nvSpPr>
-          <p:cNvPr id="33" name="TextBox 32"/>
-          <p:cNvSpPr txBox="1"/>
-          <p:nvPr/>
-        </p:nvSpPr>
-        <p:spPr>
-          <a:xfrm>
-            <a:off x="5186364" y="5382333"/>
-            <a:ext cx="2255577" cy="369332"/>
-          </a:xfrm>
-          <a:prstGeom prst="rect">
-            <a:avLst/>
-          </a:prstGeom>
-          <a:noFill/>
-        </p:spPr>
-        <p:txBody>
-          <a:bodyPr wrap="square" rtlCol="0">
-            <a:spAutoFit/>
-          </a:bodyPr>
-          <a:lstStyle/>
-          <a:p>
-            <a:pPr algn="ctr"/>
-            <a:r>
-              <a:rPr lang="en-US" dirty="0" smtClean="0"/>
-              <a:t>EXPOSED YARD</a:t>
-            </a:r>
-            <a:endParaRPr lang="en-US" dirty="0"/>
-          </a:p>
-        </p:txBody>
-      </p:sp>
-      <p:sp>
-        <p:nvSpPr>
-          <p:cNvPr id="34" name="TextBox 33"/>
-          <p:cNvSpPr txBox="1"/>
-          <p:nvPr/>
-        </p:nvSpPr>
-        <p:spPr>
-          <a:xfrm>
-            <a:off x="9522620" y="2197586"/>
-            <a:ext cx="2255577" cy="646331"/>
-          </a:xfrm>
-          <a:prstGeom prst="rect">
-            <a:avLst/>
-          </a:prstGeom>
-          <a:noFill/>
-        </p:spPr>
-        <p:txBody>
-          <a:bodyPr wrap="square" rtlCol="0">
-            <a:spAutoFit/>
-          </a:bodyPr>
-          <a:lstStyle/>
-          <a:p>
-            <a:pPr algn="ctr"/>
-            <a:r>
-              <a:rPr lang="en-US" dirty="0" smtClean="0"/>
-              <a:t>MIGRATORY HOLDING YARD</a:t>
-            </a:r>
-            <a:endParaRPr lang="en-US" dirty="0"/>
-          </a:p>
-        </p:txBody>
-      </p:sp>
-      <p:sp>
-        <p:nvSpPr>
-          <p:cNvPr id="35" name="TextBox 34"/>
-          <p:cNvSpPr txBox="1"/>
-          <p:nvPr/>
-        </p:nvSpPr>
-        <p:spPr>
-          <a:xfrm>
-            <a:off x="9522619" y="3789960"/>
-            <a:ext cx="2255577" cy="369332"/>
-          </a:xfrm>
-          <a:prstGeom prst="rect">
-            <a:avLst/>
-          </a:prstGeom>
-          <a:noFill/>
-        </p:spPr>
-        <p:txBody>
-          <a:bodyPr wrap="square" rtlCol="0">
-            <a:spAutoFit/>
-          </a:bodyPr>
-          <a:lstStyle/>
-          <a:p>
-            <a:pPr algn="ctr"/>
-            <a:r>
-              <a:rPr lang="en-US" dirty="0" smtClean="0"/>
-              <a:t>STATIONARY YARD</a:t>
-            </a:r>
-            <a:endParaRPr lang="en-US" dirty="0"/>
-          </a:p>
-        </p:txBody>
-      </p:sp>
-      <p:sp>
-        <p:nvSpPr>
-          <p:cNvPr id="36" name="TextBox 35"/>
-          <p:cNvSpPr txBox="1"/>
-          <p:nvPr/>
-        </p:nvSpPr>
-        <p:spPr>
-          <a:xfrm>
-            <a:off x="9522619" y="5382333"/>
-            <a:ext cx="2255577" cy="369332"/>
-          </a:xfrm>
-          <a:prstGeom prst="rect">
-            <a:avLst/>
-          </a:prstGeom>
-          <a:noFill/>
-        </p:spPr>
-        <p:txBody>
-          <a:bodyPr wrap="square" rtlCol="0">
-            <a:spAutoFit/>
-          </a:bodyPr>
-          <a:lstStyle/>
-          <a:p>
-            <a:pPr algn="ctr"/>
-            <a:r>
-              <a:rPr lang="en-US" dirty="0" smtClean="0"/>
-              <a:t>EXPOSED YARD</a:t>
-            </a:r>
-            <a:endParaRPr lang="en-US" dirty="0"/>
-          </a:p>
-        </p:txBody>
-      </p:sp>
-      <p:sp>
-        <p:nvSpPr>
-          <p:cNvPr id="37" name="Rectangle 36"/>
+          <p:cNvPr id="44" name="Rectangle 43"/>
           <p:cNvSpPr/>
           <p:nvPr/>
         </p:nvSpPr>
         <p:spPr>
           <a:xfrm>
-            <a:off x="467798" y="3901540"/>
-            <a:ext cx="950933" cy="714990"/>
+            <a:off x="5310603" y="2074835"/>
+            <a:ext cx="953935" cy="713939"/>
           </a:xfrm>
           <a:prstGeom prst="rect">
             <a:avLst/>
@@ -3980,7 +3293,7 @@
           <a:p>
             <a:pPr algn="ctr"/>
             <a:r>
-              <a:rPr lang="en-US" sz="1400" dirty="0" smtClean="0">
+              <a:rPr lang="en-US" sz="1400" dirty="0">
                 <a:solidFill>
                   <a:sysClr val="windowText" lastClr="000000"/>
                 </a:solidFill>
@@ -3991,7 +3304,7 @@
           <a:p>
             <a:pPr algn="ctr"/>
             <a:r>
-              <a:rPr lang="en-US" sz="1400" dirty="0" smtClean="0">
+              <a:rPr lang="en-US" sz="1400" dirty="0">
                 <a:solidFill>
                   <a:sysClr val="windowText" lastClr="000000"/>
                 </a:solidFill>
@@ -4002,7 +3315,7 @@
           <a:p>
             <a:pPr algn="ctr"/>
             <a:r>
-              <a:rPr lang="en-US" sz="1400" dirty="0" smtClean="0">
+              <a:rPr lang="en-US" sz="1400" dirty="0">
                 <a:solidFill>
                   <a:sysClr val="windowText" lastClr="000000"/>
                 </a:solidFill>
@@ -4012,16 +3325,677 @@
           </a:p>
         </p:txBody>
       </p:sp>
-      <p:sp>
-        <p:nvSpPr>
-          <p:cNvPr id="40" name="Rectangle 39"/>
+      <p:grpSp>
+        <p:nvGrpSpPr>
+          <p:cNvPr id="4" name="Group 3"/>
+          <p:cNvGrpSpPr/>
+          <p:nvPr/>
+        </p:nvGrpSpPr>
+        <p:grpSpPr>
+          <a:xfrm>
+            <a:off x="185105" y="1531389"/>
+            <a:ext cx="2273809" cy="2192661"/>
+            <a:chOff x="334193" y="3422326"/>
+            <a:chExt cx="2273809" cy="2192661"/>
+          </a:xfrm>
+        </p:grpSpPr>
+        <p:sp>
+          <p:nvSpPr>
+            <p:cNvPr id="21" name="Rectangle 20"/>
+            <p:cNvSpPr/>
+            <p:nvPr/>
+          </p:nvSpPr>
+          <p:spPr>
+            <a:xfrm>
+              <a:off x="352425" y="3422326"/>
+              <a:ext cx="2255577" cy="2192661"/>
+            </a:xfrm>
+            <a:prstGeom prst="rect">
+              <a:avLst/>
+            </a:prstGeom>
+            <a:solidFill>
+              <a:schemeClr val="bg1"/>
+            </a:solidFill>
+            <a:ln w="19050">
+              <a:solidFill>
+                <a:schemeClr val="tx1"/>
+              </a:solidFill>
+            </a:ln>
+          </p:spPr>
+          <p:style>
+            <a:lnRef idx="2">
+              <a:schemeClr val="accent1">
+                <a:shade val="50000"/>
+              </a:schemeClr>
+            </a:lnRef>
+            <a:fillRef idx="1">
+              <a:schemeClr val="accent1"/>
+            </a:fillRef>
+            <a:effectRef idx="0">
+              <a:schemeClr val="accent1"/>
+            </a:effectRef>
+            <a:fontRef idx="minor">
+              <a:schemeClr val="lt1"/>
+            </a:fontRef>
+          </p:style>
+          <p:txBody>
+            <a:bodyPr rtlCol="0" anchor="ctr"/>
+            <a:lstStyle/>
+            <a:p>
+              <a:pPr algn="ctr"/>
+              <a:endParaRPr lang="en-US" dirty="0">
+                <a:solidFill>
+                  <a:sysClr val="windowText" lastClr="000000"/>
+                </a:solidFill>
+              </a:endParaRPr>
+            </a:p>
+          </p:txBody>
+        </p:sp>
+        <p:sp>
+          <p:nvSpPr>
+            <p:cNvPr id="29" name="TextBox 28"/>
+            <p:cNvSpPr txBox="1"/>
+            <p:nvPr/>
+          </p:nvSpPr>
+          <p:spPr>
+            <a:xfrm>
+              <a:off x="334193" y="3462470"/>
+              <a:ext cx="2255577" cy="369332"/>
+            </a:xfrm>
+            <a:prstGeom prst="rect">
+              <a:avLst/>
+            </a:prstGeom>
+            <a:noFill/>
+          </p:spPr>
+          <p:txBody>
+            <a:bodyPr wrap="square" rtlCol="0">
+              <a:spAutoFit/>
+            </a:bodyPr>
+            <a:lstStyle/>
+            <a:p>
+              <a:pPr algn="ctr"/>
+              <a:r>
+                <a:rPr lang="en-US" dirty="0" smtClean="0"/>
+                <a:t>STATIONARY YARD</a:t>
+              </a:r>
+              <a:endParaRPr lang="en-US" dirty="0"/>
+            </a:p>
+          </p:txBody>
+        </p:sp>
+        <p:sp>
+          <p:nvSpPr>
+            <p:cNvPr id="37" name="Rectangle 36"/>
+            <p:cNvSpPr/>
+            <p:nvPr/>
+          </p:nvSpPr>
+          <p:spPr>
+            <a:xfrm>
+              <a:off x="467798" y="3901540"/>
+              <a:ext cx="950933" cy="714990"/>
+            </a:xfrm>
+            <a:prstGeom prst="rect">
+              <a:avLst/>
+            </a:prstGeom>
+            <a:solidFill>
+              <a:schemeClr val="accent6">
+                <a:lumMod val="60000"/>
+                <a:lumOff val="40000"/>
+              </a:schemeClr>
+            </a:solidFill>
+            <a:ln w="19050">
+              <a:solidFill>
+                <a:schemeClr val="tx1"/>
+              </a:solidFill>
+            </a:ln>
+          </p:spPr>
+          <p:style>
+            <a:lnRef idx="2">
+              <a:schemeClr val="accent1">
+                <a:shade val="50000"/>
+              </a:schemeClr>
+            </a:lnRef>
+            <a:fillRef idx="1">
+              <a:schemeClr val="accent1"/>
+            </a:fillRef>
+            <a:effectRef idx="0">
+              <a:schemeClr val="accent1"/>
+            </a:effectRef>
+            <a:fontRef idx="minor">
+              <a:schemeClr val="lt1"/>
+            </a:fontRef>
+          </p:style>
+          <p:txBody>
+            <a:bodyPr rtlCol="0" anchor="ctr"/>
+            <a:lstStyle/>
+            <a:p>
+              <a:pPr algn="ctr"/>
+              <a:r>
+                <a:rPr lang="en-US" sz="1400" dirty="0" smtClean="0">
+                  <a:solidFill>
+                    <a:sysClr val="windowText" lastClr="000000"/>
+                  </a:solidFill>
+                </a:rPr>
+                <a:t>Isolated</a:t>
+              </a:r>
+            </a:p>
+            <a:p>
+              <a:pPr algn="ctr"/>
+              <a:r>
+                <a:rPr lang="en-US" sz="1400" dirty="0" smtClean="0">
+                  <a:solidFill>
+                    <a:sysClr val="windowText" lastClr="000000"/>
+                  </a:solidFill>
+                </a:rPr>
+                <a:t>Stationary</a:t>
+              </a:r>
+            </a:p>
+            <a:p>
+              <a:pPr algn="ctr"/>
+              <a:r>
+                <a:rPr lang="en-US" sz="1400" dirty="0" smtClean="0">
+                  <a:solidFill>
+                    <a:sysClr val="windowText" lastClr="000000"/>
+                  </a:solidFill>
+                </a:rPr>
+                <a:t>Group</a:t>
+              </a:r>
+            </a:p>
+          </p:txBody>
+        </p:sp>
+        <p:sp>
+          <p:nvSpPr>
+            <p:cNvPr id="53" name="Rectangle 52"/>
+            <p:cNvSpPr/>
+            <p:nvPr/>
+          </p:nvSpPr>
+          <p:spPr>
+            <a:xfrm>
+              <a:off x="1544235" y="3901540"/>
+              <a:ext cx="950933" cy="714990"/>
+            </a:xfrm>
+            <a:prstGeom prst="rect">
+              <a:avLst/>
+            </a:prstGeom>
+            <a:solidFill>
+              <a:schemeClr val="accent6">
+                <a:lumMod val="60000"/>
+                <a:lumOff val="40000"/>
+              </a:schemeClr>
+            </a:solidFill>
+            <a:ln w="19050">
+              <a:solidFill>
+                <a:schemeClr val="tx1"/>
+              </a:solidFill>
+            </a:ln>
+          </p:spPr>
+          <p:style>
+            <a:lnRef idx="2">
+              <a:schemeClr val="accent1">
+                <a:shade val="50000"/>
+              </a:schemeClr>
+            </a:lnRef>
+            <a:fillRef idx="1">
+              <a:schemeClr val="accent1"/>
+            </a:fillRef>
+            <a:effectRef idx="0">
+              <a:schemeClr val="accent1"/>
+            </a:effectRef>
+            <a:fontRef idx="minor">
+              <a:schemeClr val="lt1"/>
+            </a:fontRef>
+          </p:style>
+          <p:txBody>
+            <a:bodyPr rtlCol="0" anchor="ctr"/>
+            <a:lstStyle/>
+            <a:p>
+              <a:pPr algn="ctr"/>
+              <a:r>
+                <a:rPr lang="en-US" sz="1400" dirty="0" smtClean="0">
+                  <a:solidFill>
+                    <a:sysClr val="windowText" lastClr="000000"/>
+                  </a:solidFill>
+                </a:rPr>
+                <a:t>Migratory Group</a:t>
+              </a:r>
+            </a:p>
+          </p:txBody>
+        </p:sp>
+      </p:grpSp>
+      <p:pic>
+        <p:nvPicPr>
+          <p:cNvPr id="10" name="Picture 9" descr="california-state-outline-clip-art-hi.png"/>
+          <p:cNvPicPr>
+            <a:picLocks noChangeAspect="1"/>
+          </p:cNvPicPr>
+          <p:nvPr/>
+        </p:nvPicPr>
+        <p:blipFill>
+          <a:blip r:embed="rId2">
+            <a:extLst>
+              <a:ext uri="{28A0092B-C50C-407E-A947-70E740481C1C}">
+                <a14:useLocalDpi xmlns:a14="http://schemas.microsoft.com/office/drawing/2010/main" val="0"/>
+              </a:ext>
+            </a:extLst>
+          </a:blip>
+          <a:stretch>
+            <a:fillRect/>
+          </a:stretch>
+        </p:blipFill>
+        <p:spPr>
+          <a:xfrm>
+            <a:off x="3226442" y="1796520"/>
+            <a:ext cx="1687272" cy="2889696"/>
+          </a:xfrm>
+          <a:prstGeom prst="rect">
+            <a:avLst/>
+          </a:prstGeom>
+        </p:spPr>
+      </p:pic>
+      <p:cxnSp>
+        <p:nvCxnSpPr>
+          <p:cNvPr id="12" name="Straight Arrow Connector 11"/>
+          <p:cNvCxnSpPr/>
+          <p:nvPr/>
+        </p:nvCxnSpPr>
+        <p:spPr>
+          <a:xfrm>
+            <a:off x="2346080" y="2725593"/>
+            <a:ext cx="1524621" cy="696754"/>
+          </a:xfrm>
+          <a:prstGeom prst="straightConnector1">
+            <a:avLst/>
+          </a:prstGeom>
+          <a:ln w="57150" cmpd="sng">
+            <a:prstDash val="sysDash"/>
+            <a:tailEnd type="arrow"/>
+          </a:ln>
+        </p:spPr>
+        <p:style>
+          <a:lnRef idx="2">
+            <a:schemeClr val="accent1"/>
+          </a:lnRef>
+          <a:fillRef idx="0">
+            <a:schemeClr val="accent1"/>
+          </a:fillRef>
+          <a:effectRef idx="1">
+            <a:schemeClr val="accent1"/>
+          </a:effectRef>
+          <a:fontRef idx="minor">
+            <a:schemeClr val="tx1"/>
+          </a:fontRef>
+        </p:style>
+      </p:cxnSp>
+      <p:grpSp>
+        <p:nvGrpSpPr>
+          <p:cNvPr id="81" name="Group 80"/>
+          <p:cNvGrpSpPr/>
+          <p:nvPr/>
+        </p:nvGrpSpPr>
+        <p:grpSpPr>
+          <a:xfrm>
+            <a:off x="9280913" y="4842701"/>
+            <a:ext cx="2262720" cy="1365157"/>
+            <a:chOff x="9419606" y="4304023"/>
+            <a:chExt cx="2262720" cy="1365157"/>
+          </a:xfrm>
+        </p:grpSpPr>
+        <p:sp>
+          <p:nvSpPr>
+            <p:cNvPr id="27" name="Rectangle 26"/>
+            <p:cNvSpPr/>
+            <p:nvPr/>
+          </p:nvSpPr>
+          <p:spPr>
+            <a:xfrm>
+              <a:off x="9419606" y="4304023"/>
+              <a:ext cx="2255577" cy="1365157"/>
+            </a:xfrm>
+            <a:prstGeom prst="rect">
+              <a:avLst/>
+            </a:prstGeom>
+            <a:solidFill>
+              <a:schemeClr val="bg1"/>
+            </a:solidFill>
+            <a:ln w="19050">
+              <a:solidFill>
+                <a:schemeClr val="tx1"/>
+              </a:solidFill>
+            </a:ln>
+          </p:spPr>
+          <p:style>
+            <a:lnRef idx="2">
+              <a:schemeClr val="accent1">
+                <a:shade val="50000"/>
+              </a:schemeClr>
+            </a:lnRef>
+            <a:fillRef idx="1">
+              <a:schemeClr val="accent1"/>
+            </a:fillRef>
+            <a:effectRef idx="0">
+              <a:schemeClr val="accent1"/>
+            </a:effectRef>
+            <a:fontRef idx="minor">
+              <a:schemeClr val="lt1"/>
+            </a:fontRef>
+          </p:style>
+          <p:txBody>
+            <a:bodyPr rtlCol="0" anchor="ctr"/>
+            <a:lstStyle/>
+            <a:p>
+              <a:pPr algn="ctr"/>
+              <a:endParaRPr lang="en-US" dirty="0">
+                <a:solidFill>
+                  <a:sysClr val="windowText" lastClr="000000"/>
+                </a:solidFill>
+              </a:endParaRPr>
+            </a:p>
+          </p:txBody>
+        </p:sp>
+        <p:sp>
+          <p:nvSpPr>
+            <p:cNvPr id="36" name="TextBox 35"/>
+            <p:cNvSpPr txBox="1"/>
+            <p:nvPr/>
+          </p:nvSpPr>
+          <p:spPr>
+            <a:xfrm>
+              <a:off x="9426749" y="4304023"/>
+              <a:ext cx="2255577" cy="369332"/>
+            </a:xfrm>
+            <a:prstGeom prst="rect">
+              <a:avLst/>
+            </a:prstGeom>
+            <a:noFill/>
+          </p:spPr>
+          <p:txBody>
+            <a:bodyPr wrap="square" rtlCol="0">
+              <a:spAutoFit/>
+            </a:bodyPr>
+            <a:lstStyle/>
+            <a:p>
+              <a:pPr algn="ctr"/>
+              <a:r>
+                <a:rPr lang="en-US" dirty="0" smtClean="0"/>
+                <a:t>EXPOSED YARD</a:t>
+              </a:r>
+              <a:endParaRPr lang="en-US" dirty="0"/>
+            </a:p>
+          </p:txBody>
+        </p:sp>
+        <p:sp>
+          <p:nvSpPr>
+            <p:cNvPr id="71" name="Rectangle 70"/>
+            <p:cNvSpPr/>
+            <p:nvPr/>
+          </p:nvSpPr>
+          <p:spPr>
+            <a:xfrm>
+              <a:off x="10607009" y="4866826"/>
+              <a:ext cx="950933" cy="714990"/>
+            </a:xfrm>
+            <a:prstGeom prst="rect">
+              <a:avLst/>
+            </a:prstGeom>
+            <a:solidFill>
+              <a:schemeClr val="accent6">
+                <a:lumMod val="60000"/>
+                <a:lumOff val="40000"/>
+              </a:schemeClr>
+            </a:solidFill>
+            <a:ln w="19050">
+              <a:solidFill>
+                <a:schemeClr val="tx1"/>
+              </a:solidFill>
+            </a:ln>
+          </p:spPr>
+          <p:style>
+            <a:lnRef idx="2">
+              <a:schemeClr val="accent1">
+                <a:shade val="50000"/>
+              </a:schemeClr>
+            </a:lnRef>
+            <a:fillRef idx="1">
+              <a:schemeClr val="accent1"/>
+            </a:fillRef>
+            <a:effectRef idx="0">
+              <a:schemeClr val="accent1"/>
+            </a:effectRef>
+            <a:fontRef idx="minor">
+              <a:schemeClr val="lt1"/>
+            </a:fontRef>
+          </p:style>
+          <p:txBody>
+            <a:bodyPr rtlCol="0" anchor="ctr"/>
+            <a:lstStyle/>
+            <a:p>
+              <a:pPr algn="ctr"/>
+              <a:r>
+                <a:rPr lang="en-US" sz="1400" dirty="0" smtClean="0">
+                  <a:solidFill>
+                    <a:sysClr val="windowText" lastClr="000000"/>
+                  </a:solidFill>
+                </a:rPr>
+                <a:t>Exposed</a:t>
+              </a:r>
+            </a:p>
+            <a:p>
+              <a:pPr algn="ctr"/>
+              <a:r>
+                <a:rPr lang="en-US" sz="1400" dirty="0" smtClean="0">
+                  <a:solidFill>
+                    <a:sysClr val="windowText" lastClr="000000"/>
+                  </a:solidFill>
+                </a:rPr>
+                <a:t>Group</a:t>
+              </a:r>
+            </a:p>
+          </p:txBody>
+        </p:sp>
+        <p:sp>
+          <p:nvSpPr>
+            <p:cNvPr id="72" name="Rectangle 71"/>
+            <p:cNvSpPr/>
+            <p:nvPr/>
+          </p:nvSpPr>
+          <p:spPr>
+            <a:xfrm>
+              <a:off x="9522510" y="4866826"/>
+              <a:ext cx="950933" cy="714990"/>
+            </a:xfrm>
+            <a:prstGeom prst="rect">
+              <a:avLst/>
+            </a:prstGeom>
+            <a:solidFill>
+              <a:schemeClr val="accent6">
+                <a:lumMod val="60000"/>
+                <a:lumOff val="40000"/>
+              </a:schemeClr>
+            </a:solidFill>
+            <a:ln w="19050">
+              <a:solidFill>
+                <a:schemeClr val="tx1"/>
+              </a:solidFill>
+            </a:ln>
+          </p:spPr>
+          <p:style>
+            <a:lnRef idx="2">
+              <a:schemeClr val="accent1">
+                <a:shade val="50000"/>
+              </a:schemeClr>
+            </a:lnRef>
+            <a:fillRef idx="1">
+              <a:schemeClr val="accent1"/>
+            </a:fillRef>
+            <a:effectRef idx="0">
+              <a:schemeClr val="accent1"/>
+            </a:effectRef>
+            <a:fontRef idx="minor">
+              <a:schemeClr val="lt1"/>
+            </a:fontRef>
+          </p:style>
+          <p:txBody>
+            <a:bodyPr rtlCol="0" anchor="ctr"/>
+            <a:lstStyle/>
+            <a:p>
+              <a:pPr algn="ctr"/>
+              <a:r>
+                <a:rPr lang="en-US" sz="1400" dirty="0" smtClean="0">
+                  <a:solidFill>
+                    <a:sysClr val="windowText" lastClr="000000"/>
+                  </a:solidFill>
+                </a:rPr>
+                <a:t>Migratory</a:t>
+              </a:r>
+            </a:p>
+            <a:p>
+              <a:pPr algn="ctr"/>
+              <a:r>
+                <a:rPr lang="en-US" sz="1400" dirty="0" smtClean="0">
+                  <a:solidFill>
+                    <a:sysClr val="windowText" lastClr="000000"/>
+                  </a:solidFill>
+                </a:rPr>
+                <a:t>Group</a:t>
+              </a:r>
+            </a:p>
+          </p:txBody>
+        </p:sp>
+      </p:grpSp>
+      <p:sp>
+        <p:nvSpPr>
+          <p:cNvPr id="16" name="5-Point Star 15"/>
           <p:cNvSpPr/>
           <p:nvPr/>
         </p:nvSpPr>
         <p:spPr>
           <a:xfrm>
-            <a:off x="5838681" y="2794134"/>
-            <a:ext cx="950933" cy="714990"/>
+            <a:off x="3870701" y="3295347"/>
+            <a:ext cx="244711" cy="254000"/>
+          </a:xfrm>
+          <a:prstGeom prst="star5">
+            <a:avLst>
+              <a:gd name="adj" fmla="val 24120"/>
+              <a:gd name="hf" fmla="val 105146"/>
+              <a:gd name="vf" fmla="val 110557"/>
+            </a:avLst>
+          </a:prstGeom>
+        </p:spPr>
+        <p:style>
+          <a:lnRef idx="1">
+            <a:schemeClr val="accent1"/>
+          </a:lnRef>
+          <a:fillRef idx="3">
+            <a:schemeClr val="accent1"/>
+          </a:fillRef>
+          <a:effectRef idx="2">
+            <a:schemeClr val="accent1"/>
+          </a:effectRef>
+          <a:fontRef idx="minor">
+            <a:schemeClr val="lt1"/>
+          </a:fontRef>
+        </p:style>
+        <p:txBody>
+          <a:bodyPr rtlCol="0" anchor="ctr"/>
+          <a:lstStyle/>
+          <a:p>
+            <a:pPr algn="ctr"/>
+            <a:endParaRPr lang="en-US"/>
+          </a:p>
+        </p:txBody>
+      </p:sp>
+      <p:sp>
+        <p:nvSpPr>
+          <p:cNvPr id="77" name="Rectangle 76"/>
+          <p:cNvSpPr/>
+          <p:nvPr/>
+        </p:nvSpPr>
+        <p:spPr>
+          <a:xfrm>
+            <a:off x="9280936" y="1571533"/>
+            <a:ext cx="2262697" cy="2192661"/>
+          </a:xfrm>
+          <a:prstGeom prst="rect">
+            <a:avLst/>
+          </a:prstGeom>
+          <a:solidFill>
+            <a:schemeClr val="bg1"/>
+          </a:solidFill>
+          <a:ln w="19050">
+            <a:solidFill>
+              <a:schemeClr val="tx1"/>
+            </a:solidFill>
+          </a:ln>
+        </p:spPr>
+        <p:style>
+          <a:lnRef idx="2">
+            <a:schemeClr val="accent1">
+              <a:shade val="50000"/>
+            </a:schemeClr>
+          </a:lnRef>
+          <a:fillRef idx="1">
+            <a:schemeClr val="accent1"/>
+          </a:fillRef>
+          <a:effectRef idx="0">
+            <a:schemeClr val="accent1"/>
+          </a:effectRef>
+          <a:fontRef idx="minor">
+            <a:schemeClr val="lt1"/>
+          </a:fontRef>
+        </p:style>
+        <p:txBody>
+          <a:bodyPr rtlCol="0" anchor="ctr"/>
+          <a:lstStyle/>
+          <a:p>
+            <a:pPr algn="ctr"/>
+            <a:endParaRPr lang="en-US" dirty="0">
+              <a:solidFill>
+                <a:sysClr val="windowText" lastClr="000000"/>
+              </a:solidFill>
+            </a:endParaRPr>
+          </a:p>
+        </p:txBody>
+      </p:sp>
+      <p:sp>
+        <p:nvSpPr>
+          <p:cNvPr id="78" name="TextBox 77"/>
+          <p:cNvSpPr txBox="1"/>
+          <p:nvPr/>
+        </p:nvSpPr>
+        <p:spPr>
+          <a:xfrm>
+            <a:off x="9288102" y="1571533"/>
+            <a:ext cx="2262697" cy="368789"/>
+          </a:xfrm>
+          <a:prstGeom prst="rect">
+            <a:avLst/>
+          </a:prstGeom>
+          <a:noFill/>
+        </p:spPr>
+        <p:txBody>
+          <a:bodyPr wrap="square" rtlCol="0">
+            <a:spAutoFit/>
+          </a:bodyPr>
+          <a:lstStyle/>
+          <a:p>
+            <a:pPr algn="ctr"/>
+            <a:r>
+              <a:rPr lang="en-US" dirty="0" smtClean="0"/>
+              <a:t>STATIONARY YARD</a:t>
+            </a:r>
+            <a:endParaRPr lang="en-US" dirty="0"/>
+          </a:p>
+        </p:txBody>
+      </p:sp>
+      <p:sp>
+        <p:nvSpPr>
+          <p:cNvPr id="79" name="Rectangle 78"/>
+          <p:cNvSpPr/>
+          <p:nvPr/>
+        </p:nvSpPr>
+        <p:spPr>
+          <a:xfrm>
+            <a:off x="9458348" y="2090657"/>
+            <a:ext cx="953935" cy="713939"/>
           </a:xfrm>
           <a:prstGeom prst="rect">
             <a:avLst/>
@@ -4060,40 +4034,328 @@
           <a:p>
             <a:pPr algn="ctr"/>
             <a:r>
-              <a:rPr lang="en-US" sz="1400" dirty="0" smtClean="0">
+              <a:rPr lang="en-US" sz="1400" dirty="0">
                 <a:solidFill>
                   <a:sysClr val="windowText" lastClr="000000"/>
                 </a:solidFill>
               </a:rPr>
-              <a:t>Migratory Group</a:t>
-            </a:r>
-          </a:p>
-        </p:txBody>
-      </p:sp>
-      <p:sp>
-        <p:nvSpPr>
-          <p:cNvPr id="41" name="Rectangle 40"/>
+              <a:t>Isolated</a:t>
+            </a:r>
+          </a:p>
+          <a:p>
+            <a:pPr algn="ctr"/>
+            <a:r>
+              <a:rPr lang="en-US" sz="1400" dirty="0">
+                <a:solidFill>
+                  <a:sysClr val="windowText" lastClr="000000"/>
+                </a:solidFill>
+              </a:rPr>
+              <a:t>Stationary</a:t>
+            </a:r>
+          </a:p>
+          <a:p>
+            <a:pPr algn="ctr"/>
+            <a:r>
+              <a:rPr lang="en-US" sz="1400" dirty="0">
+                <a:solidFill>
+                  <a:sysClr val="windowText" lastClr="000000"/>
+                </a:solidFill>
+              </a:rPr>
+              <a:t>Group</a:t>
+            </a:r>
+          </a:p>
+        </p:txBody>
+      </p:sp>
+      <p:grpSp>
+        <p:nvGrpSpPr>
+          <p:cNvPr id="82" name="Group 81"/>
+          <p:cNvGrpSpPr/>
+          <p:nvPr/>
+        </p:nvGrpSpPr>
+        <p:grpSpPr>
+          <a:xfrm>
+            <a:off x="5187679" y="4825535"/>
+            <a:ext cx="2262720" cy="1365157"/>
+            <a:chOff x="9419606" y="4304023"/>
+            <a:chExt cx="2262720" cy="1365157"/>
+          </a:xfrm>
+        </p:grpSpPr>
+        <p:sp>
+          <p:nvSpPr>
+            <p:cNvPr id="83" name="Rectangle 82"/>
+            <p:cNvSpPr/>
+            <p:nvPr/>
+          </p:nvSpPr>
+          <p:spPr>
+            <a:xfrm>
+              <a:off x="9419606" y="4304023"/>
+              <a:ext cx="2255577" cy="1365157"/>
+            </a:xfrm>
+            <a:prstGeom prst="rect">
+              <a:avLst/>
+            </a:prstGeom>
+            <a:solidFill>
+              <a:schemeClr val="bg1"/>
+            </a:solidFill>
+            <a:ln w="19050">
+              <a:solidFill>
+                <a:schemeClr val="tx1"/>
+              </a:solidFill>
+            </a:ln>
+          </p:spPr>
+          <p:style>
+            <a:lnRef idx="2">
+              <a:schemeClr val="accent1">
+                <a:shade val="50000"/>
+              </a:schemeClr>
+            </a:lnRef>
+            <a:fillRef idx="1">
+              <a:schemeClr val="accent1"/>
+            </a:fillRef>
+            <a:effectRef idx="0">
+              <a:schemeClr val="accent1"/>
+            </a:effectRef>
+            <a:fontRef idx="minor">
+              <a:schemeClr val="lt1"/>
+            </a:fontRef>
+          </p:style>
+          <p:txBody>
+            <a:bodyPr rtlCol="0" anchor="ctr"/>
+            <a:lstStyle/>
+            <a:p>
+              <a:pPr algn="ctr"/>
+              <a:endParaRPr lang="en-US" dirty="0">
+                <a:solidFill>
+                  <a:sysClr val="windowText" lastClr="000000"/>
+                </a:solidFill>
+              </a:endParaRPr>
+            </a:p>
+          </p:txBody>
+        </p:sp>
+        <p:sp>
+          <p:nvSpPr>
+            <p:cNvPr id="84" name="TextBox 83"/>
+            <p:cNvSpPr txBox="1"/>
+            <p:nvPr/>
+          </p:nvSpPr>
+          <p:spPr>
+            <a:xfrm>
+              <a:off x="9426749" y="4304023"/>
+              <a:ext cx="2255577" cy="369332"/>
+            </a:xfrm>
+            <a:prstGeom prst="rect">
+              <a:avLst/>
+            </a:prstGeom>
+            <a:noFill/>
+          </p:spPr>
+          <p:txBody>
+            <a:bodyPr wrap="square" rtlCol="0">
+              <a:spAutoFit/>
+            </a:bodyPr>
+            <a:lstStyle/>
+            <a:p>
+              <a:pPr algn="ctr"/>
+              <a:r>
+                <a:rPr lang="en-US" dirty="0" smtClean="0"/>
+                <a:t>EXPOSED YARD</a:t>
+              </a:r>
+              <a:endParaRPr lang="en-US" dirty="0"/>
+            </a:p>
+          </p:txBody>
+        </p:sp>
+        <p:sp>
+          <p:nvSpPr>
+            <p:cNvPr id="85" name="Rectangle 84"/>
+            <p:cNvSpPr/>
+            <p:nvPr/>
+          </p:nvSpPr>
+          <p:spPr>
+            <a:xfrm>
+              <a:off x="10607009" y="4866826"/>
+              <a:ext cx="950933" cy="714990"/>
+            </a:xfrm>
+            <a:prstGeom prst="rect">
+              <a:avLst/>
+            </a:prstGeom>
+            <a:solidFill>
+              <a:schemeClr val="accent6">
+                <a:lumMod val="60000"/>
+                <a:lumOff val="40000"/>
+              </a:schemeClr>
+            </a:solidFill>
+            <a:ln w="19050">
+              <a:solidFill>
+                <a:schemeClr val="tx1"/>
+              </a:solidFill>
+            </a:ln>
+          </p:spPr>
+          <p:style>
+            <a:lnRef idx="2">
+              <a:schemeClr val="accent1">
+                <a:shade val="50000"/>
+              </a:schemeClr>
+            </a:lnRef>
+            <a:fillRef idx="1">
+              <a:schemeClr val="accent1"/>
+            </a:fillRef>
+            <a:effectRef idx="0">
+              <a:schemeClr val="accent1"/>
+            </a:effectRef>
+            <a:fontRef idx="minor">
+              <a:schemeClr val="lt1"/>
+            </a:fontRef>
+          </p:style>
+          <p:txBody>
+            <a:bodyPr rtlCol="0" anchor="ctr"/>
+            <a:lstStyle/>
+            <a:p>
+              <a:pPr algn="ctr"/>
+              <a:r>
+                <a:rPr lang="en-US" sz="1400" dirty="0" smtClean="0">
+                  <a:solidFill>
+                    <a:sysClr val="windowText" lastClr="000000"/>
+                  </a:solidFill>
+                </a:rPr>
+                <a:t>Exposed</a:t>
+              </a:r>
+            </a:p>
+            <a:p>
+              <a:pPr algn="ctr"/>
+              <a:r>
+                <a:rPr lang="en-US" sz="1400" dirty="0" smtClean="0">
+                  <a:solidFill>
+                    <a:sysClr val="windowText" lastClr="000000"/>
+                  </a:solidFill>
+                </a:rPr>
+                <a:t>Group</a:t>
+              </a:r>
+            </a:p>
+          </p:txBody>
+        </p:sp>
+        <p:sp>
+          <p:nvSpPr>
+            <p:cNvPr id="86" name="Rectangle 85"/>
+            <p:cNvSpPr/>
+            <p:nvPr/>
+          </p:nvSpPr>
+          <p:spPr>
+            <a:xfrm>
+              <a:off x="9522510" y="4866826"/>
+              <a:ext cx="950933" cy="714990"/>
+            </a:xfrm>
+            <a:prstGeom prst="rect">
+              <a:avLst/>
+            </a:prstGeom>
+            <a:solidFill>
+              <a:schemeClr val="accent6">
+                <a:lumMod val="60000"/>
+                <a:lumOff val="40000"/>
+              </a:schemeClr>
+            </a:solidFill>
+            <a:ln w="19050">
+              <a:solidFill>
+                <a:schemeClr val="tx1"/>
+              </a:solidFill>
+            </a:ln>
+          </p:spPr>
+          <p:style>
+            <a:lnRef idx="2">
+              <a:schemeClr val="accent1">
+                <a:shade val="50000"/>
+              </a:schemeClr>
+            </a:lnRef>
+            <a:fillRef idx="1">
+              <a:schemeClr val="accent1"/>
+            </a:fillRef>
+            <a:effectRef idx="0">
+              <a:schemeClr val="accent1"/>
+            </a:effectRef>
+            <a:fontRef idx="minor">
+              <a:schemeClr val="lt1"/>
+            </a:fontRef>
+          </p:style>
+          <p:txBody>
+            <a:bodyPr rtlCol="0" anchor="ctr"/>
+            <a:lstStyle/>
+            <a:p>
+              <a:pPr algn="ctr"/>
+              <a:r>
+                <a:rPr lang="en-US" sz="1400" dirty="0" smtClean="0">
+                  <a:solidFill>
+                    <a:sysClr val="windowText" lastClr="000000"/>
+                  </a:solidFill>
+                </a:rPr>
+                <a:t>Migratory</a:t>
+              </a:r>
+            </a:p>
+            <a:p>
+              <a:pPr algn="ctr"/>
+              <a:r>
+                <a:rPr lang="en-US" sz="1400" dirty="0" smtClean="0">
+                  <a:solidFill>
+                    <a:sysClr val="windowText" lastClr="000000"/>
+                  </a:solidFill>
+                </a:rPr>
+                <a:t>Group</a:t>
+              </a:r>
+            </a:p>
+          </p:txBody>
+        </p:sp>
+      </p:grpSp>
+      <p:cxnSp>
+        <p:nvCxnSpPr>
+          <p:cNvPr id="70" name="Straight Arrow Connector 69"/>
+          <p:cNvCxnSpPr/>
+          <p:nvPr/>
+        </p:nvCxnSpPr>
+        <p:spPr>
+          <a:xfrm>
+            <a:off x="4034648" y="3635811"/>
+            <a:ext cx="1255935" cy="1682577"/>
+          </a:xfrm>
+          <a:prstGeom prst="straightConnector1">
+            <a:avLst/>
+          </a:prstGeom>
+          <a:ln w="57150" cmpd="sng">
+            <a:prstDash val="sysDash"/>
+            <a:tailEnd type="arrow"/>
+          </a:ln>
+        </p:spPr>
+        <p:style>
+          <a:lnRef idx="2">
+            <a:schemeClr val="accent1"/>
+          </a:lnRef>
+          <a:fillRef idx="0">
+            <a:schemeClr val="accent1"/>
+          </a:fillRef>
+          <a:effectRef idx="1">
+            <a:schemeClr val="accent1"/>
+          </a:effectRef>
+          <a:fontRef idx="minor">
+            <a:schemeClr val="tx1"/>
+          </a:fontRef>
+        </p:style>
+      </p:cxnSp>
+      <p:sp>
+        <p:nvSpPr>
+          <p:cNvPr id="100" name="Rectangle 99"/>
           <p:cNvSpPr/>
           <p:nvPr/>
         </p:nvSpPr>
         <p:spPr>
           <a:xfrm>
-            <a:off x="5838684" y="4309848"/>
+            <a:off x="5899615" y="2895242"/>
             <a:ext cx="950933" cy="714990"/>
           </a:xfrm>
           <a:prstGeom prst="rect">
             <a:avLst/>
           </a:prstGeom>
-          <a:solidFill>
-            <a:schemeClr val="accent6">
-              <a:lumMod val="60000"/>
-              <a:lumOff val="40000"/>
-            </a:schemeClr>
-          </a:solidFill>
+          <a:noFill/>
           <a:ln w="19050">
             <a:solidFill>
               <a:schemeClr val="tx1"/>
             </a:solidFill>
+            <a:prstDash val="dash"/>
           </a:ln>
         </p:spPr>
         <p:style>
@@ -4118,86 +4380,6 @@
           <a:p>
             <a:pPr algn="ctr"/>
             <a:r>
-              <a:rPr lang="en-US" sz="1400" dirty="0">
-                <a:solidFill>
-                  <a:sysClr val="windowText" lastClr="000000"/>
-                </a:solidFill>
-              </a:rPr>
-              <a:t>Isolated</a:t>
-            </a:r>
-          </a:p>
-          <a:p>
-            <a:pPr algn="ctr"/>
-            <a:r>
-              <a:rPr lang="en-US" sz="1400" dirty="0">
-                <a:solidFill>
-                  <a:sysClr val="windowText" lastClr="000000"/>
-                </a:solidFill>
-              </a:rPr>
-              <a:t>Stationary</a:t>
-            </a:r>
-          </a:p>
-          <a:p>
-            <a:pPr algn="ctr"/>
-            <a:r>
-              <a:rPr lang="en-US" sz="1400" dirty="0">
-                <a:solidFill>
-                  <a:sysClr val="windowText" lastClr="000000"/>
-                </a:solidFill>
-              </a:rPr>
-              <a:t>Group</a:t>
-            </a:r>
-          </a:p>
-        </p:txBody>
-      </p:sp>
-      <p:sp>
-        <p:nvSpPr>
-          <p:cNvPr id="42" name="Rectangle 41"/>
-          <p:cNvSpPr/>
-          <p:nvPr/>
-        </p:nvSpPr>
-        <p:spPr>
-          <a:xfrm>
-            <a:off x="5838683" y="5890384"/>
-            <a:ext cx="950933" cy="714990"/>
-          </a:xfrm>
-          <a:prstGeom prst="rect">
-            <a:avLst/>
-          </a:prstGeom>
-          <a:solidFill>
-            <a:schemeClr val="accent6">
-              <a:lumMod val="60000"/>
-              <a:lumOff val="40000"/>
-            </a:schemeClr>
-          </a:solidFill>
-          <a:ln w="19050">
-            <a:solidFill>
-              <a:schemeClr val="tx1"/>
-            </a:solidFill>
-          </a:ln>
-        </p:spPr>
-        <p:style>
-          <a:lnRef idx="2">
-            <a:schemeClr val="accent1">
-              <a:shade val="50000"/>
-            </a:schemeClr>
-          </a:lnRef>
-          <a:fillRef idx="1">
-            <a:schemeClr val="accent1"/>
-          </a:fillRef>
-          <a:effectRef idx="0">
-            <a:schemeClr val="accent1"/>
-          </a:effectRef>
-          <a:fontRef idx="minor">
-            <a:schemeClr val="lt1"/>
-          </a:fontRef>
-        </p:style>
-        <p:txBody>
-          <a:bodyPr rtlCol="0" anchor="ctr"/>
-          <a:lstStyle/>
-          <a:p>
-            <a:pPr algn="ctr"/>
-            <a:r>
               <a:rPr lang="en-US" sz="1400" dirty="0" smtClean="0">
                 <a:solidFill>
                   <a:sysClr val="windowText" lastClr="000000"/>
@@ -4219,480 +4401,33 @@
           </a:p>
         </p:txBody>
       </p:sp>
-      <p:sp>
-        <p:nvSpPr>
-          <p:cNvPr id="43" name="Rectangle 42"/>
-          <p:cNvSpPr/>
-          <p:nvPr/>
-        </p:nvSpPr>
-        <p:spPr>
-          <a:xfrm>
-            <a:off x="9636287" y="5923508"/>
-            <a:ext cx="950933" cy="714990"/>
-          </a:xfrm>
-          <a:prstGeom prst="rect">
-            <a:avLst/>
-          </a:prstGeom>
-          <a:solidFill>
-            <a:schemeClr val="accent6">
-              <a:lumMod val="60000"/>
-              <a:lumOff val="40000"/>
-            </a:schemeClr>
-          </a:solidFill>
-          <a:ln w="19050">
-            <a:solidFill>
-              <a:schemeClr val="tx1"/>
-            </a:solidFill>
+      <p:cxnSp>
+        <p:nvCxnSpPr>
+          <p:cNvPr id="101" name="Straight Arrow Connector 100"/>
+          <p:cNvCxnSpPr/>
+          <p:nvPr/>
+        </p:nvCxnSpPr>
+        <p:spPr>
+          <a:xfrm>
+            <a:off x="6850548" y="3610232"/>
+            <a:ext cx="475467" cy="1708156"/>
+          </a:xfrm>
+          <a:prstGeom prst="straightConnector1">
+            <a:avLst/>
+          </a:prstGeom>
+          <a:ln w="57150" cmpd="sng">
+            <a:prstDash val="sysDash"/>
+            <a:tailEnd type="arrow"/>
           </a:ln>
         </p:spPr>
         <p:style>
           <a:lnRef idx="2">
-            <a:schemeClr val="accent1">
-              <a:shade val="50000"/>
-            </a:schemeClr>
-          </a:lnRef>
-          <a:fillRef idx="1">
-            <a:schemeClr val="accent1"/>
-          </a:fillRef>
-          <a:effectRef idx="0">
-            <a:schemeClr val="accent1"/>
-          </a:effectRef>
-          <a:fontRef idx="minor">
-            <a:schemeClr val="lt1"/>
-          </a:fontRef>
-        </p:style>
-        <p:txBody>
-          <a:bodyPr rtlCol="0" anchor="ctr"/>
-          <a:lstStyle/>
-          <a:p>
-            <a:pPr algn="ctr"/>
-            <a:r>
-              <a:rPr lang="en-US" sz="1400" dirty="0" smtClean="0">
-                <a:solidFill>
-                  <a:sysClr val="windowText" lastClr="000000"/>
-                </a:solidFill>
-              </a:rPr>
-              <a:t>Exposed</a:t>
-            </a:r>
-          </a:p>
-          <a:p>
-            <a:pPr algn="ctr"/>
-            <a:r>
-              <a:rPr lang="en-US" sz="1400" dirty="0" smtClean="0">
-                <a:solidFill>
-                  <a:sysClr val="windowText" lastClr="000000"/>
-                </a:solidFill>
-              </a:rPr>
-              <a:t>Group</a:t>
-            </a:r>
-          </a:p>
-        </p:txBody>
-      </p:sp>
-      <p:sp>
-        <p:nvSpPr>
-          <p:cNvPr id="44" name="Rectangle 43"/>
-          <p:cNvSpPr/>
-          <p:nvPr/>
-        </p:nvSpPr>
-        <p:spPr>
-          <a:xfrm>
-            <a:off x="10167797" y="4309848"/>
-            <a:ext cx="950933" cy="714990"/>
-          </a:xfrm>
-          <a:prstGeom prst="rect">
-            <a:avLst/>
-          </a:prstGeom>
-          <a:solidFill>
-            <a:schemeClr val="accent6">
-              <a:lumMod val="60000"/>
-              <a:lumOff val="40000"/>
-            </a:schemeClr>
-          </a:solidFill>
-          <a:ln w="19050">
-            <a:solidFill>
-              <a:schemeClr val="tx1"/>
-            </a:solidFill>
-          </a:ln>
-        </p:spPr>
-        <p:style>
-          <a:lnRef idx="2">
-            <a:schemeClr val="accent1">
-              <a:shade val="50000"/>
-            </a:schemeClr>
-          </a:lnRef>
-          <a:fillRef idx="1">
-            <a:schemeClr val="accent1"/>
-          </a:fillRef>
-          <a:effectRef idx="0">
-            <a:schemeClr val="accent1"/>
-          </a:effectRef>
-          <a:fontRef idx="minor">
-            <a:schemeClr val="lt1"/>
-          </a:fontRef>
-        </p:style>
-        <p:txBody>
-          <a:bodyPr rtlCol="0" anchor="ctr"/>
-          <a:lstStyle/>
-          <a:p>
-            <a:pPr algn="ctr"/>
-            <a:r>
-              <a:rPr lang="en-US" sz="1400" dirty="0">
-                <a:solidFill>
-                  <a:sysClr val="windowText" lastClr="000000"/>
-                </a:solidFill>
-              </a:rPr>
-              <a:t>Isolated</a:t>
-            </a:r>
-          </a:p>
-          <a:p>
-            <a:pPr algn="ctr"/>
-            <a:r>
-              <a:rPr lang="en-US" sz="1400" dirty="0">
-                <a:solidFill>
-                  <a:sysClr val="windowText" lastClr="000000"/>
-                </a:solidFill>
-              </a:rPr>
-              <a:t>Stationary</a:t>
-            </a:r>
-          </a:p>
-          <a:p>
-            <a:pPr algn="ctr"/>
-            <a:r>
-              <a:rPr lang="en-US" sz="1400" dirty="0">
-                <a:solidFill>
-                  <a:sysClr val="windowText" lastClr="000000"/>
-                </a:solidFill>
-              </a:rPr>
-              <a:t>Group</a:t>
-            </a:r>
-          </a:p>
-        </p:txBody>
-      </p:sp>
-      <p:sp>
-        <p:nvSpPr>
-          <p:cNvPr id="46" name="Rectangle 45"/>
-          <p:cNvSpPr/>
-          <p:nvPr/>
-        </p:nvSpPr>
-        <p:spPr>
-          <a:xfrm>
-            <a:off x="352423" y="810194"/>
-            <a:ext cx="616992" cy="435660"/>
-          </a:xfrm>
-          <a:prstGeom prst="rect">
-            <a:avLst/>
-          </a:prstGeom>
-          <a:solidFill>
-            <a:schemeClr val="accent6">
-              <a:lumMod val="60000"/>
-              <a:lumOff val="40000"/>
-            </a:schemeClr>
-          </a:solidFill>
-          <a:ln w="19050" cmpd="tri">
-            <a:solidFill>
-              <a:schemeClr val="tx1"/>
-            </a:solidFill>
-          </a:ln>
-        </p:spPr>
-        <p:style>
-          <a:lnRef idx="2">
-            <a:schemeClr val="accent1">
-              <a:shade val="50000"/>
-            </a:schemeClr>
-          </a:lnRef>
-          <a:fillRef idx="1">
-            <a:schemeClr val="accent1"/>
-          </a:fillRef>
-          <a:effectRef idx="0">
-            <a:schemeClr val="accent1"/>
-          </a:effectRef>
-          <a:fontRef idx="minor">
-            <a:schemeClr val="lt1"/>
-          </a:fontRef>
-        </p:style>
-        <p:txBody>
-          <a:bodyPr rtlCol="0" anchor="ctr"/>
-          <a:lstStyle/>
-          <a:p>
-            <a:pPr algn="ctr"/>
-            <a:endParaRPr lang="en-US" sz="1400" dirty="0" smtClean="0">
-              <a:solidFill>
-                <a:sysClr val="windowText" lastClr="000000"/>
-              </a:solidFill>
-            </a:endParaRPr>
-          </a:p>
-        </p:txBody>
-      </p:sp>
-      <p:sp>
-        <p:nvSpPr>
-          <p:cNvPr id="3" name="TextBox 2"/>
-          <p:cNvSpPr txBox="1"/>
-          <p:nvPr/>
-        </p:nvSpPr>
-        <p:spPr>
-          <a:xfrm>
-            <a:off x="1004744" y="828124"/>
-            <a:ext cx="1514476" cy="369332"/>
-          </a:xfrm>
-          <a:prstGeom prst="rect">
-            <a:avLst/>
-          </a:prstGeom>
-          <a:noFill/>
-        </p:spPr>
-        <p:txBody>
-          <a:bodyPr wrap="square" rtlCol="0">
-            <a:spAutoFit/>
-          </a:bodyPr>
-          <a:lstStyle/>
-          <a:p>
-            <a:r>
-              <a:rPr lang="en-US" b="1" dirty="0" smtClean="0"/>
-              <a:t>= Sampled</a:t>
-            </a:r>
-            <a:endParaRPr lang="en-US" b="1" dirty="0"/>
-          </a:p>
-        </p:txBody>
-      </p:sp>
-      <p:sp>
-        <p:nvSpPr>
-          <p:cNvPr id="48" name="TextBox 47"/>
-          <p:cNvSpPr txBox="1"/>
-          <p:nvPr/>
-        </p:nvSpPr>
-        <p:spPr>
-          <a:xfrm>
-            <a:off x="2863045" y="828124"/>
-            <a:ext cx="1865594" cy="369332"/>
-          </a:xfrm>
-          <a:prstGeom prst="rect">
-            <a:avLst/>
-          </a:prstGeom>
-          <a:noFill/>
-        </p:spPr>
-        <p:txBody>
-          <a:bodyPr wrap="square" rtlCol="0">
-            <a:spAutoFit/>
-          </a:bodyPr>
-          <a:lstStyle/>
-          <a:p>
-            <a:r>
-              <a:rPr lang="en-US" b="1" dirty="0" smtClean="0"/>
-              <a:t>= Not Sampled</a:t>
-            </a:r>
-            <a:endParaRPr lang="en-US" b="1" dirty="0"/>
-          </a:p>
-        </p:txBody>
-      </p:sp>
-      <p:sp>
-        <p:nvSpPr>
-          <p:cNvPr id="49" name="Rectangle 48"/>
-          <p:cNvSpPr/>
-          <p:nvPr/>
-        </p:nvSpPr>
-        <p:spPr>
-          <a:xfrm>
-            <a:off x="2246053" y="805179"/>
-            <a:ext cx="616992" cy="435660"/>
-          </a:xfrm>
-          <a:prstGeom prst="rect">
-            <a:avLst/>
-          </a:prstGeom>
-          <a:solidFill>
-            <a:schemeClr val="accent2">
-              <a:lumMod val="40000"/>
-              <a:lumOff val="60000"/>
-            </a:schemeClr>
-          </a:solidFill>
-          <a:ln w="19050">
-            <a:solidFill>
-              <a:schemeClr val="tx1"/>
-            </a:solidFill>
-          </a:ln>
-        </p:spPr>
-        <p:style>
-          <a:lnRef idx="2">
-            <a:schemeClr val="accent1">
-              <a:shade val="50000"/>
-            </a:schemeClr>
-          </a:lnRef>
-          <a:fillRef idx="1">
-            <a:schemeClr val="accent1"/>
-          </a:fillRef>
-          <a:effectRef idx="0">
-            <a:schemeClr val="accent1"/>
-          </a:effectRef>
-          <a:fontRef idx="minor">
-            <a:schemeClr val="lt1"/>
-          </a:fontRef>
-        </p:style>
-        <p:txBody>
-          <a:bodyPr rtlCol="0" anchor="ctr"/>
-          <a:lstStyle/>
-          <a:p>
-            <a:pPr algn="ctr"/>
-            <a:endParaRPr lang="en-US" sz="1400" dirty="0" smtClean="0">
-              <a:solidFill>
-                <a:sysClr val="windowText" lastClr="000000"/>
-              </a:solidFill>
-            </a:endParaRPr>
-          </a:p>
-        </p:txBody>
-      </p:sp>
-      <p:sp>
-        <p:nvSpPr>
-          <p:cNvPr id="53" name="Rectangle 52"/>
-          <p:cNvSpPr/>
-          <p:nvPr/>
-        </p:nvSpPr>
-        <p:spPr>
-          <a:xfrm>
-            <a:off x="1544235" y="3901540"/>
-            <a:ext cx="950933" cy="714990"/>
-          </a:xfrm>
-          <a:prstGeom prst="rect">
-            <a:avLst/>
-          </a:prstGeom>
-          <a:solidFill>
-            <a:schemeClr val="accent6">
-              <a:lumMod val="60000"/>
-              <a:lumOff val="40000"/>
-            </a:schemeClr>
-          </a:solidFill>
-          <a:ln w="19050">
-            <a:solidFill>
-              <a:schemeClr val="tx1"/>
-            </a:solidFill>
-          </a:ln>
-        </p:spPr>
-        <p:style>
-          <a:lnRef idx="2">
-            <a:schemeClr val="accent1">
-              <a:shade val="50000"/>
-            </a:schemeClr>
-          </a:lnRef>
-          <a:fillRef idx="1">
-            <a:schemeClr val="accent1"/>
-          </a:fillRef>
-          <a:effectRef idx="0">
-            <a:schemeClr val="accent1"/>
-          </a:effectRef>
-          <a:fontRef idx="minor">
-            <a:schemeClr val="lt1"/>
-          </a:fontRef>
-        </p:style>
-        <p:txBody>
-          <a:bodyPr rtlCol="0" anchor="ctr"/>
-          <a:lstStyle/>
-          <a:p>
-            <a:pPr algn="ctr"/>
-            <a:r>
-              <a:rPr lang="en-US" sz="1400" dirty="0" smtClean="0">
-                <a:solidFill>
-                  <a:sysClr val="windowText" lastClr="000000"/>
-                </a:solidFill>
-              </a:rPr>
-              <a:t>Migratory Group</a:t>
-            </a:r>
-          </a:p>
-        </p:txBody>
-      </p:sp>
-      <p:sp>
-        <p:nvSpPr>
-          <p:cNvPr id="54" name="Rectangle 53"/>
-          <p:cNvSpPr/>
-          <p:nvPr/>
-        </p:nvSpPr>
-        <p:spPr>
-          <a:xfrm>
-            <a:off x="1004744" y="4785477"/>
-            <a:ext cx="950933" cy="714990"/>
-          </a:xfrm>
-          <a:prstGeom prst="rect">
-            <a:avLst/>
-          </a:prstGeom>
-          <a:solidFill>
-            <a:schemeClr val="accent2">
-              <a:lumMod val="40000"/>
-              <a:lumOff val="60000"/>
-            </a:schemeClr>
-          </a:solidFill>
-          <a:ln w="19050">
-            <a:solidFill>
-              <a:schemeClr val="tx1"/>
-            </a:solidFill>
-          </a:ln>
-        </p:spPr>
-        <p:style>
-          <a:lnRef idx="2">
-            <a:schemeClr val="accent1">
-              <a:shade val="50000"/>
-            </a:schemeClr>
-          </a:lnRef>
-          <a:fillRef idx="1">
-            <a:schemeClr val="accent1"/>
-          </a:fillRef>
-          <a:effectRef idx="0">
-            <a:schemeClr val="accent1"/>
-          </a:effectRef>
-          <a:fontRef idx="minor">
-            <a:schemeClr val="lt1"/>
-          </a:fontRef>
-        </p:style>
-        <p:txBody>
-          <a:bodyPr rtlCol="0" anchor="ctr"/>
-          <a:lstStyle/>
-          <a:p>
-            <a:pPr algn="ctr"/>
-            <a:r>
-              <a:rPr lang="en-US" sz="1400" dirty="0" smtClean="0">
-                <a:solidFill>
-                  <a:sysClr val="windowText" lastClr="000000"/>
-                </a:solidFill>
-              </a:rPr>
-              <a:t>Exposed</a:t>
-            </a:r>
-          </a:p>
-          <a:p>
-            <a:pPr algn="ctr"/>
-            <a:r>
-              <a:rPr lang="en-US" sz="1400" dirty="0" smtClean="0">
-                <a:solidFill>
-                  <a:sysClr val="windowText" lastClr="000000"/>
-                </a:solidFill>
-              </a:rPr>
-              <a:t>Group</a:t>
-            </a:r>
-          </a:p>
-        </p:txBody>
-      </p:sp>
-      <p:cxnSp>
-        <p:nvCxnSpPr>
-          <p:cNvPr id="57" name="Straight Connector 56"/>
-          <p:cNvCxnSpPr/>
-          <p:nvPr/>
-        </p:nvCxnSpPr>
-        <p:spPr>
-          <a:xfrm>
-            <a:off x="2246053" y="814494"/>
-            <a:ext cx="616992" cy="419413"/>
-          </a:xfrm>
-          <a:prstGeom prst="line">
-            <a:avLst/>
-          </a:prstGeom>
-          <a:ln w="38100">
-            <a:solidFill>
-              <a:schemeClr val="tx1"/>
-            </a:solidFill>
-          </a:ln>
-        </p:spPr>
-        <p:style>
-          <a:lnRef idx="1">
             <a:schemeClr val="accent1"/>
           </a:lnRef>
           <a:fillRef idx="0">
             <a:schemeClr val="accent1"/>
           </a:fillRef>
-          <a:effectRef idx="0">
+          <a:effectRef idx="1">
             <a:schemeClr val="accent1"/>
           </a:effectRef>
           <a:fontRef idx="minor">
@@ -4700,114 +4435,10 @@
           </a:fontRef>
         </p:style>
       </p:cxnSp>
-      <p:cxnSp>
-        <p:nvCxnSpPr>
-          <p:cNvPr id="60" name="Straight Connector 59"/>
-          <p:cNvCxnSpPr/>
-          <p:nvPr/>
-        </p:nvCxnSpPr>
-        <p:spPr>
-          <a:xfrm>
-            <a:off x="1004744" y="4787107"/>
-            <a:ext cx="950933" cy="713360"/>
-          </a:xfrm>
-          <a:prstGeom prst="line">
-            <a:avLst/>
-          </a:prstGeom>
-          <a:ln w="38100">
-            <a:solidFill>
-              <a:schemeClr val="tx1"/>
-            </a:solidFill>
-          </a:ln>
-        </p:spPr>
-        <p:style>
-          <a:lnRef idx="1">
-            <a:schemeClr val="accent1"/>
-          </a:lnRef>
-          <a:fillRef idx="0">
-            <a:schemeClr val="accent1"/>
-          </a:fillRef>
-          <a:effectRef idx="0">
-            <a:schemeClr val="accent1"/>
-          </a:effectRef>
-          <a:fontRef idx="minor">
-            <a:schemeClr val="tx1"/>
-          </a:fontRef>
-        </p:style>
-      </p:cxnSp>
-      <p:sp>
-        <p:nvSpPr>
-          <p:cNvPr id="47" name="Rectangle 46"/>
-          <p:cNvSpPr/>
-          <p:nvPr/>
-        </p:nvSpPr>
-        <p:spPr>
-          <a:xfrm>
-            <a:off x="10705153" y="5921011"/>
-            <a:ext cx="950933" cy="714990"/>
-          </a:xfrm>
-          <a:prstGeom prst="rect">
-            <a:avLst/>
-          </a:prstGeom>
-          <a:solidFill>
-            <a:schemeClr val="accent6">
-              <a:lumMod val="60000"/>
-              <a:lumOff val="40000"/>
-            </a:schemeClr>
-          </a:solidFill>
-          <a:ln w="19050">
-            <a:solidFill>
-              <a:schemeClr val="tx1"/>
-            </a:solidFill>
-          </a:ln>
-        </p:spPr>
-        <p:style>
-          <a:lnRef idx="2">
-            <a:schemeClr val="accent1">
-              <a:shade val="50000"/>
-            </a:schemeClr>
-          </a:lnRef>
-          <a:fillRef idx="1">
-            <a:schemeClr val="accent1"/>
-          </a:fillRef>
-          <a:effectRef idx="0">
-            <a:schemeClr val="accent1"/>
-          </a:effectRef>
-          <a:fontRef idx="minor">
-            <a:schemeClr val="lt1"/>
-          </a:fontRef>
-        </p:style>
-        <p:txBody>
-          <a:bodyPr rtlCol="0" anchor="ctr"/>
-          <a:lstStyle/>
-          <a:p>
-            <a:pPr algn="ctr"/>
-            <a:r>
-              <a:rPr lang="en-US" sz="1400" dirty="0" smtClean="0">
-                <a:solidFill>
-                  <a:sysClr val="windowText" lastClr="000000"/>
-                </a:solidFill>
-              </a:rPr>
-              <a:t>Migratory</a:t>
-            </a:r>
-          </a:p>
-          <a:p>
-            <a:pPr algn="ctr"/>
-            <a:r>
-              <a:rPr lang="en-US" sz="1400" dirty="0" smtClean="0">
-                <a:solidFill>
-                  <a:sysClr val="windowText" lastClr="000000"/>
-                </a:solidFill>
-              </a:rPr>
-              <a:t>Group</a:t>
-            </a:r>
-          </a:p>
-        </p:txBody>
-      </p:sp>
     </p:spTree>
     <p:extLst>
       <p:ext uri="{BB962C8B-B14F-4D97-AF65-F5344CB8AC3E}">
-        <p14:creationId xmlns:p14="http://schemas.microsoft.com/office/powerpoint/2010/main" val="3978732107"/>
+        <p14:creationId xmlns:p14="http://schemas.microsoft.com/office/powerpoint/2010/main" val="2443664108"/>
       </p:ext>
     </p:extLst>
   </p:cSld>
@@ -4836,41 +4467,1845 @@
       </p:grpSpPr>
       <p:sp>
         <p:nvSpPr>
-          <p:cNvPr id="3" name="Content Placeholder 2"/>
-          <p:cNvSpPr>
-            <a:spLocks noGrp="1"/>
-          </p:cNvSpPr>
-          <p:nvPr>
-            <p:ph idx="1"/>
-          </p:nvPr>
-        </p:nvSpPr>
-        <p:spPr>
-          <a:xfrm>
-            <a:off x="845388" y="603849"/>
-            <a:ext cx="10508411" cy="5573114"/>
-          </a:xfrm>
-        </p:spPr>
-        <p:txBody>
-          <a:bodyPr>
-            <a:normAutofit/>
+          <p:cNvPr id="5" name="Rectangle 4"/>
+          <p:cNvSpPr/>
+          <p:nvPr/>
+        </p:nvSpPr>
+        <p:spPr>
+          <a:xfrm>
+            <a:off x="352424" y="5751665"/>
+            <a:ext cx="2255577" cy="995826"/>
+          </a:xfrm>
+          <a:prstGeom prst="rect">
+            <a:avLst/>
+          </a:prstGeom>
+          <a:solidFill>
+            <a:schemeClr val="bg1"/>
+          </a:solidFill>
+          <a:ln w="19050">
+            <a:solidFill>
+              <a:schemeClr val="tx1"/>
+            </a:solidFill>
+          </a:ln>
+        </p:spPr>
+        <p:style>
+          <a:lnRef idx="2">
+            <a:schemeClr val="accent1">
+              <a:shade val="50000"/>
+            </a:schemeClr>
+          </a:lnRef>
+          <a:fillRef idx="1">
+            <a:schemeClr val="accent1"/>
+          </a:fillRef>
+          <a:effectRef idx="0">
+            <a:schemeClr val="accent1"/>
+          </a:effectRef>
+          <a:fontRef idx="minor">
+            <a:schemeClr val="lt1"/>
+          </a:fontRef>
+        </p:style>
+        <p:txBody>
+          <a:bodyPr rtlCol="0" anchor="ctr"/>
+          <a:lstStyle/>
+          <a:p>
+            <a:pPr algn="ctr"/>
+            <a:endParaRPr lang="en-US" dirty="0">
+              <a:solidFill>
+                <a:sysClr val="windowText" lastClr="000000"/>
+              </a:solidFill>
+            </a:endParaRPr>
+          </a:p>
+        </p:txBody>
+      </p:sp>
+      <p:sp>
+        <p:nvSpPr>
+          <p:cNvPr id="17" name="Right Arrow 16"/>
+          <p:cNvSpPr/>
+          <p:nvPr/>
+        </p:nvSpPr>
+        <p:spPr>
+          <a:xfrm>
+            <a:off x="2654845" y="2686050"/>
+            <a:ext cx="2473585" cy="3671888"/>
+          </a:xfrm>
+          <a:prstGeom prst="rightArrow">
+            <a:avLst>
+              <a:gd name="adj1" fmla="val 60282"/>
+              <a:gd name="adj2" fmla="val 49422"/>
+            </a:avLst>
+          </a:prstGeom>
+        </p:spPr>
+        <p:style>
+          <a:lnRef idx="2">
+            <a:schemeClr val="accent1">
+              <a:shade val="50000"/>
+            </a:schemeClr>
+          </a:lnRef>
+          <a:fillRef idx="1">
+            <a:schemeClr val="accent1"/>
+          </a:fillRef>
+          <a:effectRef idx="0">
+            <a:schemeClr val="accent1"/>
+          </a:effectRef>
+          <a:fontRef idx="minor">
+            <a:schemeClr val="lt1"/>
+          </a:fontRef>
+        </p:style>
+        <p:txBody>
+          <a:bodyPr rtlCol="0" anchor="ctr"/>
+          <a:lstStyle/>
+          <a:p>
+            <a:pPr algn="ctr"/>
+            <a:r>
+              <a:rPr lang="en-US" dirty="0" smtClean="0"/>
+              <a:t>Migratory Group transported to CA and returned to NC. Exposed Group transferred to Exposed Yard</a:t>
+            </a:r>
+            <a:endParaRPr lang="en-US" dirty="0"/>
+          </a:p>
+        </p:txBody>
+      </p:sp>
+      <p:sp>
+        <p:nvSpPr>
+          <p:cNvPr id="18" name="Right Arrow 17"/>
+          <p:cNvSpPr/>
+          <p:nvPr/>
+        </p:nvSpPr>
+        <p:spPr>
+          <a:xfrm>
+            <a:off x="7499875" y="2686050"/>
+            <a:ext cx="2005557" cy="3671888"/>
+          </a:xfrm>
+          <a:prstGeom prst="rightArrow">
+            <a:avLst/>
+          </a:prstGeom>
+        </p:spPr>
+        <p:style>
+          <a:lnRef idx="2">
+            <a:schemeClr val="accent1">
+              <a:shade val="50000"/>
+            </a:schemeClr>
+          </a:lnRef>
+          <a:fillRef idx="1">
+            <a:schemeClr val="accent1"/>
+          </a:fillRef>
+          <a:effectRef idx="0">
+            <a:schemeClr val="accent1"/>
+          </a:effectRef>
+          <a:fontRef idx="minor">
+            <a:schemeClr val="lt1"/>
+          </a:fontRef>
+        </p:style>
+        <p:txBody>
+          <a:bodyPr rtlCol="0" anchor="ctr"/>
+          <a:lstStyle/>
+          <a:p>
+            <a:pPr algn="ctr"/>
+            <a:r>
+              <a:rPr lang="en-US" dirty="0" smtClean="0"/>
+              <a:t>Migratory Group transferred to Exposed Yard</a:t>
+            </a:r>
+            <a:endParaRPr lang="en-US" dirty="0"/>
+          </a:p>
+        </p:txBody>
+      </p:sp>
+      <p:sp>
+        <p:nvSpPr>
+          <p:cNvPr id="19" name="Rectangle 18"/>
+          <p:cNvSpPr/>
+          <p:nvPr/>
+        </p:nvSpPr>
+        <p:spPr>
+          <a:xfrm>
+            <a:off x="359568" y="1435117"/>
+            <a:ext cx="11418628" cy="677876"/>
+          </a:xfrm>
+          <a:prstGeom prst="rect">
+            <a:avLst/>
+          </a:prstGeom>
+          <a:solidFill>
+            <a:schemeClr val="bg2"/>
+          </a:solidFill>
+          <a:ln w="19050">
+            <a:solidFill>
+              <a:schemeClr val="tx1"/>
+            </a:solidFill>
+          </a:ln>
+        </p:spPr>
+        <p:style>
+          <a:lnRef idx="2">
+            <a:schemeClr val="accent1">
+              <a:shade val="50000"/>
+            </a:schemeClr>
+          </a:lnRef>
+          <a:fillRef idx="1">
+            <a:schemeClr val="accent1"/>
+          </a:fillRef>
+          <a:effectRef idx="0">
+            <a:schemeClr val="accent1"/>
+          </a:effectRef>
+          <a:fontRef idx="minor">
+            <a:schemeClr val="lt1"/>
+          </a:fontRef>
+        </p:style>
+        <p:txBody>
+          <a:bodyPr rtlCol="0" anchor="ctr"/>
+          <a:lstStyle/>
+          <a:p>
+            <a:r>
+              <a:rPr lang="en-US" b="1" dirty="0" smtClean="0">
+                <a:solidFill>
+                  <a:sysClr val="windowText" lastClr="000000"/>
+                </a:solidFill>
+              </a:rPr>
+              <a:t>   Sampling Event 1			                          Sampling Event 2  		</a:t>
+            </a:r>
+            <a:r>
+              <a:rPr lang="en-US" b="1" dirty="0">
+                <a:solidFill>
+                  <a:sysClr val="windowText" lastClr="000000"/>
+                </a:solidFill>
+              </a:rPr>
+              <a:t> </a:t>
+            </a:r>
+            <a:r>
+              <a:rPr lang="en-US" b="1" dirty="0" smtClean="0">
+                <a:solidFill>
+                  <a:sysClr val="windowText" lastClr="000000"/>
+                </a:solidFill>
+              </a:rPr>
+              <a:t>                   Sampling Event 3</a:t>
+            </a:r>
+          </a:p>
+          <a:p>
+            <a:r>
+              <a:rPr lang="en-US" dirty="0">
+                <a:solidFill>
+                  <a:sysClr val="windowText" lastClr="000000"/>
+                </a:solidFill>
+              </a:rPr>
+              <a:t>	</a:t>
+            </a:r>
+            <a:r>
+              <a:rPr lang="en-US" dirty="0" smtClean="0">
+                <a:solidFill>
+                  <a:sysClr val="windowText" lastClr="000000"/>
+                </a:solidFill>
+              </a:rPr>
+              <a:t>			</a:t>
+            </a:r>
+            <a:r>
+              <a:rPr lang="en-US" i="1" dirty="0" smtClean="0">
+                <a:solidFill>
+                  <a:sysClr val="windowText" lastClr="000000"/>
+                </a:solidFill>
+              </a:rPr>
+              <a:t>               (when migratory group returned)	            (after 1 month exposure)</a:t>
+            </a:r>
+          </a:p>
+        </p:txBody>
+      </p:sp>
+      <p:sp>
+        <p:nvSpPr>
+          <p:cNvPr id="20" name="TextBox 19"/>
+          <p:cNvSpPr txBox="1"/>
+          <p:nvPr/>
+        </p:nvSpPr>
+        <p:spPr>
+          <a:xfrm>
+            <a:off x="1109100" y="32267"/>
+            <a:ext cx="10410097" cy="523220"/>
+          </a:xfrm>
+          <a:prstGeom prst="rect">
+            <a:avLst/>
+          </a:prstGeom>
+          <a:noFill/>
+        </p:spPr>
+        <p:txBody>
+          <a:bodyPr wrap="square" rtlCol="0">
+            <a:spAutoFit/>
           </a:bodyPr>
           <a:lstStyle/>
           <a:p>
-            <a:pPr marL="0" indent="0">
-              <a:buNone/>
-            </a:pPr>
+            <a:pPr algn="ctr"/>
+            <a:r>
+              <a:rPr lang="en-US" sz="2800" dirty="0" smtClean="0"/>
+              <a:t>Experimental Design for Migratory/Stationary Honey Bee Experiment </a:t>
+            </a:r>
+            <a:endParaRPr lang="en-US" sz="2800" dirty="0"/>
+          </a:p>
+        </p:txBody>
+      </p:sp>
+      <p:sp>
+        <p:nvSpPr>
+          <p:cNvPr id="21" name="Rectangle 20"/>
+          <p:cNvSpPr/>
+          <p:nvPr/>
+        </p:nvSpPr>
+        <p:spPr>
+          <a:xfrm>
+            <a:off x="352425" y="3422326"/>
+            <a:ext cx="2255577" cy="2192661"/>
+          </a:xfrm>
+          <a:prstGeom prst="rect">
+            <a:avLst/>
+          </a:prstGeom>
+          <a:solidFill>
+            <a:schemeClr val="bg1"/>
+          </a:solidFill>
+          <a:ln w="19050">
+            <a:solidFill>
+              <a:schemeClr val="tx1"/>
+            </a:solidFill>
+          </a:ln>
+        </p:spPr>
+        <p:style>
+          <a:lnRef idx="2">
+            <a:schemeClr val="accent1">
+              <a:shade val="50000"/>
+            </a:schemeClr>
+          </a:lnRef>
+          <a:fillRef idx="1">
+            <a:schemeClr val="accent1"/>
+          </a:fillRef>
+          <a:effectRef idx="0">
+            <a:schemeClr val="accent1"/>
+          </a:effectRef>
+          <a:fontRef idx="minor">
+            <a:schemeClr val="lt1"/>
+          </a:fontRef>
+        </p:style>
+        <p:txBody>
+          <a:bodyPr rtlCol="0" anchor="ctr"/>
+          <a:lstStyle/>
+          <a:p>
+            <a:pPr algn="ctr"/>
+            <a:endParaRPr lang="en-US" dirty="0">
+              <a:solidFill>
+                <a:sysClr val="windowText" lastClr="000000"/>
+              </a:solidFill>
+            </a:endParaRPr>
+          </a:p>
+        </p:txBody>
+      </p:sp>
+      <p:sp>
+        <p:nvSpPr>
+          <p:cNvPr id="22" name="Rectangle 21"/>
+          <p:cNvSpPr/>
+          <p:nvPr/>
+        </p:nvSpPr>
+        <p:spPr>
+          <a:xfrm>
+            <a:off x="352425" y="2197588"/>
+            <a:ext cx="2255577" cy="1094565"/>
+          </a:xfrm>
+          <a:prstGeom prst="rect">
+            <a:avLst/>
+          </a:prstGeom>
+          <a:solidFill>
+            <a:schemeClr val="bg1"/>
+          </a:solidFill>
+          <a:ln w="19050">
+            <a:solidFill>
+              <a:schemeClr val="tx1"/>
+            </a:solidFill>
+          </a:ln>
+        </p:spPr>
+        <p:style>
+          <a:lnRef idx="2">
+            <a:schemeClr val="accent1">
+              <a:shade val="50000"/>
+            </a:schemeClr>
+          </a:lnRef>
+          <a:fillRef idx="1">
+            <a:schemeClr val="accent1"/>
+          </a:fillRef>
+          <a:effectRef idx="0">
+            <a:schemeClr val="accent1"/>
+          </a:effectRef>
+          <a:fontRef idx="minor">
+            <a:schemeClr val="lt1"/>
+          </a:fontRef>
+        </p:style>
+        <p:txBody>
+          <a:bodyPr rtlCol="0" anchor="ctr"/>
+          <a:lstStyle/>
+          <a:p>
+            <a:pPr algn="ctr"/>
+            <a:endParaRPr lang="en-US" dirty="0">
+              <a:solidFill>
+                <a:sysClr val="windowText" lastClr="000000"/>
+              </a:solidFill>
+            </a:endParaRPr>
+          </a:p>
+        </p:txBody>
+      </p:sp>
+      <p:sp>
+        <p:nvSpPr>
+          <p:cNvPr id="23" name="Rectangle 22"/>
+          <p:cNvSpPr/>
+          <p:nvPr/>
+        </p:nvSpPr>
+        <p:spPr>
+          <a:xfrm>
+            <a:off x="5186365" y="5382334"/>
+            <a:ext cx="2255577" cy="1365157"/>
+          </a:xfrm>
+          <a:prstGeom prst="rect">
+            <a:avLst/>
+          </a:prstGeom>
+          <a:solidFill>
+            <a:schemeClr val="bg1"/>
+          </a:solidFill>
+          <a:ln w="19050">
+            <a:solidFill>
+              <a:schemeClr val="tx1"/>
+            </a:solidFill>
+          </a:ln>
+        </p:spPr>
+        <p:style>
+          <a:lnRef idx="2">
+            <a:schemeClr val="accent1">
+              <a:shade val="50000"/>
+            </a:schemeClr>
+          </a:lnRef>
+          <a:fillRef idx="1">
+            <a:schemeClr val="accent1"/>
+          </a:fillRef>
+          <a:effectRef idx="0">
+            <a:schemeClr val="accent1"/>
+          </a:effectRef>
+          <a:fontRef idx="minor">
+            <a:schemeClr val="lt1"/>
+          </a:fontRef>
+        </p:style>
+        <p:txBody>
+          <a:bodyPr rtlCol="0" anchor="ctr"/>
+          <a:lstStyle/>
+          <a:p>
+            <a:pPr algn="ctr"/>
+            <a:endParaRPr lang="en-US" dirty="0">
+              <a:solidFill>
+                <a:sysClr val="windowText" lastClr="000000"/>
+              </a:solidFill>
+            </a:endParaRPr>
+          </a:p>
+        </p:txBody>
+      </p:sp>
+      <p:sp>
+        <p:nvSpPr>
+          <p:cNvPr id="24" name="Rectangle 23"/>
+          <p:cNvSpPr/>
+          <p:nvPr/>
+        </p:nvSpPr>
+        <p:spPr>
+          <a:xfrm>
+            <a:off x="5186365" y="3789961"/>
+            <a:ext cx="2255577" cy="1365157"/>
+          </a:xfrm>
+          <a:prstGeom prst="rect">
+            <a:avLst/>
+          </a:prstGeom>
+          <a:solidFill>
+            <a:schemeClr val="bg1"/>
+          </a:solidFill>
+          <a:ln w="19050">
+            <a:solidFill>
+              <a:schemeClr val="tx1"/>
+            </a:solidFill>
+          </a:ln>
+        </p:spPr>
+        <p:style>
+          <a:lnRef idx="2">
+            <a:schemeClr val="accent1">
+              <a:shade val="50000"/>
+            </a:schemeClr>
+          </a:lnRef>
+          <a:fillRef idx="1">
+            <a:schemeClr val="accent1"/>
+          </a:fillRef>
+          <a:effectRef idx="0">
+            <a:schemeClr val="accent1"/>
+          </a:effectRef>
+          <a:fontRef idx="minor">
+            <a:schemeClr val="lt1"/>
+          </a:fontRef>
+        </p:style>
+        <p:txBody>
+          <a:bodyPr rtlCol="0" anchor="ctr"/>
+          <a:lstStyle/>
+          <a:p>
+            <a:pPr algn="ctr"/>
+            <a:endParaRPr lang="en-US" dirty="0">
+              <a:solidFill>
+                <a:sysClr val="windowText" lastClr="000000"/>
+              </a:solidFill>
+            </a:endParaRPr>
+          </a:p>
+        </p:txBody>
+      </p:sp>
+      <p:sp>
+        <p:nvSpPr>
+          <p:cNvPr id="25" name="Rectangle 24"/>
+          <p:cNvSpPr/>
+          <p:nvPr/>
+        </p:nvSpPr>
+        <p:spPr>
+          <a:xfrm>
+            <a:off x="5186365" y="2197587"/>
+            <a:ext cx="2255577" cy="1365157"/>
+          </a:xfrm>
+          <a:prstGeom prst="rect">
+            <a:avLst/>
+          </a:prstGeom>
+          <a:solidFill>
+            <a:schemeClr val="bg1"/>
+          </a:solidFill>
+          <a:ln w="19050">
+            <a:solidFill>
+              <a:schemeClr val="tx1"/>
+            </a:solidFill>
+          </a:ln>
+        </p:spPr>
+        <p:style>
+          <a:lnRef idx="2">
+            <a:schemeClr val="accent1">
+              <a:shade val="50000"/>
+            </a:schemeClr>
+          </a:lnRef>
+          <a:fillRef idx="1">
+            <a:schemeClr val="accent1"/>
+          </a:fillRef>
+          <a:effectRef idx="0">
+            <a:schemeClr val="accent1"/>
+          </a:effectRef>
+          <a:fontRef idx="minor">
+            <a:schemeClr val="lt1"/>
+          </a:fontRef>
+        </p:style>
+        <p:txBody>
+          <a:bodyPr rtlCol="0" anchor="ctr"/>
+          <a:lstStyle/>
+          <a:p>
+            <a:pPr algn="ctr"/>
+            <a:endParaRPr lang="en-US" dirty="0">
+              <a:solidFill>
+                <a:sysClr val="windowText" lastClr="000000"/>
+              </a:solidFill>
+            </a:endParaRPr>
+          </a:p>
+        </p:txBody>
+      </p:sp>
+      <p:sp>
+        <p:nvSpPr>
+          <p:cNvPr id="26" name="Rectangle 25"/>
+          <p:cNvSpPr/>
+          <p:nvPr/>
+        </p:nvSpPr>
+        <p:spPr>
+          <a:xfrm>
+            <a:off x="9515476" y="3789960"/>
+            <a:ext cx="2255577" cy="1365157"/>
+          </a:xfrm>
+          <a:prstGeom prst="rect">
+            <a:avLst/>
+          </a:prstGeom>
+          <a:solidFill>
+            <a:schemeClr val="bg1"/>
+          </a:solidFill>
+          <a:ln w="19050">
+            <a:solidFill>
+              <a:schemeClr val="tx1"/>
+            </a:solidFill>
+          </a:ln>
+        </p:spPr>
+        <p:style>
+          <a:lnRef idx="2">
+            <a:schemeClr val="accent1">
+              <a:shade val="50000"/>
+            </a:schemeClr>
+          </a:lnRef>
+          <a:fillRef idx="1">
+            <a:schemeClr val="accent1"/>
+          </a:fillRef>
+          <a:effectRef idx="0">
+            <a:schemeClr val="accent1"/>
+          </a:effectRef>
+          <a:fontRef idx="minor">
+            <a:schemeClr val="lt1"/>
+          </a:fontRef>
+        </p:style>
+        <p:txBody>
+          <a:bodyPr rtlCol="0" anchor="ctr"/>
+          <a:lstStyle/>
+          <a:p>
+            <a:pPr algn="ctr"/>
+            <a:endParaRPr lang="en-US" dirty="0">
+              <a:solidFill>
+                <a:sysClr val="windowText" lastClr="000000"/>
+              </a:solidFill>
+            </a:endParaRPr>
+          </a:p>
+        </p:txBody>
+      </p:sp>
+      <p:sp>
+        <p:nvSpPr>
+          <p:cNvPr id="27" name="Rectangle 26"/>
+          <p:cNvSpPr/>
+          <p:nvPr/>
+        </p:nvSpPr>
+        <p:spPr>
+          <a:xfrm>
+            <a:off x="9515476" y="5382333"/>
+            <a:ext cx="2255577" cy="1365157"/>
+          </a:xfrm>
+          <a:prstGeom prst="rect">
+            <a:avLst/>
+          </a:prstGeom>
+          <a:solidFill>
+            <a:schemeClr val="bg1"/>
+          </a:solidFill>
+          <a:ln w="19050">
+            <a:solidFill>
+              <a:schemeClr val="tx1"/>
+            </a:solidFill>
+          </a:ln>
+        </p:spPr>
+        <p:style>
+          <a:lnRef idx="2">
+            <a:schemeClr val="accent1">
+              <a:shade val="50000"/>
+            </a:schemeClr>
+          </a:lnRef>
+          <a:fillRef idx="1">
+            <a:schemeClr val="accent1"/>
+          </a:fillRef>
+          <a:effectRef idx="0">
+            <a:schemeClr val="accent1"/>
+          </a:effectRef>
+          <a:fontRef idx="minor">
+            <a:schemeClr val="lt1"/>
+          </a:fontRef>
+        </p:style>
+        <p:txBody>
+          <a:bodyPr rtlCol="0" anchor="ctr"/>
+          <a:lstStyle/>
+          <a:p>
+            <a:pPr algn="ctr"/>
+            <a:endParaRPr lang="en-US" dirty="0">
+              <a:solidFill>
+                <a:sysClr val="windowText" lastClr="000000"/>
+              </a:solidFill>
+            </a:endParaRPr>
+          </a:p>
+        </p:txBody>
+      </p:sp>
+      <p:sp>
+        <p:nvSpPr>
+          <p:cNvPr id="28" name="Rectangle 27"/>
+          <p:cNvSpPr/>
+          <p:nvPr/>
+        </p:nvSpPr>
+        <p:spPr>
+          <a:xfrm>
+            <a:off x="9515476" y="2197586"/>
+            <a:ext cx="2255577" cy="1365157"/>
+          </a:xfrm>
+          <a:prstGeom prst="rect">
+            <a:avLst/>
+          </a:prstGeom>
+          <a:solidFill>
+            <a:schemeClr val="bg1"/>
+          </a:solidFill>
+          <a:ln w="19050">
+            <a:solidFill>
+              <a:schemeClr val="tx1"/>
+            </a:solidFill>
+          </a:ln>
+        </p:spPr>
+        <p:style>
+          <a:lnRef idx="2">
+            <a:schemeClr val="accent1">
+              <a:shade val="50000"/>
+            </a:schemeClr>
+          </a:lnRef>
+          <a:fillRef idx="1">
+            <a:schemeClr val="accent1"/>
+          </a:fillRef>
+          <a:effectRef idx="0">
+            <a:schemeClr val="accent1"/>
+          </a:effectRef>
+          <a:fontRef idx="minor">
+            <a:schemeClr val="lt1"/>
+          </a:fontRef>
+        </p:style>
+        <p:txBody>
+          <a:bodyPr rtlCol="0" anchor="ctr"/>
+          <a:lstStyle/>
+          <a:p>
+            <a:pPr algn="ctr"/>
+            <a:endParaRPr lang="en-US" dirty="0">
+              <a:solidFill>
+                <a:sysClr val="windowText" lastClr="000000"/>
+              </a:solidFill>
+            </a:endParaRPr>
+          </a:p>
+        </p:txBody>
+      </p:sp>
+      <p:sp>
+        <p:nvSpPr>
+          <p:cNvPr id="2" name="TextBox 1"/>
+          <p:cNvSpPr txBox="1"/>
+          <p:nvPr/>
+        </p:nvSpPr>
+        <p:spPr>
+          <a:xfrm>
+            <a:off x="352424" y="2197586"/>
+            <a:ext cx="2255577" cy="646331"/>
+          </a:xfrm>
+          <a:prstGeom prst="rect">
+            <a:avLst/>
+          </a:prstGeom>
+          <a:noFill/>
+        </p:spPr>
+        <p:txBody>
+          <a:bodyPr wrap="square" rtlCol="0">
+            <a:spAutoFit/>
+          </a:bodyPr>
+          <a:lstStyle/>
+          <a:p>
+            <a:pPr algn="ctr"/>
             <a:r>
               <a:rPr lang="en-US" dirty="0" smtClean="0"/>
-              <a:t>Schematic showing experimental design. Three sampling events occurred during the experiment. Green boxes represent each group of 16 hives sampled during the specified sampling event. Slashed red boxes represent each group of 16 hives not sampled during that sampling event. Three experimental groups (Isolated Stationary Group, Migratory Group, and Exposed Group) are spread across three separate yards throughout the experiment: The Stationary Yard (where all groups begin and the Isolated Stationary Group remains for the duration of the experiment), the Migratory Holding Yard (where the Migratory Group is temporarily brought upon return from CA for sampling event 2), and the Exposed Yard (where the Exposed Group is exposed to the Migratory Group). Arrows represent tasks that occurred between each sampling event.</a:t>
+              <a:t>MIGRATORY HOLDING YARD</a:t>
             </a:r>
             <a:endParaRPr lang="en-US" dirty="0"/>
+          </a:p>
+        </p:txBody>
+      </p:sp>
+      <p:sp>
+        <p:nvSpPr>
+          <p:cNvPr id="29" name="TextBox 28"/>
+          <p:cNvSpPr txBox="1"/>
+          <p:nvPr/>
+        </p:nvSpPr>
+        <p:spPr>
+          <a:xfrm>
+            <a:off x="334193" y="3462470"/>
+            <a:ext cx="2255577" cy="369332"/>
+          </a:xfrm>
+          <a:prstGeom prst="rect">
+            <a:avLst/>
+          </a:prstGeom>
+          <a:noFill/>
+        </p:spPr>
+        <p:txBody>
+          <a:bodyPr wrap="square" rtlCol="0">
+            <a:spAutoFit/>
+          </a:bodyPr>
+          <a:lstStyle/>
+          <a:p>
+            <a:pPr algn="ctr"/>
+            <a:r>
+              <a:rPr lang="en-US" dirty="0" smtClean="0"/>
+              <a:t>STATIONARY YARD</a:t>
+            </a:r>
+            <a:endParaRPr lang="en-US" dirty="0"/>
+          </a:p>
+        </p:txBody>
+      </p:sp>
+      <p:sp>
+        <p:nvSpPr>
+          <p:cNvPr id="30" name="TextBox 29"/>
+          <p:cNvSpPr txBox="1"/>
+          <p:nvPr/>
+        </p:nvSpPr>
+        <p:spPr>
+          <a:xfrm>
+            <a:off x="352423" y="5737519"/>
+            <a:ext cx="2255577" cy="369332"/>
+          </a:xfrm>
+          <a:prstGeom prst="rect">
+            <a:avLst/>
+          </a:prstGeom>
+          <a:noFill/>
+        </p:spPr>
+        <p:txBody>
+          <a:bodyPr wrap="square" rtlCol="0">
+            <a:spAutoFit/>
+          </a:bodyPr>
+          <a:lstStyle/>
+          <a:p>
+            <a:pPr algn="ctr"/>
+            <a:r>
+              <a:rPr lang="en-US" dirty="0" smtClean="0"/>
+              <a:t>EXPOSED YARD</a:t>
+            </a:r>
+            <a:endParaRPr lang="en-US" dirty="0"/>
+          </a:p>
+        </p:txBody>
+      </p:sp>
+      <p:sp>
+        <p:nvSpPr>
+          <p:cNvPr id="31" name="TextBox 30"/>
+          <p:cNvSpPr txBox="1"/>
+          <p:nvPr/>
+        </p:nvSpPr>
+        <p:spPr>
+          <a:xfrm>
+            <a:off x="5186365" y="2197586"/>
+            <a:ext cx="2255577" cy="646331"/>
+          </a:xfrm>
+          <a:prstGeom prst="rect">
+            <a:avLst/>
+          </a:prstGeom>
+          <a:noFill/>
+        </p:spPr>
+        <p:txBody>
+          <a:bodyPr wrap="square" rtlCol="0">
+            <a:spAutoFit/>
+          </a:bodyPr>
+          <a:lstStyle/>
+          <a:p>
+            <a:pPr algn="ctr"/>
+            <a:r>
+              <a:rPr lang="en-US" dirty="0" smtClean="0"/>
+              <a:t>MIGRATORY HOLDING YARD</a:t>
+            </a:r>
+            <a:endParaRPr lang="en-US" dirty="0"/>
+          </a:p>
+        </p:txBody>
+      </p:sp>
+      <p:sp>
+        <p:nvSpPr>
+          <p:cNvPr id="32" name="TextBox 31"/>
+          <p:cNvSpPr txBox="1"/>
+          <p:nvPr/>
+        </p:nvSpPr>
+        <p:spPr>
+          <a:xfrm>
+            <a:off x="5186364" y="3789960"/>
+            <a:ext cx="2255577" cy="369332"/>
+          </a:xfrm>
+          <a:prstGeom prst="rect">
+            <a:avLst/>
+          </a:prstGeom>
+          <a:noFill/>
+        </p:spPr>
+        <p:txBody>
+          <a:bodyPr wrap="square" rtlCol="0">
+            <a:spAutoFit/>
+          </a:bodyPr>
+          <a:lstStyle/>
+          <a:p>
+            <a:pPr algn="ctr"/>
+            <a:r>
+              <a:rPr lang="en-US" dirty="0" smtClean="0"/>
+              <a:t>STATIONARY YARD</a:t>
+            </a:r>
+            <a:endParaRPr lang="en-US" dirty="0"/>
+          </a:p>
+        </p:txBody>
+      </p:sp>
+      <p:sp>
+        <p:nvSpPr>
+          <p:cNvPr id="33" name="TextBox 32"/>
+          <p:cNvSpPr txBox="1"/>
+          <p:nvPr/>
+        </p:nvSpPr>
+        <p:spPr>
+          <a:xfrm>
+            <a:off x="5186364" y="5382333"/>
+            <a:ext cx="2255577" cy="369332"/>
+          </a:xfrm>
+          <a:prstGeom prst="rect">
+            <a:avLst/>
+          </a:prstGeom>
+          <a:noFill/>
+        </p:spPr>
+        <p:txBody>
+          <a:bodyPr wrap="square" rtlCol="0">
+            <a:spAutoFit/>
+          </a:bodyPr>
+          <a:lstStyle/>
+          <a:p>
+            <a:pPr algn="ctr"/>
+            <a:r>
+              <a:rPr lang="en-US" dirty="0" smtClean="0"/>
+              <a:t>EXPOSED YARD</a:t>
+            </a:r>
+            <a:endParaRPr lang="en-US" dirty="0"/>
+          </a:p>
+        </p:txBody>
+      </p:sp>
+      <p:sp>
+        <p:nvSpPr>
+          <p:cNvPr id="34" name="TextBox 33"/>
+          <p:cNvSpPr txBox="1"/>
+          <p:nvPr/>
+        </p:nvSpPr>
+        <p:spPr>
+          <a:xfrm>
+            <a:off x="9522620" y="2197586"/>
+            <a:ext cx="2255577" cy="646331"/>
+          </a:xfrm>
+          <a:prstGeom prst="rect">
+            <a:avLst/>
+          </a:prstGeom>
+          <a:noFill/>
+        </p:spPr>
+        <p:txBody>
+          <a:bodyPr wrap="square" rtlCol="0">
+            <a:spAutoFit/>
+          </a:bodyPr>
+          <a:lstStyle/>
+          <a:p>
+            <a:pPr algn="ctr"/>
+            <a:r>
+              <a:rPr lang="en-US" dirty="0" smtClean="0"/>
+              <a:t>MIGRATORY HOLDING YARD</a:t>
+            </a:r>
+            <a:endParaRPr lang="en-US" dirty="0"/>
+          </a:p>
+        </p:txBody>
+      </p:sp>
+      <p:sp>
+        <p:nvSpPr>
+          <p:cNvPr id="35" name="TextBox 34"/>
+          <p:cNvSpPr txBox="1"/>
+          <p:nvPr/>
+        </p:nvSpPr>
+        <p:spPr>
+          <a:xfrm>
+            <a:off x="9522619" y="3789960"/>
+            <a:ext cx="2255577" cy="369332"/>
+          </a:xfrm>
+          <a:prstGeom prst="rect">
+            <a:avLst/>
+          </a:prstGeom>
+          <a:noFill/>
+        </p:spPr>
+        <p:txBody>
+          <a:bodyPr wrap="square" rtlCol="0">
+            <a:spAutoFit/>
+          </a:bodyPr>
+          <a:lstStyle/>
+          <a:p>
+            <a:pPr algn="ctr"/>
+            <a:r>
+              <a:rPr lang="en-US" dirty="0" smtClean="0"/>
+              <a:t>STATIONARY YARD</a:t>
+            </a:r>
+            <a:endParaRPr lang="en-US" dirty="0"/>
+          </a:p>
+        </p:txBody>
+      </p:sp>
+      <p:sp>
+        <p:nvSpPr>
+          <p:cNvPr id="36" name="TextBox 35"/>
+          <p:cNvSpPr txBox="1"/>
+          <p:nvPr/>
+        </p:nvSpPr>
+        <p:spPr>
+          <a:xfrm>
+            <a:off x="9522619" y="5382333"/>
+            <a:ext cx="2255577" cy="369332"/>
+          </a:xfrm>
+          <a:prstGeom prst="rect">
+            <a:avLst/>
+          </a:prstGeom>
+          <a:noFill/>
+        </p:spPr>
+        <p:txBody>
+          <a:bodyPr wrap="square" rtlCol="0">
+            <a:spAutoFit/>
+          </a:bodyPr>
+          <a:lstStyle/>
+          <a:p>
+            <a:pPr algn="ctr"/>
+            <a:r>
+              <a:rPr lang="en-US" dirty="0" smtClean="0"/>
+              <a:t>EXPOSED YARD</a:t>
+            </a:r>
+            <a:endParaRPr lang="en-US" dirty="0"/>
+          </a:p>
+        </p:txBody>
+      </p:sp>
+      <p:sp>
+        <p:nvSpPr>
+          <p:cNvPr id="37" name="Rectangle 36"/>
+          <p:cNvSpPr/>
+          <p:nvPr/>
+        </p:nvSpPr>
+        <p:spPr>
+          <a:xfrm>
+            <a:off x="467798" y="3901540"/>
+            <a:ext cx="950933" cy="714990"/>
+          </a:xfrm>
+          <a:prstGeom prst="rect">
+            <a:avLst/>
+          </a:prstGeom>
+          <a:solidFill>
+            <a:schemeClr val="accent6">
+              <a:lumMod val="60000"/>
+              <a:lumOff val="40000"/>
+            </a:schemeClr>
+          </a:solidFill>
+          <a:ln w="19050">
+            <a:solidFill>
+              <a:schemeClr val="tx1"/>
+            </a:solidFill>
+          </a:ln>
+        </p:spPr>
+        <p:style>
+          <a:lnRef idx="2">
+            <a:schemeClr val="accent1">
+              <a:shade val="50000"/>
+            </a:schemeClr>
+          </a:lnRef>
+          <a:fillRef idx="1">
+            <a:schemeClr val="accent1"/>
+          </a:fillRef>
+          <a:effectRef idx="0">
+            <a:schemeClr val="accent1"/>
+          </a:effectRef>
+          <a:fontRef idx="minor">
+            <a:schemeClr val="lt1"/>
+          </a:fontRef>
+        </p:style>
+        <p:txBody>
+          <a:bodyPr rtlCol="0" anchor="ctr"/>
+          <a:lstStyle/>
+          <a:p>
+            <a:pPr algn="ctr"/>
+            <a:r>
+              <a:rPr lang="en-US" sz="1400" dirty="0" smtClean="0">
+                <a:solidFill>
+                  <a:sysClr val="windowText" lastClr="000000"/>
+                </a:solidFill>
+              </a:rPr>
+              <a:t>Isolated</a:t>
+            </a:r>
+          </a:p>
+          <a:p>
+            <a:pPr algn="ctr"/>
+            <a:r>
+              <a:rPr lang="en-US" sz="1400" dirty="0" smtClean="0">
+                <a:solidFill>
+                  <a:sysClr val="windowText" lastClr="000000"/>
+                </a:solidFill>
+              </a:rPr>
+              <a:t>Stationary</a:t>
+            </a:r>
+          </a:p>
+          <a:p>
+            <a:pPr algn="ctr"/>
+            <a:r>
+              <a:rPr lang="en-US" sz="1400" dirty="0" smtClean="0">
+                <a:solidFill>
+                  <a:sysClr val="windowText" lastClr="000000"/>
+                </a:solidFill>
+              </a:rPr>
+              <a:t>Group</a:t>
+            </a:r>
+          </a:p>
+        </p:txBody>
+      </p:sp>
+      <p:sp>
+        <p:nvSpPr>
+          <p:cNvPr id="40" name="Rectangle 39"/>
+          <p:cNvSpPr/>
+          <p:nvPr/>
+        </p:nvSpPr>
+        <p:spPr>
+          <a:xfrm>
+            <a:off x="5838681" y="2794134"/>
+            <a:ext cx="950933" cy="714990"/>
+          </a:xfrm>
+          <a:prstGeom prst="rect">
+            <a:avLst/>
+          </a:prstGeom>
+          <a:solidFill>
+            <a:schemeClr val="accent6">
+              <a:lumMod val="60000"/>
+              <a:lumOff val="40000"/>
+            </a:schemeClr>
+          </a:solidFill>
+          <a:ln w="19050">
+            <a:solidFill>
+              <a:schemeClr val="tx1"/>
+            </a:solidFill>
+          </a:ln>
+        </p:spPr>
+        <p:style>
+          <a:lnRef idx="2">
+            <a:schemeClr val="accent1">
+              <a:shade val="50000"/>
+            </a:schemeClr>
+          </a:lnRef>
+          <a:fillRef idx="1">
+            <a:schemeClr val="accent1"/>
+          </a:fillRef>
+          <a:effectRef idx="0">
+            <a:schemeClr val="accent1"/>
+          </a:effectRef>
+          <a:fontRef idx="minor">
+            <a:schemeClr val="lt1"/>
+          </a:fontRef>
+        </p:style>
+        <p:txBody>
+          <a:bodyPr rtlCol="0" anchor="ctr"/>
+          <a:lstStyle/>
+          <a:p>
+            <a:pPr algn="ctr"/>
+            <a:r>
+              <a:rPr lang="en-US" sz="1400" dirty="0" smtClean="0">
+                <a:solidFill>
+                  <a:sysClr val="windowText" lastClr="000000"/>
+                </a:solidFill>
+              </a:rPr>
+              <a:t>Migratory Group</a:t>
+            </a:r>
+          </a:p>
+        </p:txBody>
+      </p:sp>
+      <p:sp>
+        <p:nvSpPr>
+          <p:cNvPr id="41" name="Rectangle 40"/>
+          <p:cNvSpPr/>
+          <p:nvPr/>
+        </p:nvSpPr>
+        <p:spPr>
+          <a:xfrm>
+            <a:off x="5838684" y="4309848"/>
+            <a:ext cx="950933" cy="714990"/>
+          </a:xfrm>
+          <a:prstGeom prst="rect">
+            <a:avLst/>
+          </a:prstGeom>
+          <a:solidFill>
+            <a:schemeClr val="accent6">
+              <a:lumMod val="60000"/>
+              <a:lumOff val="40000"/>
+            </a:schemeClr>
+          </a:solidFill>
+          <a:ln w="19050">
+            <a:solidFill>
+              <a:schemeClr val="tx1"/>
+            </a:solidFill>
+          </a:ln>
+        </p:spPr>
+        <p:style>
+          <a:lnRef idx="2">
+            <a:schemeClr val="accent1">
+              <a:shade val="50000"/>
+            </a:schemeClr>
+          </a:lnRef>
+          <a:fillRef idx="1">
+            <a:schemeClr val="accent1"/>
+          </a:fillRef>
+          <a:effectRef idx="0">
+            <a:schemeClr val="accent1"/>
+          </a:effectRef>
+          <a:fontRef idx="minor">
+            <a:schemeClr val="lt1"/>
+          </a:fontRef>
+        </p:style>
+        <p:txBody>
+          <a:bodyPr rtlCol="0" anchor="ctr"/>
+          <a:lstStyle/>
+          <a:p>
+            <a:pPr algn="ctr"/>
+            <a:r>
+              <a:rPr lang="en-US" sz="1400" dirty="0">
+                <a:solidFill>
+                  <a:sysClr val="windowText" lastClr="000000"/>
+                </a:solidFill>
+              </a:rPr>
+              <a:t>Isolated</a:t>
+            </a:r>
+          </a:p>
+          <a:p>
+            <a:pPr algn="ctr"/>
+            <a:r>
+              <a:rPr lang="en-US" sz="1400" dirty="0">
+                <a:solidFill>
+                  <a:sysClr val="windowText" lastClr="000000"/>
+                </a:solidFill>
+              </a:rPr>
+              <a:t>Stationary</a:t>
+            </a:r>
+          </a:p>
+          <a:p>
+            <a:pPr algn="ctr"/>
+            <a:r>
+              <a:rPr lang="en-US" sz="1400" dirty="0">
+                <a:solidFill>
+                  <a:sysClr val="windowText" lastClr="000000"/>
+                </a:solidFill>
+              </a:rPr>
+              <a:t>Group</a:t>
+            </a:r>
+          </a:p>
+        </p:txBody>
+      </p:sp>
+      <p:sp>
+        <p:nvSpPr>
+          <p:cNvPr id="42" name="Rectangle 41"/>
+          <p:cNvSpPr/>
+          <p:nvPr/>
+        </p:nvSpPr>
+        <p:spPr>
+          <a:xfrm>
+            <a:off x="5838683" y="5890384"/>
+            <a:ext cx="950933" cy="714990"/>
+          </a:xfrm>
+          <a:prstGeom prst="rect">
+            <a:avLst/>
+          </a:prstGeom>
+          <a:solidFill>
+            <a:schemeClr val="accent6">
+              <a:lumMod val="60000"/>
+              <a:lumOff val="40000"/>
+            </a:schemeClr>
+          </a:solidFill>
+          <a:ln w="19050">
+            <a:solidFill>
+              <a:schemeClr val="tx1"/>
+            </a:solidFill>
+          </a:ln>
+        </p:spPr>
+        <p:style>
+          <a:lnRef idx="2">
+            <a:schemeClr val="accent1">
+              <a:shade val="50000"/>
+            </a:schemeClr>
+          </a:lnRef>
+          <a:fillRef idx="1">
+            <a:schemeClr val="accent1"/>
+          </a:fillRef>
+          <a:effectRef idx="0">
+            <a:schemeClr val="accent1"/>
+          </a:effectRef>
+          <a:fontRef idx="minor">
+            <a:schemeClr val="lt1"/>
+          </a:fontRef>
+        </p:style>
+        <p:txBody>
+          <a:bodyPr rtlCol="0" anchor="ctr"/>
+          <a:lstStyle/>
+          <a:p>
+            <a:pPr algn="ctr"/>
+            <a:r>
+              <a:rPr lang="en-US" sz="1400" dirty="0" smtClean="0">
+                <a:solidFill>
+                  <a:sysClr val="windowText" lastClr="000000"/>
+                </a:solidFill>
+              </a:rPr>
+              <a:t>Exposed</a:t>
+            </a:r>
+          </a:p>
+          <a:p>
+            <a:pPr algn="ctr"/>
+            <a:r>
+              <a:rPr lang="en-US" sz="1400" dirty="0" smtClean="0">
+                <a:solidFill>
+                  <a:sysClr val="windowText" lastClr="000000"/>
+                </a:solidFill>
+              </a:rPr>
+              <a:t>Group</a:t>
+            </a:r>
+          </a:p>
+        </p:txBody>
+      </p:sp>
+      <p:sp>
+        <p:nvSpPr>
+          <p:cNvPr id="43" name="Rectangle 42"/>
+          <p:cNvSpPr/>
+          <p:nvPr/>
+        </p:nvSpPr>
+        <p:spPr>
+          <a:xfrm>
+            <a:off x="9636287" y="5923508"/>
+            <a:ext cx="950933" cy="714990"/>
+          </a:xfrm>
+          <a:prstGeom prst="rect">
+            <a:avLst/>
+          </a:prstGeom>
+          <a:solidFill>
+            <a:schemeClr val="accent6">
+              <a:lumMod val="60000"/>
+              <a:lumOff val="40000"/>
+            </a:schemeClr>
+          </a:solidFill>
+          <a:ln w="19050">
+            <a:solidFill>
+              <a:schemeClr val="tx1"/>
+            </a:solidFill>
+          </a:ln>
+        </p:spPr>
+        <p:style>
+          <a:lnRef idx="2">
+            <a:schemeClr val="accent1">
+              <a:shade val="50000"/>
+            </a:schemeClr>
+          </a:lnRef>
+          <a:fillRef idx="1">
+            <a:schemeClr val="accent1"/>
+          </a:fillRef>
+          <a:effectRef idx="0">
+            <a:schemeClr val="accent1"/>
+          </a:effectRef>
+          <a:fontRef idx="minor">
+            <a:schemeClr val="lt1"/>
+          </a:fontRef>
+        </p:style>
+        <p:txBody>
+          <a:bodyPr rtlCol="0" anchor="ctr"/>
+          <a:lstStyle/>
+          <a:p>
+            <a:pPr algn="ctr"/>
+            <a:r>
+              <a:rPr lang="en-US" sz="1400" dirty="0" smtClean="0">
+                <a:solidFill>
+                  <a:sysClr val="windowText" lastClr="000000"/>
+                </a:solidFill>
+              </a:rPr>
+              <a:t>Exposed</a:t>
+            </a:r>
+          </a:p>
+          <a:p>
+            <a:pPr algn="ctr"/>
+            <a:r>
+              <a:rPr lang="en-US" sz="1400" dirty="0" smtClean="0">
+                <a:solidFill>
+                  <a:sysClr val="windowText" lastClr="000000"/>
+                </a:solidFill>
+              </a:rPr>
+              <a:t>Group</a:t>
+            </a:r>
+          </a:p>
+        </p:txBody>
+      </p:sp>
+      <p:sp>
+        <p:nvSpPr>
+          <p:cNvPr id="44" name="Rectangle 43"/>
+          <p:cNvSpPr/>
+          <p:nvPr/>
+        </p:nvSpPr>
+        <p:spPr>
+          <a:xfrm>
+            <a:off x="10167797" y="4309848"/>
+            <a:ext cx="950933" cy="714990"/>
+          </a:xfrm>
+          <a:prstGeom prst="rect">
+            <a:avLst/>
+          </a:prstGeom>
+          <a:solidFill>
+            <a:schemeClr val="accent6">
+              <a:lumMod val="60000"/>
+              <a:lumOff val="40000"/>
+            </a:schemeClr>
+          </a:solidFill>
+          <a:ln w="19050">
+            <a:solidFill>
+              <a:schemeClr val="tx1"/>
+            </a:solidFill>
+          </a:ln>
+        </p:spPr>
+        <p:style>
+          <a:lnRef idx="2">
+            <a:schemeClr val="accent1">
+              <a:shade val="50000"/>
+            </a:schemeClr>
+          </a:lnRef>
+          <a:fillRef idx="1">
+            <a:schemeClr val="accent1"/>
+          </a:fillRef>
+          <a:effectRef idx="0">
+            <a:schemeClr val="accent1"/>
+          </a:effectRef>
+          <a:fontRef idx="minor">
+            <a:schemeClr val="lt1"/>
+          </a:fontRef>
+        </p:style>
+        <p:txBody>
+          <a:bodyPr rtlCol="0" anchor="ctr"/>
+          <a:lstStyle/>
+          <a:p>
+            <a:pPr algn="ctr"/>
+            <a:r>
+              <a:rPr lang="en-US" sz="1400" dirty="0">
+                <a:solidFill>
+                  <a:sysClr val="windowText" lastClr="000000"/>
+                </a:solidFill>
+              </a:rPr>
+              <a:t>Isolated</a:t>
+            </a:r>
+          </a:p>
+          <a:p>
+            <a:pPr algn="ctr"/>
+            <a:r>
+              <a:rPr lang="en-US" sz="1400" dirty="0">
+                <a:solidFill>
+                  <a:sysClr val="windowText" lastClr="000000"/>
+                </a:solidFill>
+              </a:rPr>
+              <a:t>Stationary</a:t>
+            </a:r>
+          </a:p>
+          <a:p>
+            <a:pPr algn="ctr"/>
+            <a:r>
+              <a:rPr lang="en-US" sz="1400" dirty="0">
+                <a:solidFill>
+                  <a:sysClr val="windowText" lastClr="000000"/>
+                </a:solidFill>
+              </a:rPr>
+              <a:t>Group</a:t>
+            </a:r>
+          </a:p>
+        </p:txBody>
+      </p:sp>
+      <p:sp>
+        <p:nvSpPr>
+          <p:cNvPr id="46" name="Rectangle 45"/>
+          <p:cNvSpPr/>
+          <p:nvPr/>
+        </p:nvSpPr>
+        <p:spPr>
+          <a:xfrm>
+            <a:off x="352423" y="810194"/>
+            <a:ext cx="616992" cy="435660"/>
+          </a:xfrm>
+          <a:prstGeom prst="rect">
+            <a:avLst/>
+          </a:prstGeom>
+          <a:solidFill>
+            <a:schemeClr val="accent6">
+              <a:lumMod val="60000"/>
+              <a:lumOff val="40000"/>
+            </a:schemeClr>
+          </a:solidFill>
+          <a:ln w="19050" cmpd="tri">
+            <a:solidFill>
+              <a:schemeClr val="tx1"/>
+            </a:solidFill>
+          </a:ln>
+        </p:spPr>
+        <p:style>
+          <a:lnRef idx="2">
+            <a:schemeClr val="accent1">
+              <a:shade val="50000"/>
+            </a:schemeClr>
+          </a:lnRef>
+          <a:fillRef idx="1">
+            <a:schemeClr val="accent1"/>
+          </a:fillRef>
+          <a:effectRef idx="0">
+            <a:schemeClr val="accent1"/>
+          </a:effectRef>
+          <a:fontRef idx="minor">
+            <a:schemeClr val="lt1"/>
+          </a:fontRef>
+        </p:style>
+        <p:txBody>
+          <a:bodyPr rtlCol="0" anchor="ctr"/>
+          <a:lstStyle/>
+          <a:p>
+            <a:pPr algn="ctr"/>
+            <a:endParaRPr lang="en-US" sz="1400" dirty="0" smtClean="0">
+              <a:solidFill>
+                <a:sysClr val="windowText" lastClr="000000"/>
+              </a:solidFill>
+            </a:endParaRPr>
+          </a:p>
+        </p:txBody>
+      </p:sp>
+      <p:sp>
+        <p:nvSpPr>
+          <p:cNvPr id="3" name="TextBox 2"/>
+          <p:cNvSpPr txBox="1"/>
+          <p:nvPr/>
+        </p:nvSpPr>
+        <p:spPr>
+          <a:xfrm>
+            <a:off x="1004744" y="828124"/>
+            <a:ext cx="1514476" cy="369332"/>
+          </a:xfrm>
+          <a:prstGeom prst="rect">
+            <a:avLst/>
+          </a:prstGeom>
+          <a:noFill/>
+        </p:spPr>
+        <p:txBody>
+          <a:bodyPr wrap="square" rtlCol="0">
+            <a:spAutoFit/>
+          </a:bodyPr>
+          <a:lstStyle/>
+          <a:p>
+            <a:r>
+              <a:rPr lang="en-US" b="1" dirty="0" smtClean="0"/>
+              <a:t>= Sampled</a:t>
+            </a:r>
+            <a:endParaRPr lang="en-US" b="1" dirty="0"/>
+          </a:p>
+        </p:txBody>
+      </p:sp>
+      <p:sp>
+        <p:nvSpPr>
+          <p:cNvPr id="48" name="TextBox 47"/>
+          <p:cNvSpPr txBox="1"/>
+          <p:nvPr/>
+        </p:nvSpPr>
+        <p:spPr>
+          <a:xfrm>
+            <a:off x="2863045" y="828124"/>
+            <a:ext cx="1865594" cy="369332"/>
+          </a:xfrm>
+          <a:prstGeom prst="rect">
+            <a:avLst/>
+          </a:prstGeom>
+          <a:noFill/>
+        </p:spPr>
+        <p:txBody>
+          <a:bodyPr wrap="square" rtlCol="0">
+            <a:spAutoFit/>
+          </a:bodyPr>
+          <a:lstStyle/>
+          <a:p>
+            <a:r>
+              <a:rPr lang="en-US" b="1" dirty="0" smtClean="0"/>
+              <a:t>= Not Sampled</a:t>
+            </a:r>
+            <a:endParaRPr lang="en-US" b="1" dirty="0"/>
+          </a:p>
+        </p:txBody>
+      </p:sp>
+      <p:sp>
+        <p:nvSpPr>
+          <p:cNvPr id="49" name="Rectangle 48"/>
+          <p:cNvSpPr/>
+          <p:nvPr/>
+        </p:nvSpPr>
+        <p:spPr>
+          <a:xfrm>
+            <a:off x="2246053" y="805179"/>
+            <a:ext cx="616992" cy="435660"/>
+          </a:xfrm>
+          <a:prstGeom prst="rect">
+            <a:avLst/>
+          </a:prstGeom>
+          <a:solidFill>
+            <a:schemeClr val="accent2">
+              <a:lumMod val="40000"/>
+              <a:lumOff val="60000"/>
+            </a:schemeClr>
+          </a:solidFill>
+          <a:ln w="19050">
+            <a:solidFill>
+              <a:schemeClr val="tx1"/>
+            </a:solidFill>
+          </a:ln>
+        </p:spPr>
+        <p:style>
+          <a:lnRef idx="2">
+            <a:schemeClr val="accent1">
+              <a:shade val="50000"/>
+            </a:schemeClr>
+          </a:lnRef>
+          <a:fillRef idx="1">
+            <a:schemeClr val="accent1"/>
+          </a:fillRef>
+          <a:effectRef idx="0">
+            <a:schemeClr val="accent1"/>
+          </a:effectRef>
+          <a:fontRef idx="minor">
+            <a:schemeClr val="lt1"/>
+          </a:fontRef>
+        </p:style>
+        <p:txBody>
+          <a:bodyPr rtlCol="0" anchor="ctr"/>
+          <a:lstStyle/>
+          <a:p>
+            <a:pPr algn="ctr"/>
+            <a:endParaRPr lang="en-US" sz="1400" dirty="0" smtClean="0">
+              <a:solidFill>
+                <a:sysClr val="windowText" lastClr="000000"/>
+              </a:solidFill>
+            </a:endParaRPr>
+          </a:p>
+        </p:txBody>
+      </p:sp>
+      <p:sp>
+        <p:nvSpPr>
+          <p:cNvPr id="53" name="Rectangle 52"/>
+          <p:cNvSpPr/>
+          <p:nvPr/>
+        </p:nvSpPr>
+        <p:spPr>
+          <a:xfrm>
+            <a:off x="1544235" y="3901540"/>
+            <a:ext cx="950933" cy="714990"/>
+          </a:xfrm>
+          <a:prstGeom prst="rect">
+            <a:avLst/>
+          </a:prstGeom>
+          <a:solidFill>
+            <a:schemeClr val="accent6">
+              <a:lumMod val="60000"/>
+              <a:lumOff val="40000"/>
+            </a:schemeClr>
+          </a:solidFill>
+          <a:ln w="19050">
+            <a:solidFill>
+              <a:schemeClr val="tx1"/>
+            </a:solidFill>
+          </a:ln>
+        </p:spPr>
+        <p:style>
+          <a:lnRef idx="2">
+            <a:schemeClr val="accent1">
+              <a:shade val="50000"/>
+            </a:schemeClr>
+          </a:lnRef>
+          <a:fillRef idx="1">
+            <a:schemeClr val="accent1"/>
+          </a:fillRef>
+          <a:effectRef idx="0">
+            <a:schemeClr val="accent1"/>
+          </a:effectRef>
+          <a:fontRef idx="minor">
+            <a:schemeClr val="lt1"/>
+          </a:fontRef>
+        </p:style>
+        <p:txBody>
+          <a:bodyPr rtlCol="0" anchor="ctr"/>
+          <a:lstStyle/>
+          <a:p>
+            <a:pPr algn="ctr"/>
+            <a:r>
+              <a:rPr lang="en-US" sz="1400" dirty="0" smtClean="0">
+                <a:solidFill>
+                  <a:sysClr val="windowText" lastClr="000000"/>
+                </a:solidFill>
+              </a:rPr>
+              <a:t>Migratory Group</a:t>
+            </a:r>
+          </a:p>
+        </p:txBody>
+      </p:sp>
+      <p:sp>
+        <p:nvSpPr>
+          <p:cNvPr id="54" name="Rectangle 53"/>
+          <p:cNvSpPr/>
+          <p:nvPr/>
+        </p:nvSpPr>
+        <p:spPr>
+          <a:xfrm>
+            <a:off x="1004744" y="4785477"/>
+            <a:ext cx="950933" cy="714990"/>
+          </a:xfrm>
+          <a:prstGeom prst="rect">
+            <a:avLst/>
+          </a:prstGeom>
+          <a:solidFill>
+            <a:schemeClr val="accent2">
+              <a:lumMod val="40000"/>
+              <a:lumOff val="60000"/>
+            </a:schemeClr>
+          </a:solidFill>
+          <a:ln w="19050">
+            <a:solidFill>
+              <a:schemeClr val="tx1"/>
+            </a:solidFill>
+          </a:ln>
+        </p:spPr>
+        <p:style>
+          <a:lnRef idx="2">
+            <a:schemeClr val="accent1">
+              <a:shade val="50000"/>
+            </a:schemeClr>
+          </a:lnRef>
+          <a:fillRef idx="1">
+            <a:schemeClr val="accent1"/>
+          </a:fillRef>
+          <a:effectRef idx="0">
+            <a:schemeClr val="accent1"/>
+          </a:effectRef>
+          <a:fontRef idx="minor">
+            <a:schemeClr val="lt1"/>
+          </a:fontRef>
+        </p:style>
+        <p:txBody>
+          <a:bodyPr rtlCol="0" anchor="ctr"/>
+          <a:lstStyle/>
+          <a:p>
+            <a:pPr algn="ctr"/>
+            <a:r>
+              <a:rPr lang="en-US" sz="1400" dirty="0" smtClean="0">
+                <a:solidFill>
+                  <a:sysClr val="windowText" lastClr="000000"/>
+                </a:solidFill>
+              </a:rPr>
+              <a:t>Exposed</a:t>
+            </a:r>
+          </a:p>
+          <a:p>
+            <a:pPr algn="ctr"/>
+            <a:r>
+              <a:rPr lang="en-US" sz="1400" dirty="0" smtClean="0">
+                <a:solidFill>
+                  <a:sysClr val="windowText" lastClr="000000"/>
+                </a:solidFill>
+              </a:rPr>
+              <a:t>Group</a:t>
+            </a:r>
+          </a:p>
+        </p:txBody>
+      </p:sp>
+      <p:cxnSp>
+        <p:nvCxnSpPr>
+          <p:cNvPr id="57" name="Straight Connector 56"/>
+          <p:cNvCxnSpPr/>
+          <p:nvPr/>
+        </p:nvCxnSpPr>
+        <p:spPr>
+          <a:xfrm>
+            <a:off x="2246053" y="814494"/>
+            <a:ext cx="616992" cy="419413"/>
+          </a:xfrm>
+          <a:prstGeom prst="line">
+            <a:avLst/>
+          </a:prstGeom>
+          <a:ln w="38100">
+            <a:solidFill>
+              <a:schemeClr val="tx1"/>
+            </a:solidFill>
+          </a:ln>
+        </p:spPr>
+        <p:style>
+          <a:lnRef idx="1">
+            <a:schemeClr val="accent1"/>
+          </a:lnRef>
+          <a:fillRef idx="0">
+            <a:schemeClr val="accent1"/>
+          </a:fillRef>
+          <a:effectRef idx="0">
+            <a:schemeClr val="accent1"/>
+          </a:effectRef>
+          <a:fontRef idx="minor">
+            <a:schemeClr val="tx1"/>
+          </a:fontRef>
+        </p:style>
+      </p:cxnSp>
+      <p:cxnSp>
+        <p:nvCxnSpPr>
+          <p:cNvPr id="60" name="Straight Connector 59"/>
+          <p:cNvCxnSpPr/>
+          <p:nvPr/>
+        </p:nvCxnSpPr>
+        <p:spPr>
+          <a:xfrm>
+            <a:off x="1004744" y="4787107"/>
+            <a:ext cx="950933" cy="713360"/>
+          </a:xfrm>
+          <a:prstGeom prst="line">
+            <a:avLst/>
+          </a:prstGeom>
+          <a:ln w="38100">
+            <a:solidFill>
+              <a:schemeClr val="tx1"/>
+            </a:solidFill>
+          </a:ln>
+        </p:spPr>
+        <p:style>
+          <a:lnRef idx="1">
+            <a:schemeClr val="accent1"/>
+          </a:lnRef>
+          <a:fillRef idx="0">
+            <a:schemeClr val="accent1"/>
+          </a:fillRef>
+          <a:effectRef idx="0">
+            <a:schemeClr val="accent1"/>
+          </a:effectRef>
+          <a:fontRef idx="minor">
+            <a:schemeClr val="tx1"/>
+          </a:fontRef>
+        </p:style>
+      </p:cxnSp>
+      <p:sp>
+        <p:nvSpPr>
+          <p:cNvPr id="47" name="Rectangle 46"/>
+          <p:cNvSpPr/>
+          <p:nvPr/>
+        </p:nvSpPr>
+        <p:spPr>
+          <a:xfrm>
+            <a:off x="10705153" y="5921011"/>
+            <a:ext cx="950933" cy="714990"/>
+          </a:xfrm>
+          <a:prstGeom prst="rect">
+            <a:avLst/>
+          </a:prstGeom>
+          <a:solidFill>
+            <a:schemeClr val="accent6">
+              <a:lumMod val="60000"/>
+              <a:lumOff val="40000"/>
+            </a:schemeClr>
+          </a:solidFill>
+          <a:ln w="19050">
+            <a:solidFill>
+              <a:schemeClr val="tx1"/>
+            </a:solidFill>
+          </a:ln>
+        </p:spPr>
+        <p:style>
+          <a:lnRef idx="2">
+            <a:schemeClr val="accent1">
+              <a:shade val="50000"/>
+            </a:schemeClr>
+          </a:lnRef>
+          <a:fillRef idx="1">
+            <a:schemeClr val="accent1"/>
+          </a:fillRef>
+          <a:effectRef idx="0">
+            <a:schemeClr val="accent1"/>
+          </a:effectRef>
+          <a:fontRef idx="minor">
+            <a:schemeClr val="lt1"/>
+          </a:fontRef>
+        </p:style>
+        <p:txBody>
+          <a:bodyPr rtlCol="0" anchor="ctr"/>
+          <a:lstStyle/>
+          <a:p>
+            <a:pPr algn="ctr"/>
+            <a:r>
+              <a:rPr lang="en-US" sz="1400" dirty="0" smtClean="0">
+                <a:solidFill>
+                  <a:sysClr val="windowText" lastClr="000000"/>
+                </a:solidFill>
+              </a:rPr>
+              <a:t>Migratory</a:t>
+            </a:r>
+          </a:p>
+          <a:p>
+            <a:pPr algn="ctr"/>
+            <a:r>
+              <a:rPr lang="en-US" sz="1400" dirty="0" smtClean="0">
+                <a:solidFill>
+                  <a:sysClr val="windowText" lastClr="000000"/>
+                </a:solidFill>
+              </a:rPr>
+              <a:t>Group</a:t>
+            </a:r>
           </a:p>
         </p:txBody>
       </p:sp>
     </p:spTree>
     <p:extLst>
       <p:ext uri="{BB962C8B-B14F-4D97-AF65-F5344CB8AC3E}">
-        <p14:creationId xmlns:p14="http://schemas.microsoft.com/office/powerpoint/2010/main" val="2573399430"/>
+        <p14:creationId xmlns:p14="http://schemas.microsoft.com/office/powerpoint/2010/main" val="3978732107"/>
       </p:ext>
     </p:extLst>
   </p:cSld>
@@ -4899,6 +6334,69 @@
       </p:grpSpPr>
       <p:sp>
         <p:nvSpPr>
+          <p:cNvPr id="3" name="Content Placeholder 2"/>
+          <p:cNvSpPr>
+            <a:spLocks noGrp="1"/>
+          </p:cNvSpPr>
+          <p:nvPr>
+            <p:ph idx="1"/>
+          </p:nvPr>
+        </p:nvSpPr>
+        <p:spPr>
+          <a:xfrm>
+            <a:off x="845388" y="603849"/>
+            <a:ext cx="10508411" cy="5573114"/>
+          </a:xfrm>
+        </p:spPr>
+        <p:txBody>
+          <a:bodyPr>
+            <a:normAutofit/>
+          </a:bodyPr>
+          <a:lstStyle/>
+          <a:p>
+            <a:pPr marL="0" indent="0">
+              <a:buNone/>
+            </a:pPr>
+            <a:r>
+              <a:rPr lang="en-US" dirty="0" smtClean="0"/>
+              <a:t>Schematic showing experimental design. Three sampling events occurred during the experiment. Green boxes represent each group of 16 hives sampled during the specified sampling event. Slashed red boxes represent each group of 16 hives not sampled during that sampling event. Three experimental groups (Isolated Stationary Group, Migratory Group, and Exposed Group) are spread across three separate yards throughout the experiment: The Stationary Yard (where all groups begin and the Isolated Stationary Group remains for the duration of the experiment), the Migratory Holding Yard (where the Migratory Group is temporarily brought upon return from CA for sampling event 2), and the Exposed Yard (where the Exposed Group is exposed to the Migratory Group). Arrows represent tasks that occurred between each sampling event.</a:t>
+            </a:r>
+            <a:endParaRPr lang="en-US" dirty="0"/>
+          </a:p>
+        </p:txBody>
+      </p:sp>
+    </p:spTree>
+    <p:extLst>
+      <p:ext uri="{BB962C8B-B14F-4D97-AF65-F5344CB8AC3E}">
+        <p14:creationId xmlns:p14="http://schemas.microsoft.com/office/powerpoint/2010/main" val="2573399430"/>
+      </p:ext>
+    </p:extLst>
+  </p:cSld>
+  <p:clrMapOvr>
+    <a:masterClrMapping/>
+  </p:clrMapOvr>
+</p:sld>
+</file>
+
+<file path=ppt/slides/slide4.xml><?xml version="1.0" encoding="utf-8"?>
+<p:sld xmlns:a="http://schemas.openxmlformats.org/drawingml/2006/main" xmlns:r="http://schemas.openxmlformats.org/officeDocument/2006/relationships" xmlns:p="http://schemas.openxmlformats.org/presentationml/2006/main">
+  <p:cSld>
+    <p:spTree>
+      <p:nvGrpSpPr>
+        <p:cNvPr id="1" name=""/>
+        <p:cNvGrpSpPr/>
+        <p:nvPr/>
+      </p:nvGrpSpPr>
+      <p:grpSpPr>
+        <a:xfrm>
+          <a:off x="0" y="0"/>
+          <a:ext cx="0" cy="0"/>
+          <a:chOff x="0" y="0"/>
+          <a:chExt cx="0" cy="0"/>
+        </a:xfrm>
+      </p:grpSpPr>
+      <p:sp>
+        <p:nvSpPr>
           <p:cNvPr id="5" name="Rectangle 4"/>
           <p:cNvSpPr/>
           <p:nvPr/>
@@ -6747,7 +8245,7 @@
 </p:sld>
 </file>
 
-<file path=ppt/slides/slide4.xml><?xml version="1.0" encoding="utf-8"?>
+<file path=ppt/slides/slide5.xml><?xml version="1.0" encoding="utf-8"?>
 <p:sld xmlns:a="http://schemas.openxmlformats.org/drawingml/2006/main" xmlns:r="http://schemas.openxmlformats.org/officeDocument/2006/relationships" xmlns:p="http://schemas.openxmlformats.org/presentationml/2006/main">
   <p:cSld>
     <p:spTree>

</xml_diff>